<commit_message>
ppt aangepast en afbeeldingen toegevoegd
</commit_message>
<xml_diff>
--- a/Documentation/Presentatie.pptx
+++ b/Documentation/Presentatie.pptx
@@ -6,15 +6,20 @@
     <p:sldMasterId id="2147483694" r:id="rId2"/>
   </p:sldMasterIdLst>
   <p:notesMasterIdLst>
-    <p:notesMasterId r:id="rId6"/>
+    <p:notesMasterId r:id="rId11"/>
   </p:notesMasterIdLst>
   <p:handoutMasterIdLst>
-    <p:handoutMasterId r:id="rId7"/>
+    <p:handoutMasterId r:id="rId12"/>
   </p:handoutMasterIdLst>
   <p:sldIdLst>
     <p:sldId id="261" r:id="rId3"/>
     <p:sldId id="262" r:id="rId4"/>
     <p:sldId id="263" r:id="rId5"/>
+    <p:sldId id="265" r:id="rId6"/>
+    <p:sldId id="266" r:id="rId7"/>
+    <p:sldId id="264" r:id="rId8"/>
+    <p:sldId id="267" r:id="rId9"/>
+    <p:sldId id="268" r:id="rId10"/>
   </p:sldIdLst>
   <p:sldSz cx="12192000" cy="6858000"/>
   <p:notesSz cx="6858000" cy="9144000"/>
@@ -206,7 +211,7 @@
           <a:p>
             <a:fld id="{8F591CCF-F6FD-734B-854A-5BC033593B1E}" type="datetimeFigureOut">
               <a:rPr lang="nl-NL" smtClean="0"/>
-              <a:t>15-5-2019</a:t>
+              <a:t>20-5-2019</a:t>
             </a:fld>
             <a:endParaRPr lang="nl-NL"/>
           </a:p>
@@ -371,7 +376,7 @@
           <a:p>
             <a:fld id="{23C66214-DB21-4647-B5DA-0D17CA592867}" type="datetimeFigureOut">
               <a:rPr lang="nl-NL" smtClean="0"/>
-              <a:t>15-5-2019</a:t>
+              <a:t>20-5-2019</a:t>
             </a:fld>
             <a:endParaRPr lang="nl-NL"/>
           </a:p>
@@ -1360,7 +1365,7 @@
           <a:p>
             <a:fld id="{EA3A7081-D270-4FBF-AE40-A52D674243CC}" type="datetime1">
               <a:rPr lang="nl-BE" smtClean="0"/>
-              <a:t>15/05/2019</a:t>
+              <a:t>20/05/2019</a:t>
             </a:fld>
             <a:endParaRPr lang="nl-NL"/>
           </a:p>
@@ -1621,7 +1626,7 @@
           <a:p>
             <a:fld id="{5C69415A-EEF6-439C-A913-189A8C067023}" type="datetime1">
               <a:rPr lang="nl-BE" smtClean="0"/>
-              <a:t>15/05/2019</a:t>
+              <a:t>20/05/2019</a:t>
             </a:fld>
             <a:endParaRPr lang="nl-NL"/>
           </a:p>
@@ -1929,7 +1934,7 @@
           <a:p>
             <a:fld id="{AA7DF125-8D2F-407C-A946-0B214A077F46}" type="datetime1">
               <a:rPr lang="nl-BE" smtClean="0"/>
-              <a:t>15/05/2019</a:t>
+              <a:t>20/05/2019</a:t>
             </a:fld>
             <a:endParaRPr lang="nl-NL"/>
           </a:p>
@@ -2226,7 +2231,7 @@
           <a:p>
             <a:fld id="{FE566779-A426-4C6E-B33F-12BA9B572EC4}" type="datetime1">
               <a:rPr lang="nl-BE" smtClean="0"/>
-              <a:t>15/05/2019</a:t>
+              <a:t>20/05/2019</a:t>
             </a:fld>
             <a:endParaRPr lang="nl-NL" dirty="0"/>
           </a:p>
@@ -2525,7 +2530,7 @@
           <a:p>
             <a:fld id="{E40DF61B-1080-4D20-8EAC-F5AC55182461}" type="datetime1">
               <a:rPr lang="nl-BE" smtClean="0"/>
-              <a:t>15/05/2019</a:t>
+              <a:t>20/05/2019</a:t>
             </a:fld>
             <a:endParaRPr lang="nl-NL" dirty="0"/>
           </a:p>
@@ -2645,7 +2650,7 @@
           <a:p>
             <a:fld id="{94A4F625-24B7-4F40-98BC-AFA043082CE9}" type="datetime1">
               <a:rPr lang="nl-BE" smtClean="0"/>
-              <a:t>15/05/2019</a:t>
+              <a:t>20/05/2019</a:t>
             </a:fld>
             <a:endParaRPr lang="nl-NL"/>
           </a:p>
@@ -3107,7 +3112,7 @@
           <a:p>
             <a:fld id="{292342B6-1303-46D4-9581-5E95FC0B22E4}" type="datetime1">
               <a:rPr lang="nl-BE" smtClean="0"/>
-              <a:t>15/05/2019</a:t>
+              <a:t>20/05/2019</a:t>
             </a:fld>
             <a:endParaRPr lang="nl-NL" dirty="0"/>
           </a:p>
@@ -3206,7 +3211,7 @@
           <a:p>
             <a:fld id="{A76F3976-FDFC-4D8C-ACD3-BCE6A597C36A}" type="datetime1">
               <a:rPr lang="nl-BE" smtClean="0"/>
-              <a:t>15/05/2019</a:t>
+              <a:t>20/05/2019</a:t>
             </a:fld>
             <a:endParaRPr lang="nl-NL"/>
           </a:p>
@@ -3305,7 +3310,7 @@
           <a:p>
             <a:fld id="{5ADFEA79-DE61-4EF0-8C65-B83CEE2687EB}" type="datetime1">
               <a:rPr lang="nl-BE" smtClean="0"/>
-              <a:t>15/05/2019</a:t>
+              <a:t>20/05/2019</a:t>
             </a:fld>
             <a:endParaRPr lang="nl-NL"/>
           </a:p>
@@ -3465,7 +3470,7 @@
           <a:p>
             <a:fld id="{FA2EC5B9-2DE2-43DC-AAE2-5679419BAC4A}" type="datetime1">
               <a:rPr lang="nl-BE" smtClean="0"/>
-              <a:t>15/05/2019</a:t>
+              <a:t>20/05/2019</a:t>
             </a:fld>
             <a:endParaRPr lang="nl-NL" dirty="0"/>
           </a:p>
@@ -3727,7 +3732,7 @@
           <a:p>
             <a:fld id="{BB46EC33-4D1A-4426-91DF-270C2E654CCE}" type="datetime1">
               <a:rPr lang="nl-BE" smtClean="0"/>
-              <a:t>15/05/2019</a:t>
+              <a:t>20/05/2019</a:t>
             </a:fld>
             <a:endParaRPr lang="nl-NL" dirty="0"/>
           </a:p>
@@ -4461,7 +4466,7 @@
           <a:p>
             <a:fld id="{48C250A7-EEA6-4BD5-AB95-D7BF57F3506B}" type="datetime1">
               <a:rPr lang="nl-BE" smtClean="0"/>
-              <a:t>15/05/2019</a:t>
+              <a:t>20/05/2019</a:t>
             </a:fld>
             <a:endParaRPr lang="nl-NL" dirty="0"/>
           </a:p>
@@ -5311,6 +5316,750 @@
     <p:extLst>
       <p:ext uri="{BB962C8B-B14F-4D97-AF65-F5344CB8AC3E}">
         <p14:creationId xmlns:p14="http://schemas.microsoft.com/office/powerpoint/2010/main" val="78968011"/>
+      </p:ext>
+    </p:extLst>
+  </p:cSld>
+  <p:clrMapOvr>
+    <a:masterClrMapping/>
+  </p:clrMapOvr>
+</p:sld>
+</file>
+
+<file path=ppt/slides/slide4.xml><?xml version="1.0" encoding="utf-8"?>
+<p:sld xmlns:a="http://schemas.openxmlformats.org/drawingml/2006/main" xmlns:r="http://schemas.openxmlformats.org/officeDocument/2006/relationships" xmlns:p="http://schemas.openxmlformats.org/presentationml/2006/main">
+  <p:cSld>
+    <p:spTree>
+      <p:nvGrpSpPr>
+        <p:cNvPr id="1" name=""/>
+        <p:cNvGrpSpPr/>
+        <p:nvPr/>
+      </p:nvGrpSpPr>
+      <p:grpSpPr>
+        <a:xfrm>
+          <a:off x="0" y="0"/>
+          <a:ext cx="0" cy="0"/>
+          <a:chOff x="0" y="0"/>
+          <a:chExt cx="0" cy="0"/>
+        </a:xfrm>
+      </p:grpSpPr>
+      <p:sp>
+        <p:nvSpPr>
+          <p:cNvPr id="2" name="Titel 1">
+            <a:extLst>
+              <a:ext uri="{FF2B5EF4-FFF2-40B4-BE49-F238E27FC236}">
+                <a16:creationId xmlns:a16="http://schemas.microsoft.com/office/drawing/2014/main" id="{B0C928CD-C8CD-43AB-A25A-F9BEAD86C37A}"/>
+              </a:ext>
+            </a:extLst>
+          </p:cNvPr>
+          <p:cNvSpPr>
+            <a:spLocks noGrp="1"/>
+          </p:cNvSpPr>
+          <p:nvPr>
+            <p:ph type="title"/>
+          </p:nvPr>
+        </p:nvSpPr>
+        <p:spPr/>
+        <p:txBody>
+          <a:bodyPr/>
+          <a:lstStyle/>
+          <a:p>
+            <a:r>
+              <a:rPr lang="en-US" dirty="0" err="1"/>
+              <a:t>Wifi</a:t>
+            </a:r>
+            <a:r>
+              <a:rPr lang="en-US" dirty="0"/>
+              <a:t> Access Point</a:t>
+            </a:r>
+            <a:endParaRPr lang="en-GB" dirty="0"/>
+          </a:p>
+        </p:txBody>
+      </p:sp>
+      <p:sp>
+        <p:nvSpPr>
+          <p:cNvPr id="3" name="Tijdelijke aanduiding voor dianummer 2">
+            <a:extLst>
+              <a:ext uri="{FF2B5EF4-FFF2-40B4-BE49-F238E27FC236}">
+                <a16:creationId xmlns:a16="http://schemas.microsoft.com/office/drawing/2014/main" id="{D0BBB17F-45CE-4A5D-87BB-8761BA617CDA}"/>
+              </a:ext>
+            </a:extLst>
+          </p:cNvPr>
+          <p:cNvSpPr>
+            <a:spLocks noGrp="1"/>
+          </p:cNvSpPr>
+          <p:nvPr>
+            <p:ph type="sldNum" sz="quarter" idx="12"/>
+          </p:nvPr>
+        </p:nvSpPr>
+        <p:spPr/>
+        <p:txBody>
+          <a:bodyPr/>
+          <a:lstStyle/>
+          <a:p>
+            <a:fld id="{0A297500-7527-634B-90F4-69D0994C32B4}" type="slidenum">
+              <a:rPr lang="nl-NL" smtClean="0"/>
+              <a:t>4</a:t>
+            </a:fld>
+            <a:endParaRPr lang="nl-NL"/>
+          </a:p>
+        </p:txBody>
+      </p:sp>
+    </p:spTree>
+    <p:extLst>
+      <p:ext uri="{BB962C8B-B14F-4D97-AF65-F5344CB8AC3E}">
+        <p14:creationId xmlns:p14="http://schemas.microsoft.com/office/powerpoint/2010/main" val="2179496821"/>
+      </p:ext>
+    </p:extLst>
+  </p:cSld>
+  <p:clrMapOvr>
+    <a:masterClrMapping/>
+  </p:clrMapOvr>
+</p:sld>
+</file>
+
+<file path=ppt/slides/slide5.xml><?xml version="1.0" encoding="utf-8"?>
+<p:sld xmlns:a="http://schemas.openxmlformats.org/drawingml/2006/main" xmlns:r="http://schemas.openxmlformats.org/officeDocument/2006/relationships" xmlns:p="http://schemas.openxmlformats.org/presentationml/2006/main">
+  <p:cSld>
+    <p:spTree>
+      <p:nvGrpSpPr>
+        <p:cNvPr id="1" name=""/>
+        <p:cNvGrpSpPr/>
+        <p:nvPr/>
+      </p:nvGrpSpPr>
+      <p:grpSpPr>
+        <a:xfrm>
+          <a:off x="0" y="0"/>
+          <a:ext cx="0" cy="0"/>
+          <a:chOff x="0" y="0"/>
+          <a:chExt cx="0" cy="0"/>
+        </a:xfrm>
+      </p:grpSpPr>
+      <p:pic>
+        <p:nvPicPr>
+          <p:cNvPr id="6" name="Afbeelding 5" descr="Afbeelding met elektronica, circuit&#10;&#10;Automatisch gegenereerde beschrijving">
+            <a:extLst>
+              <a:ext uri="{FF2B5EF4-FFF2-40B4-BE49-F238E27FC236}">
+                <a16:creationId xmlns:a16="http://schemas.microsoft.com/office/drawing/2014/main" id="{A147104F-B0AE-42B3-8001-A66F10758374}"/>
+              </a:ext>
+            </a:extLst>
+          </p:cNvPr>
+          <p:cNvPicPr>
+            <a:picLocks noChangeAspect="1"/>
+          </p:cNvPicPr>
+          <p:nvPr/>
+        </p:nvPicPr>
+        <p:blipFill>
+          <a:blip r:embed="rId2"/>
+          <a:stretch>
+            <a:fillRect/>
+          </a:stretch>
+        </p:blipFill>
+        <p:spPr>
+          <a:xfrm>
+            <a:off x="6592001" y="1244338"/>
+            <a:ext cx="5209484" cy="3490225"/>
+          </a:xfrm>
+          <a:prstGeom prst="rect">
+            <a:avLst/>
+          </a:prstGeom>
+        </p:spPr>
+      </p:pic>
+      <p:sp>
+        <p:nvSpPr>
+          <p:cNvPr id="2" name="Tijdelijke aanduiding voor dianummer 1">
+            <a:extLst>
+              <a:ext uri="{FF2B5EF4-FFF2-40B4-BE49-F238E27FC236}">
+                <a16:creationId xmlns:a16="http://schemas.microsoft.com/office/drawing/2014/main" id="{6B3687FC-0903-4BD2-B490-6B1D9C0588B5}"/>
+              </a:ext>
+            </a:extLst>
+          </p:cNvPr>
+          <p:cNvSpPr>
+            <a:spLocks noGrp="1"/>
+          </p:cNvSpPr>
+          <p:nvPr>
+            <p:ph type="sldNum" sz="quarter" idx="12"/>
+          </p:nvPr>
+        </p:nvSpPr>
+        <p:spPr>
+          <a:xfrm>
+            <a:off x="576000" y="6210000"/>
+            <a:ext cx="648000" cy="648000"/>
+          </a:xfrm>
+        </p:spPr>
+        <p:txBody>
+          <a:bodyPr/>
+          <a:lstStyle/>
+          <a:p>
+            <a:fld id="{0A297500-7527-634B-90F4-69D0994C32B4}" type="slidenum">
+              <a:rPr lang="nl-NL" smtClean="0"/>
+              <a:t>5</a:t>
+            </a:fld>
+            <a:endParaRPr lang="nl-NL"/>
+          </a:p>
+        </p:txBody>
+      </p:sp>
+      <p:sp>
+        <p:nvSpPr>
+          <p:cNvPr id="3" name="Titel 2">
+            <a:extLst>
+              <a:ext uri="{FF2B5EF4-FFF2-40B4-BE49-F238E27FC236}">
+                <a16:creationId xmlns:a16="http://schemas.microsoft.com/office/drawing/2014/main" id="{F73B8CC6-27A7-4D72-8CDF-B78BC5DF187B}"/>
+              </a:ext>
+            </a:extLst>
+          </p:cNvPr>
+          <p:cNvSpPr>
+            <a:spLocks noGrp="1"/>
+          </p:cNvSpPr>
+          <p:nvPr>
+            <p:ph type="title"/>
+          </p:nvPr>
+        </p:nvSpPr>
+        <p:spPr>
+          <a:xfrm>
+            <a:off x="576000" y="207036"/>
+            <a:ext cx="11041200" cy="1152000"/>
+          </a:xfrm>
+        </p:spPr>
+        <p:txBody>
+          <a:bodyPr/>
+          <a:lstStyle/>
+          <a:p>
+            <a:r>
+              <a:rPr lang="en-US"/>
+              <a:t>Wifi Acces Point (WAP)</a:t>
+            </a:r>
+            <a:endParaRPr lang="en-GB" dirty="0"/>
+          </a:p>
+        </p:txBody>
+      </p:sp>
+      <p:sp>
+        <p:nvSpPr>
+          <p:cNvPr id="4" name="Tekstvak 3">
+            <a:extLst>
+              <a:ext uri="{FF2B5EF4-FFF2-40B4-BE49-F238E27FC236}">
+                <a16:creationId xmlns:a16="http://schemas.microsoft.com/office/drawing/2014/main" id="{8DD8D7DD-4CA8-4081-B93A-60D9C397BAAE}"/>
+              </a:ext>
+            </a:extLst>
+          </p:cNvPr>
+          <p:cNvSpPr txBox="1"/>
+          <p:nvPr/>
+        </p:nvSpPr>
+        <p:spPr>
+          <a:xfrm>
+            <a:off x="692458" y="1597981"/>
+            <a:ext cx="6464270" cy="2585323"/>
+          </a:xfrm>
+          <a:prstGeom prst="rect">
+            <a:avLst/>
+          </a:prstGeom>
+          <a:noFill/>
+        </p:spPr>
+        <p:txBody>
+          <a:bodyPr wrap="square" rtlCol="0">
+            <a:spAutoFit/>
+          </a:bodyPr>
+          <a:lstStyle/>
+          <a:p>
+            <a:pPr marL="285750" indent="-285750">
+              <a:buFont typeface="Arial" panose="020B0604020202020204" pitchFamily="34" charset="0"/>
+              <a:buChar char="•"/>
+            </a:pPr>
+            <a:r>
+              <a:rPr lang="en-US" dirty="0"/>
+              <a:t>Raspberry Pi Model 3 b+</a:t>
+            </a:r>
+          </a:p>
+          <a:p>
+            <a:pPr marL="285750" indent="-285750">
+              <a:buFont typeface="Arial" panose="020B0604020202020204" pitchFamily="34" charset="0"/>
+              <a:buChar char="•"/>
+            </a:pPr>
+            <a:r>
+              <a:rPr lang="en-US" dirty="0"/>
+              <a:t>Twee services:</a:t>
+            </a:r>
+          </a:p>
+          <a:p>
+            <a:pPr marL="742950" lvl="1" indent="-285750">
+              <a:buFont typeface="Arial" panose="020B0604020202020204" pitchFamily="34" charset="0"/>
+              <a:buChar char="•"/>
+            </a:pPr>
+            <a:r>
+              <a:rPr lang="en-US" dirty="0" err="1"/>
+              <a:t>Hostapd</a:t>
+            </a:r>
+            <a:endParaRPr lang="en-US" dirty="0"/>
+          </a:p>
+          <a:p>
+            <a:pPr lvl="2"/>
+            <a:r>
+              <a:rPr lang="en-US" dirty="0" err="1"/>
+              <a:t>Opzetten</a:t>
+            </a:r>
+            <a:r>
+              <a:rPr lang="en-US" dirty="0"/>
+              <a:t> van het access point</a:t>
+            </a:r>
+          </a:p>
+          <a:p>
+            <a:pPr lvl="2"/>
+            <a:r>
+              <a:rPr lang="en-US" dirty="0"/>
+              <a:t>SSID </a:t>
+            </a:r>
+            <a:r>
+              <a:rPr lang="en-US" dirty="0" err="1"/>
+              <a:t>en</a:t>
+            </a:r>
+            <a:r>
+              <a:rPr lang="en-US" dirty="0"/>
+              <a:t> </a:t>
+            </a:r>
+            <a:r>
+              <a:rPr lang="en-US" dirty="0" err="1"/>
+              <a:t>wachtwoord</a:t>
+            </a:r>
+            <a:r>
+              <a:rPr lang="en-US" dirty="0"/>
+              <a:t> </a:t>
+            </a:r>
+            <a:r>
+              <a:rPr lang="en-US" dirty="0" err="1"/>
+              <a:t>vastleggen</a:t>
+            </a:r>
+            <a:endParaRPr lang="en-US" dirty="0"/>
+          </a:p>
+          <a:p>
+            <a:pPr marL="742950" lvl="1" indent="-285750">
+              <a:buFont typeface="Arial" panose="020B0604020202020204" pitchFamily="34" charset="0"/>
+              <a:buChar char="•"/>
+            </a:pPr>
+            <a:r>
+              <a:rPr lang="en-US" dirty="0" err="1"/>
+              <a:t>Dnsmasq</a:t>
+            </a:r>
+            <a:endParaRPr lang="en-US" dirty="0"/>
+          </a:p>
+          <a:p>
+            <a:pPr lvl="2"/>
+            <a:r>
+              <a:rPr lang="en-US" dirty="0"/>
+              <a:t>DHCP server (Dynamic Host Configuration Protocol)</a:t>
+            </a:r>
+          </a:p>
+          <a:p>
+            <a:pPr lvl="2"/>
+            <a:r>
+              <a:rPr lang="en-US" dirty="0"/>
+              <a:t>Kent </a:t>
+            </a:r>
+            <a:r>
+              <a:rPr lang="en-US" dirty="0" err="1"/>
+              <a:t>dynamisch</a:t>
+            </a:r>
+            <a:r>
+              <a:rPr lang="en-US" dirty="0"/>
+              <a:t> IP </a:t>
+            </a:r>
+            <a:r>
+              <a:rPr lang="en-US" dirty="0" err="1"/>
+              <a:t>adressen</a:t>
+            </a:r>
+            <a:r>
+              <a:rPr lang="en-US" dirty="0"/>
+              <a:t> toe</a:t>
+            </a:r>
+          </a:p>
+          <a:p>
+            <a:pPr lvl="2"/>
+            <a:r>
+              <a:rPr lang="en-US" dirty="0"/>
+              <a:t>Range 192.168.0.11-192.168.0.30</a:t>
+            </a:r>
+            <a:endParaRPr lang="en-GB" dirty="0"/>
+          </a:p>
+        </p:txBody>
+      </p:sp>
+      <p:pic>
+        <p:nvPicPr>
+          <p:cNvPr id="8" name="Afbeelding 7">
+            <a:extLst>
+              <a:ext uri="{FF2B5EF4-FFF2-40B4-BE49-F238E27FC236}">
+                <a16:creationId xmlns:a16="http://schemas.microsoft.com/office/drawing/2014/main" id="{E1CFD1F6-84DD-442E-9D69-218889203520}"/>
+              </a:ext>
+            </a:extLst>
+          </p:cNvPr>
+          <p:cNvPicPr>
+            <a:picLocks noChangeAspect="1"/>
+          </p:cNvPicPr>
+          <p:nvPr/>
+        </p:nvPicPr>
+        <p:blipFill>
+          <a:blip r:embed="rId3"/>
+          <a:stretch>
+            <a:fillRect/>
+          </a:stretch>
+        </p:blipFill>
+        <p:spPr>
+          <a:xfrm>
+            <a:off x="2056973" y="4375115"/>
+            <a:ext cx="2791447" cy="2064173"/>
+          </a:xfrm>
+          <a:prstGeom prst="rect">
+            <a:avLst/>
+          </a:prstGeom>
+        </p:spPr>
+      </p:pic>
+    </p:spTree>
+    <p:extLst>
+      <p:ext uri="{BB962C8B-B14F-4D97-AF65-F5344CB8AC3E}">
+        <p14:creationId xmlns:p14="http://schemas.microsoft.com/office/powerpoint/2010/main" val="428323644"/>
+      </p:ext>
+    </p:extLst>
+  </p:cSld>
+  <p:clrMapOvr>
+    <a:masterClrMapping/>
+  </p:clrMapOvr>
+</p:sld>
+</file>
+
+<file path=ppt/slides/slide6.xml><?xml version="1.0" encoding="utf-8"?>
+<p:sld xmlns:a="http://schemas.openxmlformats.org/drawingml/2006/main" xmlns:r="http://schemas.openxmlformats.org/officeDocument/2006/relationships" xmlns:p="http://schemas.openxmlformats.org/presentationml/2006/main">
+  <p:cSld>
+    <p:spTree>
+      <p:nvGrpSpPr>
+        <p:cNvPr id="1" name=""/>
+        <p:cNvGrpSpPr/>
+        <p:nvPr/>
+      </p:nvGrpSpPr>
+      <p:grpSpPr>
+        <a:xfrm>
+          <a:off x="0" y="0"/>
+          <a:ext cx="0" cy="0"/>
+          <a:chOff x="0" y="0"/>
+          <a:chExt cx="0" cy="0"/>
+        </a:xfrm>
+      </p:grpSpPr>
+      <p:sp>
+        <p:nvSpPr>
+          <p:cNvPr id="2" name="Titel 1">
+            <a:extLst>
+              <a:ext uri="{FF2B5EF4-FFF2-40B4-BE49-F238E27FC236}">
+                <a16:creationId xmlns:a16="http://schemas.microsoft.com/office/drawing/2014/main" id="{B0140A3C-6353-4518-8780-7562CBEE03A8}"/>
+              </a:ext>
+            </a:extLst>
+          </p:cNvPr>
+          <p:cNvSpPr>
+            <a:spLocks noGrp="1"/>
+          </p:cNvSpPr>
+          <p:nvPr>
+            <p:ph type="title"/>
+          </p:nvPr>
+        </p:nvSpPr>
+        <p:spPr/>
+        <p:txBody>
+          <a:bodyPr/>
+          <a:lstStyle/>
+          <a:p>
+            <a:r>
+              <a:rPr lang="en-US" dirty="0"/>
+              <a:t>Webserver</a:t>
+            </a:r>
+            <a:endParaRPr lang="en-GB" dirty="0"/>
+          </a:p>
+        </p:txBody>
+      </p:sp>
+      <p:sp>
+        <p:nvSpPr>
+          <p:cNvPr id="3" name="Tijdelijke aanduiding voor dianummer 2">
+            <a:extLst>
+              <a:ext uri="{FF2B5EF4-FFF2-40B4-BE49-F238E27FC236}">
+                <a16:creationId xmlns:a16="http://schemas.microsoft.com/office/drawing/2014/main" id="{5399D340-6214-4DEE-87C6-C3D116496935}"/>
+              </a:ext>
+            </a:extLst>
+          </p:cNvPr>
+          <p:cNvSpPr>
+            <a:spLocks noGrp="1"/>
+          </p:cNvSpPr>
+          <p:nvPr>
+            <p:ph type="sldNum" sz="quarter" idx="12"/>
+          </p:nvPr>
+        </p:nvSpPr>
+        <p:spPr/>
+        <p:txBody>
+          <a:bodyPr/>
+          <a:lstStyle/>
+          <a:p>
+            <a:fld id="{0A297500-7527-634B-90F4-69D0994C32B4}" type="slidenum">
+              <a:rPr lang="nl-NL" smtClean="0"/>
+              <a:t>6</a:t>
+            </a:fld>
+            <a:endParaRPr lang="nl-NL"/>
+          </a:p>
+        </p:txBody>
+      </p:sp>
+    </p:spTree>
+    <p:extLst>
+      <p:ext uri="{BB962C8B-B14F-4D97-AF65-F5344CB8AC3E}">
+        <p14:creationId xmlns:p14="http://schemas.microsoft.com/office/powerpoint/2010/main" val="768515185"/>
+      </p:ext>
+    </p:extLst>
+  </p:cSld>
+  <p:clrMapOvr>
+    <a:masterClrMapping/>
+  </p:clrMapOvr>
+</p:sld>
+</file>
+
+<file path=ppt/slides/slide7.xml><?xml version="1.0" encoding="utf-8"?>
+<p:sld xmlns:a="http://schemas.openxmlformats.org/drawingml/2006/main" xmlns:r="http://schemas.openxmlformats.org/officeDocument/2006/relationships" xmlns:p="http://schemas.openxmlformats.org/presentationml/2006/main">
+  <p:cSld>
+    <p:spTree>
+      <p:nvGrpSpPr>
+        <p:cNvPr id="1" name=""/>
+        <p:cNvGrpSpPr/>
+        <p:nvPr/>
+      </p:nvGrpSpPr>
+      <p:grpSpPr>
+        <a:xfrm>
+          <a:off x="0" y="0"/>
+          <a:ext cx="0" cy="0"/>
+          <a:chOff x="0" y="0"/>
+          <a:chExt cx="0" cy="0"/>
+        </a:xfrm>
+      </p:grpSpPr>
+      <p:sp>
+        <p:nvSpPr>
+          <p:cNvPr id="2" name="Tijdelijke aanduiding voor dianummer 1">
+            <a:extLst>
+              <a:ext uri="{FF2B5EF4-FFF2-40B4-BE49-F238E27FC236}">
+                <a16:creationId xmlns:a16="http://schemas.microsoft.com/office/drawing/2014/main" id="{2814D35E-6492-47B0-A680-3BF74FA4281B}"/>
+              </a:ext>
+            </a:extLst>
+          </p:cNvPr>
+          <p:cNvSpPr>
+            <a:spLocks noGrp="1"/>
+          </p:cNvSpPr>
+          <p:nvPr>
+            <p:ph type="sldNum" sz="quarter" idx="12"/>
+          </p:nvPr>
+        </p:nvSpPr>
+        <p:spPr/>
+        <p:txBody>
+          <a:bodyPr/>
+          <a:lstStyle/>
+          <a:p>
+            <a:fld id="{0A297500-7527-634B-90F4-69D0994C32B4}" type="slidenum">
+              <a:rPr lang="nl-NL" smtClean="0"/>
+              <a:t>7</a:t>
+            </a:fld>
+            <a:endParaRPr lang="nl-NL"/>
+          </a:p>
+        </p:txBody>
+      </p:sp>
+      <p:sp>
+        <p:nvSpPr>
+          <p:cNvPr id="3" name="Titel 2">
+            <a:extLst>
+              <a:ext uri="{FF2B5EF4-FFF2-40B4-BE49-F238E27FC236}">
+                <a16:creationId xmlns:a16="http://schemas.microsoft.com/office/drawing/2014/main" id="{26664B4B-FDC1-4E7D-AD1C-0E43CC934520}"/>
+              </a:ext>
+            </a:extLst>
+          </p:cNvPr>
+          <p:cNvSpPr>
+            <a:spLocks noGrp="1"/>
+          </p:cNvSpPr>
+          <p:nvPr>
+            <p:ph type="title"/>
+          </p:nvPr>
+        </p:nvSpPr>
+        <p:spPr/>
+        <p:txBody>
+          <a:bodyPr/>
+          <a:lstStyle/>
+          <a:p>
+            <a:r>
+              <a:rPr lang="en-US" dirty="0"/>
+              <a:t>Webserver</a:t>
+            </a:r>
+            <a:endParaRPr lang="en-GB" dirty="0"/>
+          </a:p>
+        </p:txBody>
+      </p:sp>
+      <p:sp>
+        <p:nvSpPr>
+          <p:cNvPr id="4" name="Tekstvak 3">
+            <a:extLst>
+              <a:ext uri="{FF2B5EF4-FFF2-40B4-BE49-F238E27FC236}">
+                <a16:creationId xmlns:a16="http://schemas.microsoft.com/office/drawing/2014/main" id="{AD179944-9E03-4AFA-AC0E-F90FE1FD6E06}"/>
+              </a:ext>
+            </a:extLst>
+          </p:cNvPr>
+          <p:cNvSpPr txBox="1"/>
+          <p:nvPr/>
+        </p:nvSpPr>
+        <p:spPr>
+          <a:xfrm>
+            <a:off x="683581" y="1597981"/>
+            <a:ext cx="3935693" cy="1200329"/>
+          </a:xfrm>
+          <a:prstGeom prst="rect">
+            <a:avLst/>
+          </a:prstGeom>
+          <a:noFill/>
+        </p:spPr>
+        <p:txBody>
+          <a:bodyPr wrap="none" rtlCol="0">
+            <a:spAutoFit/>
+          </a:bodyPr>
+          <a:lstStyle/>
+          <a:p>
+            <a:pPr marL="285750" indent="-285750">
+              <a:buFont typeface="Arial" panose="020B0604020202020204" pitchFamily="34" charset="0"/>
+              <a:buChar char="•"/>
+            </a:pPr>
+            <a:r>
+              <a:rPr lang="en-US" dirty="0"/>
+              <a:t>Apache 2.4 server</a:t>
+            </a:r>
+          </a:p>
+          <a:p>
+            <a:pPr marL="285750" indent="-285750">
+              <a:buFont typeface="Arial" panose="020B0604020202020204" pitchFamily="34" charset="0"/>
+              <a:buChar char="•"/>
+            </a:pPr>
+            <a:r>
+              <a:rPr lang="en-US" dirty="0" err="1"/>
+              <a:t>Ondersteunt</a:t>
+            </a:r>
+            <a:r>
+              <a:rPr lang="en-US" dirty="0"/>
+              <a:t> PHP </a:t>
+            </a:r>
+            <a:r>
+              <a:rPr lang="en-US" dirty="0" err="1"/>
+              <a:t>en</a:t>
+            </a:r>
+            <a:r>
+              <a:rPr lang="en-US" dirty="0"/>
+              <a:t> HTML</a:t>
+            </a:r>
+          </a:p>
+          <a:p>
+            <a:pPr marL="285750" indent="-285750">
+              <a:buFont typeface="Arial" panose="020B0604020202020204" pitchFamily="34" charset="0"/>
+              <a:buChar char="•"/>
+            </a:pPr>
+            <a:r>
+              <a:rPr lang="en-US" dirty="0" err="1"/>
+              <a:t>Communicatie</a:t>
+            </a:r>
+            <a:r>
+              <a:rPr lang="en-US" dirty="0"/>
+              <a:t> met SQL database</a:t>
+            </a:r>
+          </a:p>
+          <a:p>
+            <a:pPr marL="285750" indent="-285750">
+              <a:buFont typeface="Arial" panose="020B0604020202020204" pitchFamily="34" charset="0"/>
+              <a:buChar char="•"/>
+            </a:pPr>
+            <a:endParaRPr lang="en-GB" dirty="0"/>
+          </a:p>
+        </p:txBody>
+      </p:sp>
+    </p:spTree>
+    <p:extLst>
+      <p:ext uri="{BB962C8B-B14F-4D97-AF65-F5344CB8AC3E}">
+        <p14:creationId xmlns:p14="http://schemas.microsoft.com/office/powerpoint/2010/main" val="2249152424"/>
+      </p:ext>
+    </p:extLst>
+  </p:cSld>
+  <p:clrMapOvr>
+    <a:masterClrMapping/>
+  </p:clrMapOvr>
+</p:sld>
+</file>
+
+<file path=ppt/slides/slide8.xml><?xml version="1.0" encoding="utf-8"?>
+<p:sld xmlns:a="http://schemas.openxmlformats.org/drawingml/2006/main" xmlns:r="http://schemas.openxmlformats.org/officeDocument/2006/relationships" xmlns:p="http://schemas.openxmlformats.org/presentationml/2006/main">
+  <p:cSld>
+    <p:spTree>
+      <p:nvGrpSpPr>
+        <p:cNvPr id="1" name=""/>
+        <p:cNvGrpSpPr/>
+        <p:nvPr/>
+      </p:nvGrpSpPr>
+      <p:grpSpPr>
+        <a:xfrm>
+          <a:off x="0" y="0"/>
+          <a:ext cx="0" cy="0"/>
+          <a:chOff x="0" y="0"/>
+          <a:chExt cx="0" cy="0"/>
+        </a:xfrm>
+      </p:grpSpPr>
+      <p:sp>
+        <p:nvSpPr>
+          <p:cNvPr id="2" name="Titel 1">
+            <a:extLst>
+              <a:ext uri="{FF2B5EF4-FFF2-40B4-BE49-F238E27FC236}">
+                <a16:creationId xmlns:a16="http://schemas.microsoft.com/office/drawing/2014/main" id="{120CE9BB-0668-47F4-8961-13464804C205}"/>
+              </a:ext>
+            </a:extLst>
+          </p:cNvPr>
+          <p:cNvSpPr>
+            <a:spLocks noGrp="1"/>
+          </p:cNvSpPr>
+          <p:nvPr>
+            <p:ph type="title"/>
+          </p:nvPr>
+        </p:nvSpPr>
+        <p:spPr/>
+        <p:txBody>
+          <a:bodyPr/>
+          <a:lstStyle/>
+          <a:p>
+            <a:r>
+              <a:rPr lang="en-US" dirty="0"/>
+              <a:t>SQL Database</a:t>
+            </a:r>
+            <a:endParaRPr lang="en-GB" dirty="0"/>
+          </a:p>
+        </p:txBody>
+      </p:sp>
+      <p:sp>
+        <p:nvSpPr>
+          <p:cNvPr id="3" name="Tijdelijke aanduiding voor dianummer 2">
+            <a:extLst>
+              <a:ext uri="{FF2B5EF4-FFF2-40B4-BE49-F238E27FC236}">
+                <a16:creationId xmlns:a16="http://schemas.microsoft.com/office/drawing/2014/main" id="{7FACA743-2D28-4041-8B71-38EA3F698412}"/>
+              </a:ext>
+            </a:extLst>
+          </p:cNvPr>
+          <p:cNvSpPr>
+            <a:spLocks noGrp="1"/>
+          </p:cNvSpPr>
+          <p:nvPr>
+            <p:ph type="sldNum" sz="quarter" idx="12"/>
+          </p:nvPr>
+        </p:nvSpPr>
+        <p:spPr/>
+        <p:txBody>
+          <a:bodyPr/>
+          <a:lstStyle/>
+          <a:p>
+            <a:fld id="{0A297500-7527-634B-90F4-69D0994C32B4}" type="slidenum">
+              <a:rPr lang="nl-NL" smtClean="0"/>
+              <a:t>8</a:t>
+            </a:fld>
+            <a:endParaRPr lang="nl-NL"/>
+          </a:p>
+        </p:txBody>
+      </p:sp>
+    </p:spTree>
+    <p:extLst>
+      <p:ext uri="{BB962C8B-B14F-4D97-AF65-F5344CB8AC3E}">
+        <p14:creationId xmlns:p14="http://schemas.microsoft.com/office/powerpoint/2010/main" val="1788705179"/>
       </p:ext>
     </p:extLst>
   </p:cSld>

</xml_diff>

<commit_message>
added copy of serial output
</commit_message>
<xml_diff>
--- a/Documentation/Presentatie.pptx
+++ b/Documentation/Presentatie.pptx
@@ -6,10 +6,10 @@
     <p:sldMasterId id="2147483694" r:id="rId2"/>
   </p:sldMasterIdLst>
   <p:notesMasterIdLst>
-    <p:notesMasterId r:id="rId39"/>
+    <p:notesMasterId r:id="rId40"/>
   </p:notesMasterIdLst>
   <p:handoutMasterIdLst>
-    <p:handoutMasterId r:id="rId40"/>
+    <p:handoutMasterId r:id="rId41"/>
   </p:handoutMasterIdLst>
   <p:sldIdLst>
     <p:sldId id="261" r:id="rId3"/>
@@ -32,22 +32,23 @@
     <p:sldId id="288" r:id="rId20"/>
     <p:sldId id="274" r:id="rId21"/>
     <p:sldId id="275" r:id="rId22"/>
-    <p:sldId id="279" r:id="rId23"/>
-    <p:sldId id="280" r:id="rId24"/>
-    <p:sldId id="266" r:id="rId25"/>
-    <p:sldId id="264" r:id="rId26"/>
-    <p:sldId id="295" r:id="rId27"/>
-    <p:sldId id="268" r:id="rId28"/>
-    <p:sldId id="294" r:id="rId29"/>
-    <p:sldId id="277" r:id="rId30"/>
-    <p:sldId id="278" r:id="rId31"/>
-    <p:sldId id="262" r:id="rId32"/>
-    <p:sldId id="292" r:id="rId33"/>
-    <p:sldId id="296" r:id="rId34"/>
-    <p:sldId id="297" r:id="rId35"/>
-    <p:sldId id="298" r:id="rId36"/>
-    <p:sldId id="299" r:id="rId37"/>
-    <p:sldId id="300" r:id="rId38"/>
+    <p:sldId id="301" r:id="rId23"/>
+    <p:sldId id="279" r:id="rId24"/>
+    <p:sldId id="280" r:id="rId25"/>
+    <p:sldId id="266" r:id="rId26"/>
+    <p:sldId id="264" r:id="rId27"/>
+    <p:sldId id="295" r:id="rId28"/>
+    <p:sldId id="268" r:id="rId29"/>
+    <p:sldId id="294" r:id="rId30"/>
+    <p:sldId id="277" r:id="rId31"/>
+    <p:sldId id="278" r:id="rId32"/>
+    <p:sldId id="262" r:id="rId33"/>
+    <p:sldId id="292" r:id="rId34"/>
+    <p:sldId id="296" r:id="rId35"/>
+    <p:sldId id="297" r:id="rId36"/>
+    <p:sldId id="298" r:id="rId37"/>
+    <p:sldId id="299" r:id="rId38"/>
+    <p:sldId id="300" r:id="rId39"/>
   </p:sldIdLst>
   <p:sldSz cx="12192000" cy="6858000"/>
   <p:notesSz cx="6858000" cy="9144000"/>
@@ -239,7 +240,7 @@
           <a:p>
             <a:fld id="{8F591CCF-F6FD-734B-854A-5BC033593B1E}" type="datetimeFigureOut">
               <a:rPr lang="nl-NL" smtClean="0"/>
-              <a:t>20-5-2019</a:t>
+              <a:t>21-5-2019</a:t>
             </a:fld>
             <a:endParaRPr lang="nl-NL"/>
           </a:p>
@@ -404,7 +405,7 @@
           <a:p>
             <a:fld id="{23C66214-DB21-4647-B5DA-0D17CA592867}" type="datetimeFigureOut">
               <a:rPr lang="nl-NL" smtClean="0"/>
-              <a:t>20-5-2019</a:t>
+              <a:t>21-5-2019</a:t>
             </a:fld>
             <a:endParaRPr lang="nl-NL"/>
           </a:p>
@@ -1105,7 +1106,7 @@
           <a:p>
             <a:fld id="{EA3A7081-D270-4FBF-AE40-A52D674243CC}" type="datetime1">
               <a:rPr lang="nl-BE" smtClean="0"/>
-              <a:t>20/05/2019</a:t>
+              <a:t>21/05/2019</a:t>
             </a:fld>
             <a:endParaRPr lang="nl-NL"/>
           </a:p>
@@ -1366,7 +1367,7 @@
           <a:p>
             <a:fld id="{5C69415A-EEF6-439C-A913-189A8C067023}" type="datetime1">
               <a:rPr lang="nl-BE" smtClean="0"/>
-              <a:t>20/05/2019</a:t>
+              <a:t>21/05/2019</a:t>
             </a:fld>
             <a:endParaRPr lang="nl-NL"/>
           </a:p>
@@ -1956,7 +1957,7 @@
           <a:p>
             <a:fld id="{EA3A7081-D270-4FBF-AE40-A52D674243CC}" type="datetime1">
               <a:rPr lang="nl-BE" smtClean="0"/>
-              <a:t>20/05/2019</a:t>
+              <a:t>21/05/2019</a:t>
             </a:fld>
             <a:endParaRPr lang="nl-NL"/>
           </a:p>
@@ -2217,7 +2218,7 @@
           <a:p>
             <a:fld id="{5C69415A-EEF6-439C-A913-189A8C067023}" type="datetime1">
               <a:rPr lang="nl-BE" smtClean="0"/>
-              <a:t>20/05/2019</a:t>
+              <a:t>21/05/2019</a:t>
             </a:fld>
             <a:endParaRPr lang="nl-NL"/>
           </a:p>
@@ -2525,7 +2526,7 @@
           <a:p>
             <a:fld id="{AA7DF125-8D2F-407C-A946-0B214A077F46}" type="datetime1">
               <a:rPr lang="nl-BE" smtClean="0"/>
-              <a:t>20/05/2019</a:t>
+              <a:t>21/05/2019</a:t>
             </a:fld>
             <a:endParaRPr lang="nl-NL"/>
           </a:p>
@@ -2822,7 +2823,7 @@
           <a:p>
             <a:fld id="{FE566779-A426-4C6E-B33F-12BA9B572EC4}" type="datetime1">
               <a:rPr lang="nl-BE" smtClean="0"/>
-              <a:t>20/05/2019</a:t>
+              <a:t>21/05/2019</a:t>
             </a:fld>
             <a:endParaRPr lang="nl-NL" dirty="0"/>
           </a:p>
@@ -3121,7 +3122,7 @@
           <a:p>
             <a:fld id="{E40DF61B-1080-4D20-8EAC-F5AC55182461}" type="datetime1">
               <a:rPr lang="nl-BE" smtClean="0"/>
-              <a:t>20/05/2019</a:t>
+              <a:t>21/05/2019</a:t>
             </a:fld>
             <a:endParaRPr lang="nl-NL" dirty="0"/>
           </a:p>
@@ -3241,7 +3242,7 @@
           <a:p>
             <a:fld id="{94A4F625-24B7-4F40-98BC-AFA043082CE9}" type="datetime1">
               <a:rPr lang="nl-BE" smtClean="0"/>
-              <a:t>20/05/2019</a:t>
+              <a:t>21/05/2019</a:t>
             </a:fld>
             <a:endParaRPr lang="nl-NL"/>
           </a:p>
@@ -3703,7 +3704,7 @@
           <a:p>
             <a:fld id="{292342B6-1303-46D4-9581-5E95FC0B22E4}" type="datetime1">
               <a:rPr lang="nl-BE" smtClean="0"/>
-              <a:t>20/05/2019</a:t>
+              <a:t>21/05/2019</a:t>
             </a:fld>
             <a:endParaRPr lang="nl-NL" dirty="0"/>
           </a:p>
@@ -3802,7 +3803,7 @@
           <a:p>
             <a:fld id="{A76F3976-FDFC-4D8C-ACD3-BCE6A597C36A}" type="datetime1">
               <a:rPr lang="nl-BE" smtClean="0"/>
-              <a:t>20/05/2019</a:t>
+              <a:t>21/05/2019</a:t>
             </a:fld>
             <a:endParaRPr lang="nl-NL"/>
           </a:p>
@@ -3901,7 +3902,7 @@
           <a:p>
             <a:fld id="{5ADFEA79-DE61-4EF0-8C65-B83CEE2687EB}" type="datetime1">
               <a:rPr lang="nl-BE" smtClean="0"/>
-              <a:t>20/05/2019</a:t>
+              <a:t>21/05/2019</a:t>
             </a:fld>
             <a:endParaRPr lang="nl-NL"/>
           </a:p>
@@ -4061,7 +4062,7 @@
           <a:p>
             <a:fld id="{FA2EC5B9-2DE2-43DC-AAE2-5679419BAC4A}" type="datetime1">
               <a:rPr lang="nl-BE" smtClean="0"/>
-              <a:t>20/05/2019</a:t>
+              <a:t>21/05/2019</a:t>
             </a:fld>
             <a:endParaRPr lang="nl-NL" dirty="0"/>
           </a:p>
@@ -4323,7 +4324,7 @@
           <a:p>
             <a:fld id="{BB46EC33-4D1A-4426-91DF-270C2E654CCE}" type="datetime1">
               <a:rPr lang="nl-BE" smtClean="0"/>
-              <a:t>20/05/2019</a:t>
+              <a:t>21/05/2019</a:t>
             </a:fld>
             <a:endParaRPr lang="nl-NL" dirty="0"/>
           </a:p>
@@ -5059,7 +5060,7 @@
           <a:p>
             <a:fld id="{48C250A7-EEA6-4BD5-AB95-D7BF57F3506B}" type="datetime1">
               <a:rPr lang="nl-BE" smtClean="0"/>
-              <a:t>20/05/2019</a:t>
+              <a:t>21/05/2019</a:t>
             </a:fld>
             <a:endParaRPr lang="nl-NL" dirty="0"/>
           </a:p>
@@ -5734,7 +5735,7 @@
         </p:blipFill>
         <p:spPr>
           <a:xfrm>
-            <a:off x="2720153" y="-1969690"/>
+            <a:off x="2821753" y="-1799635"/>
             <a:ext cx="1825895" cy="1825895"/>
           </a:xfrm>
           <a:prstGeom prst="rect">
@@ -5916,7 +5917,7 @@
           <a:lstStyle/>
           <a:p>
             <a:pPr algn="ctr"/>
-            <a:endParaRPr lang="en-US"/>
+            <a:endParaRPr lang="en-US" dirty="0"/>
           </a:p>
         </p:txBody>
       </p:sp>
@@ -5969,13 +5970,13 @@
   <p:clrMapOvr>
     <a:masterClrMapping/>
   </p:clrMapOvr>
-  <mc:AlternateContent xmlns:mc="http://schemas.openxmlformats.org/markup-compatibility/2006">
-    <mc:Choice xmlns:p159="http://schemas.microsoft.com/office/powerpoint/2015/09/main" Requires="p159">
+  <mc:AlternateContent xmlns:mc="http://schemas.openxmlformats.org/markup-compatibility/2006" xmlns:p159="http://schemas.microsoft.com/office/powerpoint/2015/09/main">
+    <mc:Choice Requires="p159">
       <p:transition xmlns:p14="http://schemas.microsoft.com/office/powerpoint/2010/main" spd="slow" p14:dur="2000">
         <p159:morph option="byObject"/>
       </p:transition>
     </mc:Choice>
-    <mc:Fallback>
+    <mc:Fallback xmlns="">
       <p:transition spd="slow">
         <p:fade/>
       </p:transition>
@@ -6121,7 +6122,7 @@
                                     <p:cond delay="0"/>
                                   </p:stCondLst>
                                   <p:childTnLst>
-                                    <p:animMotion origin="layout" path="M 3.33333E-6 -3.33333E-6 L 3.33333E-6 0.55834 " pathEditMode="relative" rAng="0" ptsTypes="AA">
+                                    <p:animMotion origin="layout" path="M 0 -3.33333E-6 L 0 0.55834 " pathEditMode="relative" rAng="0" ptsTypes="AA">
                                       <p:cBhvr>
                                         <p:cTn id="15" dur="500" fill="hold"/>
                                         <p:tgtEl>
@@ -6188,7 +6189,7 @@
                                     <p:cond delay="0"/>
                                   </p:stCondLst>
                                   <p:childTnLst>
-                                    <p:animMotion origin="layout" path="M 3.75E-6 0.55833 L -0.17943 0.55648 " pathEditMode="relative" rAng="0" ptsTypes="AA">
+                                    <p:animMotion origin="layout" path="M 0 0.55834 L -0.17943 0.55648 " pathEditMode="relative" rAng="0" ptsTypes="AA">
                                       <p:cBhvr>
                                         <p:cTn id="21" dur="1000" fill="hold"/>
                                         <p:tgtEl>
@@ -6199,7 +6200,7 @@
                                           <p:attrName>ppt_y</p:attrName>
                                         </p:attrNameLst>
                                       </p:cBhvr>
-                                      <p:rCtr x="-8958" y="116"/>
+                                      <p:rCtr x="-8971" y="-93"/>
                                     </p:animMotion>
                                   </p:childTnLst>
                                 </p:cTn>
@@ -6914,13 +6915,13 @@
   <p:clrMapOvr>
     <a:masterClrMapping/>
   </p:clrMapOvr>
-  <mc:AlternateContent xmlns:mc="http://schemas.openxmlformats.org/markup-compatibility/2006">
-    <mc:Choice xmlns:p159="http://schemas.microsoft.com/office/powerpoint/2015/09/main" Requires="p159">
+  <mc:AlternateContent xmlns:mc="http://schemas.openxmlformats.org/markup-compatibility/2006" xmlns:p159="http://schemas.microsoft.com/office/powerpoint/2015/09/main">
+    <mc:Choice Requires="p159">
       <p:transition xmlns:p14="http://schemas.microsoft.com/office/powerpoint/2010/main" spd="slow" p14:dur="2000">
         <p159:morph option="byObject"/>
       </p:transition>
     </mc:Choice>
-    <mc:Fallback>
+    <mc:Fallback xmlns="">
       <p:transition spd="slow">
         <p:fade/>
       </p:transition>
@@ -8210,7 +8211,7 @@
         </p:blipFill>
         <p:spPr>
           <a:xfrm>
-            <a:off x="2720153" y="-1969690"/>
+            <a:off x="2720153" y="-1825895"/>
             <a:ext cx="1825895" cy="1825895"/>
           </a:xfrm>
           <a:prstGeom prst="rect">
@@ -8443,13 +8444,13 @@
   <p:clrMapOvr>
     <a:masterClrMapping/>
   </p:clrMapOvr>
-  <mc:AlternateContent xmlns:mc="http://schemas.openxmlformats.org/markup-compatibility/2006">
-    <mc:Choice xmlns:p159="http://schemas.microsoft.com/office/powerpoint/2015/09/main" Requires="p159">
+  <mc:AlternateContent xmlns:mc="http://schemas.openxmlformats.org/markup-compatibility/2006" xmlns:p159="http://schemas.microsoft.com/office/powerpoint/2015/09/main">
+    <mc:Choice Requires="p159">
       <p:transition xmlns:p14="http://schemas.microsoft.com/office/powerpoint/2010/main" spd="slow" p14:dur="2000">
         <p159:morph option="byObject"/>
       </p:transition>
     </mc:Choice>
-    <mc:Fallback>
+    <mc:Fallback xmlns="">
       <p:transition spd="slow">
         <p:fade/>
       </p:transition>
@@ -8595,7 +8596,7 @@
                                     <p:cond delay="0"/>
                                   </p:stCondLst>
                                   <p:childTnLst>
-                                    <p:animMotion origin="layout" path="M 3.33333E-6 -3.33333E-6 L 3.33333E-6 0.55834 " pathEditMode="relative" rAng="0" ptsTypes="AA">
+                                    <p:animMotion origin="layout" path="M 3.33333E-6 1.85185E-6 L 3.33333E-6 0.55833 " pathEditMode="relative" rAng="0" ptsTypes="AA">
                                       <p:cBhvr>
                                         <p:cTn id="15" dur="500" fill="hold"/>
                                         <p:tgtEl>
@@ -8662,7 +8663,7 @@
                                     <p:cond delay="0"/>
                                   </p:stCondLst>
                                   <p:childTnLst>
-                                    <p:animMotion origin="layout" path="M 3.75E-6 0.55833 L -0.17943 0.55648 " pathEditMode="relative" rAng="0" ptsTypes="AA">
+                                    <p:animMotion origin="layout" path="M 3.33333E-6 0.55833 L -0.17943 0.55648 " pathEditMode="relative" rAng="0" ptsTypes="AA">
                                       <p:cBhvr>
                                         <p:cTn id="21" dur="1000" fill="hold"/>
                                         <p:tgtEl>
@@ -8673,7 +8674,7 @@
                                           <p:attrName>ppt_y</p:attrName>
                                         </p:attrNameLst>
                                       </p:cBhvr>
-                                      <p:rCtr x="-8958" y="116"/>
+                                      <p:rCtr x="-8971" y="-93"/>
                                     </p:animMotion>
                                   </p:childTnLst>
                                 </p:cTn>
@@ -9391,13 +9392,13 @@
   <p:clrMapOvr>
     <a:masterClrMapping/>
   </p:clrMapOvr>
-  <mc:AlternateContent xmlns:mc="http://schemas.openxmlformats.org/markup-compatibility/2006">
-    <mc:Choice xmlns:p159="http://schemas.microsoft.com/office/powerpoint/2015/09/main" Requires="p159">
+  <mc:AlternateContent xmlns:mc="http://schemas.openxmlformats.org/markup-compatibility/2006" xmlns:p159="http://schemas.microsoft.com/office/powerpoint/2015/09/main">
+    <mc:Choice Requires="p159">
       <p:transition xmlns:p14="http://schemas.microsoft.com/office/powerpoint/2010/main" spd="slow" p14:dur="2000">
         <p159:morph option="byObject"/>
       </p:transition>
     </mc:Choice>
-    <mc:Fallback>
+    <mc:Fallback xmlns="">
       <p:transition spd="slow">
         <p:fade/>
       </p:transition>
@@ -9591,6 +9592,76 @@
           </a:p>
         </p:txBody>
       </p:sp>
+      <p:sp>
+        <p:nvSpPr>
+          <p:cNvPr id="2" name="TextBox 1">
+            <a:extLst>
+              <a:ext uri="{FF2B5EF4-FFF2-40B4-BE49-F238E27FC236}">
+                <a16:creationId xmlns:a16="http://schemas.microsoft.com/office/drawing/2014/main" id="{67BED009-E8B1-48E9-A901-21B8AED54633}"/>
+              </a:ext>
+            </a:extLst>
+          </p:cNvPr>
+          <p:cNvSpPr txBox="1"/>
+          <p:nvPr/>
+        </p:nvSpPr>
+        <p:spPr>
+          <a:xfrm>
+            <a:off x="428368" y="1812324"/>
+            <a:ext cx="2026508" cy="2553730"/>
+          </a:xfrm>
+          <a:prstGeom prst="rect">
+            <a:avLst/>
+          </a:prstGeom>
+          <a:solidFill>
+            <a:schemeClr val="bg1"/>
+          </a:solidFill>
+        </p:spPr>
+        <p:txBody>
+          <a:bodyPr wrap="square" rtlCol="0">
+            <a:spAutoFit/>
+          </a:bodyPr>
+          <a:lstStyle/>
+          <a:p>
+            <a:endParaRPr lang="en-US" dirty="0"/>
+          </a:p>
+        </p:txBody>
+      </p:sp>
+      <p:pic>
+        <p:nvPicPr>
+          <p:cNvPr id="6" name="Graphic 5" descr="Database">
+            <a:extLst>
+              <a:ext uri="{FF2B5EF4-FFF2-40B4-BE49-F238E27FC236}">
+                <a16:creationId xmlns:a16="http://schemas.microsoft.com/office/drawing/2014/main" id="{A2BCA840-ED31-4900-81AB-5E8CEFBA1E3C}"/>
+              </a:ext>
+            </a:extLst>
+          </p:cNvPr>
+          <p:cNvPicPr>
+            <a:picLocks noChangeAspect="1"/>
+          </p:cNvPicPr>
+          <p:nvPr/>
+        </p:nvPicPr>
+        <p:blipFill>
+          <a:blip r:embed="rId3">
+            <a:extLst>
+              <a:ext uri="{96DAC541-7B7A-43D3-8B79-37D633B846F1}">
+                <asvg:svgBlip xmlns:asvg="http://schemas.microsoft.com/office/drawing/2016/SVG/main" r:embed="rId4"/>
+              </a:ext>
+            </a:extLst>
+          </a:blip>
+          <a:stretch>
+            <a:fillRect/>
+          </a:stretch>
+        </p:blipFill>
+        <p:spPr>
+          <a:xfrm>
+            <a:off x="428368" y="2234170"/>
+            <a:ext cx="2095337" cy="2095337"/>
+          </a:xfrm>
+          <a:prstGeom prst="rect">
+            <a:avLst/>
+          </a:prstGeom>
+        </p:spPr>
+      </p:pic>
     </p:spTree>
     <p:extLst>
       <p:ext uri="{BB962C8B-B14F-4D97-AF65-F5344CB8AC3E}">
@@ -9678,7 +9749,7 @@
         </p:blipFill>
         <p:spPr>
           <a:xfrm>
-            <a:off x="2720153" y="-1969690"/>
+            <a:off x="2720153" y="-1901957"/>
             <a:ext cx="1825895" cy="1825895"/>
           </a:xfrm>
           <a:prstGeom prst="rect">
@@ -9924,13 +9995,13 @@
   <p:clrMapOvr>
     <a:masterClrMapping/>
   </p:clrMapOvr>
-  <mc:AlternateContent xmlns:mc="http://schemas.openxmlformats.org/markup-compatibility/2006">
-    <mc:Choice xmlns:p159="http://schemas.microsoft.com/office/powerpoint/2015/09/main" Requires="p159">
+  <mc:AlternateContent xmlns:mc="http://schemas.openxmlformats.org/markup-compatibility/2006" xmlns:p159="http://schemas.microsoft.com/office/powerpoint/2015/09/main">
+    <mc:Choice Requires="p159">
       <p:transition xmlns:p14="http://schemas.microsoft.com/office/powerpoint/2010/main" spd="slow" p14:dur="2000">
         <p159:morph option="byObject"/>
       </p:transition>
     </mc:Choice>
-    <mc:Fallback>
+    <mc:Fallback xmlns="">
       <p:transition spd="slow">
         <p:fade/>
       </p:transition>
@@ -10076,7 +10147,7 @@
                                     <p:cond delay="0"/>
                                   </p:stCondLst>
                                   <p:childTnLst>
-                                    <p:animMotion origin="layout" path="M 3.33333E-6 -3.33333E-6 L 3.33333E-6 0.55834 " pathEditMode="relative" rAng="0" ptsTypes="AA">
+                                    <p:animMotion origin="layout" path="M 3.33333E-6 2.96296E-6 L 3.33333E-6 0.55833 " pathEditMode="relative" rAng="0" ptsTypes="AA">
                                       <p:cBhvr>
                                         <p:cTn id="15" dur="500" fill="hold"/>
                                         <p:tgtEl>
@@ -10143,7 +10214,7 @@
                                     <p:cond delay="0"/>
                                   </p:stCondLst>
                                   <p:childTnLst>
-                                    <p:animMotion origin="layout" path="M 3.75E-6 0.55833 L -0.17943 0.55648 " pathEditMode="relative" rAng="0" ptsTypes="AA">
+                                    <p:animMotion origin="layout" path="M 3.33333E-6 0.55833 L -0.17943 0.55648 " pathEditMode="relative" rAng="0" ptsTypes="AA">
                                       <p:cBhvr>
                                         <p:cTn id="21" dur="1000" fill="hold"/>
                                         <p:tgtEl>
@@ -10154,7 +10225,7 @@
                                           <p:attrName>ppt_y</p:attrName>
                                         </p:attrNameLst>
                                       </p:cBhvr>
-                                      <p:rCtr x="-8958" y="116"/>
+                                      <p:rCtr x="-8971" y="-93"/>
                                     </p:animMotion>
                                   </p:childTnLst>
                                 </p:cTn>
@@ -10304,7 +10375,12 @@
             <p:ph idx="1"/>
           </p:nvPr>
         </p:nvSpPr>
-        <p:spPr/>
+        <p:spPr>
+          <a:xfrm>
+            <a:off x="576000" y="1656000"/>
+            <a:ext cx="11041200" cy="2059265"/>
+          </a:xfrm>
+        </p:spPr>
         <p:txBody>
           <a:bodyPr/>
           <a:lstStyle/>
@@ -10314,46 +10390,14 @@
             </a:pPr>
             <a:r>
               <a:rPr lang="nl-BE" dirty="0"/>
-              <a:t> - </a:t>
-            </a:r>
-            <a:r>
-              <a:rPr lang="nl-BE" dirty="0" err="1"/>
-              <a:t>init</a:t>
-            </a:r>
-            <a:r>
-              <a:rPr lang="nl-BE" dirty="0"/>
-              <a:t> ()	</a:t>
+              <a:t> - init ()	</a:t>
             </a:r>
             <a:r>
               <a:rPr lang="nl-BE" dirty="0">
                 <a:sym typeface="Wingdings" panose="05000000000000000000" pitchFamily="2" charset="2"/>
               </a:rPr>
-              <a:t> verbinding maken met </a:t>
-            </a:r>
-            <a:r>
-              <a:rPr lang="nl-BE" dirty="0" err="1">
-                <a:sym typeface="Wingdings" panose="05000000000000000000" pitchFamily="2" charset="2"/>
-              </a:rPr>
-              <a:t>raspberry</a:t>
-            </a:r>
-            <a:r>
-              <a:rPr lang="nl-BE" dirty="0">
-                <a:sym typeface="Wingdings" panose="05000000000000000000" pitchFamily="2" charset="2"/>
-              </a:rPr>
-              <a:t> pi</a:t>
-            </a:r>
-            <a:endParaRPr lang="nl-BE" dirty="0"/>
-          </a:p>
-          <a:p>
-            <a:pPr marL="0" indent="0">
-              <a:buNone/>
-            </a:pPr>
-            <a:endParaRPr lang="nl-BE" dirty="0"/>
-          </a:p>
-          <a:p>
-            <a:pPr marL="0" indent="0">
-              <a:buNone/>
-            </a:pPr>
+              <a:t> verbinding maken met raspberry pi</a:t>
+            </a:r>
             <a:endParaRPr lang="nl-BE" dirty="0"/>
           </a:p>
           <a:p>
@@ -10475,6 +10519,287 @@
 </file>
 
 <file path=ppt/slides/slide21.xml><?xml version="1.0" encoding="utf-8"?>
+<p:sld xmlns:a="http://schemas.openxmlformats.org/drawingml/2006/main" xmlns:r="http://schemas.openxmlformats.org/officeDocument/2006/relationships" xmlns:p="http://schemas.openxmlformats.org/presentationml/2006/main">
+  <p:cSld>
+    <p:spTree>
+      <p:nvGrpSpPr>
+        <p:cNvPr id="1" name=""/>
+        <p:cNvGrpSpPr/>
+        <p:nvPr/>
+      </p:nvGrpSpPr>
+      <p:grpSpPr>
+        <a:xfrm>
+          <a:off x="0" y="0"/>
+          <a:ext cx="0" cy="0"/>
+          <a:chOff x="0" y="0"/>
+          <a:chExt cx="0" cy="0"/>
+        </a:xfrm>
+      </p:grpSpPr>
+      <p:sp>
+        <p:nvSpPr>
+          <p:cNvPr id="3" name="Tijdelijke aanduiding voor dianummer 2">
+            <a:extLst>
+              <a:ext uri="{FF2B5EF4-FFF2-40B4-BE49-F238E27FC236}">
+                <a16:creationId xmlns:a16="http://schemas.microsoft.com/office/drawing/2014/main" id="{4A9A4CFB-EC1A-48C9-8208-68595D326643}"/>
+              </a:ext>
+            </a:extLst>
+          </p:cNvPr>
+          <p:cNvSpPr>
+            <a:spLocks noGrp="1"/>
+          </p:cNvSpPr>
+          <p:nvPr>
+            <p:ph type="sldNum" sz="quarter" idx="12"/>
+          </p:nvPr>
+        </p:nvSpPr>
+        <p:spPr/>
+        <p:txBody>
+          <a:bodyPr/>
+          <a:lstStyle/>
+          <a:p>
+            <a:fld id="{0A297500-7527-634B-90F4-69D0994C32B4}" type="slidenum">
+              <a:rPr lang="nl-NL" smtClean="0"/>
+              <a:t>21</a:t>
+            </a:fld>
+            <a:endParaRPr lang="nl-NL"/>
+          </a:p>
+        </p:txBody>
+      </p:sp>
+      <p:sp>
+        <p:nvSpPr>
+          <p:cNvPr id="4" name="Titel 3">
+            <a:extLst>
+              <a:ext uri="{FF2B5EF4-FFF2-40B4-BE49-F238E27FC236}">
+                <a16:creationId xmlns:a16="http://schemas.microsoft.com/office/drawing/2014/main" id="{1E997253-E447-4A71-9C27-27B7BDD3E197}"/>
+              </a:ext>
+            </a:extLst>
+          </p:cNvPr>
+          <p:cNvSpPr>
+            <a:spLocks noGrp="1"/>
+          </p:cNvSpPr>
+          <p:nvPr>
+            <p:ph type="title"/>
+          </p:nvPr>
+        </p:nvSpPr>
+        <p:spPr/>
+        <p:txBody>
+          <a:bodyPr/>
+          <a:lstStyle/>
+          <a:p>
+            <a:pPr algn="ctr"/>
+            <a:r>
+              <a:rPr lang="nl-BE" dirty="0"/>
+              <a:t>Communicatie</a:t>
+            </a:r>
+            <a:endParaRPr lang="en-IE" dirty="0"/>
+          </a:p>
+        </p:txBody>
+      </p:sp>
+      <p:sp>
+        <p:nvSpPr>
+          <p:cNvPr id="5" name="TextBox 4">
+            <a:extLst>
+              <a:ext uri="{FF2B5EF4-FFF2-40B4-BE49-F238E27FC236}">
+                <a16:creationId xmlns:a16="http://schemas.microsoft.com/office/drawing/2014/main" id="{0C8409C8-A8C3-4362-AE07-D3A0E055BE25}"/>
+              </a:ext>
+            </a:extLst>
+          </p:cNvPr>
+          <p:cNvSpPr txBox="1"/>
+          <p:nvPr/>
+        </p:nvSpPr>
+        <p:spPr>
+          <a:xfrm>
+            <a:off x="669133" y="1084191"/>
+            <a:ext cx="11041200" cy="5262979"/>
+          </a:xfrm>
+          <a:prstGeom prst="rect">
+            <a:avLst/>
+          </a:prstGeom>
+          <a:noFill/>
+        </p:spPr>
+        <p:txBody>
+          <a:bodyPr wrap="square" rtlCol="0">
+            <a:spAutoFit/>
+          </a:bodyPr>
+          <a:lstStyle/>
+          <a:p>
+            <a:r>
+              <a:rPr lang="en-US" sz="1400" dirty="0"/>
+              <a:t>HTTP/1.1 200 OK</a:t>
+            </a:r>
+          </a:p>
+          <a:p>
+            <a:r>
+              <a:rPr lang="en-US" sz="1400" dirty="0"/>
+              <a:t>Date: Tue, 21 May 2019 06:38:06 GMT</a:t>
+            </a:r>
+          </a:p>
+          <a:p>
+            <a:r>
+              <a:rPr lang="en-US" sz="1400" dirty="0"/>
+              <a:t>Server: Apache/2.4.25 (Raspbian)</a:t>
+            </a:r>
+          </a:p>
+          <a:p>
+            <a:r>
+              <a:rPr lang="en-US" sz="1400" dirty="0"/>
+              <a:t>Set-Cookie: PHPSESSID=2qnnn1tlno980hr1abhuoq49f3; path=/</a:t>
+            </a:r>
+          </a:p>
+          <a:p>
+            <a:r>
+              <a:rPr lang="en-US" sz="1400" dirty="0"/>
+              <a:t>Expires: Thu, 19 Nov 1981 08:52:00 GMT</a:t>
+            </a:r>
+          </a:p>
+          <a:p>
+            <a:r>
+              <a:rPr lang="en-US" sz="1400" dirty="0"/>
+              <a:t>Cache-Control: no-store, no-cache, must-revalidate</a:t>
+            </a:r>
+          </a:p>
+          <a:p>
+            <a:r>
+              <a:rPr lang="en-US" sz="1400" dirty="0"/>
+              <a:t>Pragma: no-cache</a:t>
+            </a:r>
+          </a:p>
+          <a:p>
+            <a:r>
+              <a:rPr lang="en-US" sz="1400" dirty="0"/>
+              <a:t>Vary: Accept-Encoding</a:t>
+            </a:r>
+          </a:p>
+          <a:p>
+            <a:r>
+              <a:rPr lang="en-US" sz="1400" dirty="0"/>
+              <a:t>Content-Length: 276</a:t>
+            </a:r>
+          </a:p>
+          <a:p>
+            <a:r>
+              <a:rPr lang="en-US" sz="1400" dirty="0"/>
+              <a:t>Connection: close</a:t>
+            </a:r>
+          </a:p>
+          <a:p>
+            <a:r>
+              <a:rPr lang="en-US" sz="1400" dirty="0"/>
+              <a:t>Content-Type: text/html; charset=UTF-8</a:t>
+            </a:r>
+          </a:p>
+          <a:p>
+            <a:endParaRPr lang="en-US" sz="1400" dirty="0"/>
+          </a:p>
+          <a:p>
+            <a:endParaRPr lang="en-US" sz="1400" dirty="0"/>
+          </a:p>
+          <a:p>
+            <a:endParaRPr lang="en-US" sz="1400" dirty="0"/>
+          </a:p>
+          <a:p>
+            <a:endParaRPr lang="en-US" sz="1400" dirty="0"/>
+          </a:p>
+          <a:p>
+            <a:endParaRPr lang="en-US" sz="1400" dirty="0"/>
+          </a:p>
+          <a:p>
+            <a:r>
+              <a:rPr lang="en-US" sz="1400" dirty="0"/>
+              <a:t>{"currentTime":"08:38:06","roomDescription":"Labo </a:t>
+            </a:r>
+            <a:r>
+              <a:rPr lang="en-US" sz="1400" dirty="0" err="1"/>
+              <a:t>Mbedded</a:t>
+            </a:r>
+            <a:r>
+              <a:rPr lang="en-US" sz="1400" dirty="0"/>
+              <a:t> ontwerp","roomName":"02.85","events":[{"teacher":"</a:t>
+            </a:r>
+            <a:r>
+              <a:rPr lang="en-US" sz="1400" dirty="0" err="1"/>
+              <a:t>Espeel</a:t>
+            </a:r>
+            <a:r>
+              <a:rPr lang="en-US" sz="1400" dirty="0"/>
+              <a:t> </a:t>
+            </a:r>
+            <a:r>
+              <a:rPr lang="en-US" sz="1400" dirty="0" err="1"/>
+              <a:t>Ludovic,Lannoo</a:t>
+            </a:r>
+            <a:r>
+              <a:rPr lang="en-US" sz="1400" dirty="0"/>
+              <a:t> Jonas","start":"08:15","stop":"17:45","date":"2019-04-03","coursename":"Projectlab bachelor elektronica-ICT","description":"B-KUL-B3390N"}]}</a:t>
+            </a:r>
+          </a:p>
+          <a:p>
+            <a:endParaRPr lang="en-US" sz="1400" dirty="0"/>
+          </a:p>
+          <a:p>
+            <a:r>
+              <a:rPr lang="en-US" sz="1400" dirty="0"/>
+              <a:t>▒/~▒x)^▒C</a:t>
+            </a:r>
+          </a:p>
+          <a:p>
+            <a:r>
+              <a:rPr lang="en-US" sz="1400" dirty="0"/>
+              <a:t>▒?</a:t>
+            </a:r>
+            <a:r>
+              <a:rPr lang="en-US" sz="1400" dirty="0" err="1"/>
+              <a:t>gu</a:t>
+            </a:r>
+            <a:r>
+              <a:rPr lang="he-IL" sz="1400" dirty="0"/>
+              <a:t>֛▒*▒▒</a:t>
+            </a:r>
+            <a:r>
+              <a:rPr lang="en-US" sz="1400" dirty="0"/>
+              <a:t>N\U▒</a:t>
+            </a:r>
+            <a:r>
+              <a:rPr lang="dv-MV" sz="1400" dirty="0"/>
+              <a:t>ޝ▒</a:t>
+            </a:r>
+            <a:r>
+              <a:rPr lang="en-US" sz="1400" dirty="0"/>
+              <a:t>m▒8"▒▒</a:t>
+            </a:r>
+            <a:r>
+              <a:rPr lang="en-US" sz="1400" dirty="0" err="1"/>
+              <a:t>uA▒l</a:t>
+            </a:r>
+            <a:r>
+              <a:rPr lang="en-US" sz="1400" dirty="0"/>
+              <a:t>▒</a:t>
+            </a:r>
+          </a:p>
+          <a:p>
+            <a:r>
+              <a:rPr lang="en-US" sz="1400" dirty="0"/>
+              <a:t>J▒▒</a:t>
+            </a:r>
+          </a:p>
+          <a:p>
+            <a:endParaRPr lang="en-US" sz="1400" dirty="0"/>
+          </a:p>
+        </p:txBody>
+      </p:sp>
+    </p:spTree>
+    <p:extLst>
+      <p:ext uri="{BB962C8B-B14F-4D97-AF65-F5344CB8AC3E}">
+        <p14:creationId xmlns:p14="http://schemas.microsoft.com/office/powerpoint/2010/main" val="37795928"/>
+      </p:ext>
+    </p:extLst>
+  </p:cSld>
+  <p:clrMapOvr>
+    <a:masterClrMapping/>
+  </p:clrMapOvr>
+</p:sld>
+</file>
+
+<file path=ppt/slides/slide22.xml><?xml version="1.0" encoding="utf-8"?>
 <p:sld xmlns:a="http://schemas.openxmlformats.org/drawingml/2006/main" xmlns:r="http://schemas.openxmlformats.org/officeDocument/2006/relationships" xmlns:p="http://schemas.openxmlformats.org/presentationml/2006/main">
   <p:cSld>
     <p:spTree>
@@ -10514,7 +10839,7 @@
           <a:p>
             <a:fld id="{CF179DAE-D0A6-40C3-B8BC-6A97C268D03A}" type="slidenum">
               <a:rPr lang="nl-NL" smtClean="0"/>
-              <a:t>21</a:t>
+              <a:t>22</a:t>
             </a:fld>
             <a:endParaRPr lang="nl-NL"/>
           </a:p>
@@ -10548,7 +10873,7 @@
         </p:blipFill>
         <p:spPr>
           <a:xfrm>
-            <a:off x="2720153" y="-1969690"/>
+            <a:off x="2720153" y="-1799635"/>
             <a:ext cx="1825895" cy="1825895"/>
           </a:xfrm>
           <a:prstGeom prst="rect">
@@ -10787,13 +11112,13 @@
   <p:clrMapOvr>
     <a:masterClrMapping/>
   </p:clrMapOvr>
-  <mc:AlternateContent xmlns:mc="http://schemas.openxmlformats.org/markup-compatibility/2006">
-    <mc:Choice xmlns:p159="http://schemas.microsoft.com/office/powerpoint/2015/09/main" Requires="p159">
+  <mc:AlternateContent xmlns:mc="http://schemas.openxmlformats.org/markup-compatibility/2006" xmlns:p159="http://schemas.microsoft.com/office/powerpoint/2015/09/main">
+    <mc:Choice Requires="p159">
       <p:transition xmlns:p14="http://schemas.microsoft.com/office/powerpoint/2010/main" spd="slow" p14:dur="2000">
         <p159:morph option="byObject"/>
       </p:transition>
     </mc:Choice>
-    <mc:Fallback>
+    <mc:Fallback xmlns="">
       <p:transition spd="slow">
         <p:fade/>
       </p:transition>
@@ -11006,7 +11331,7 @@
                                     <p:cond delay="0"/>
                                   </p:stCondLst>
                                   <p:childTnLst>
-                                    <p:animMotion origin="layout" path="M 3.75E-6 0.55833 L -0.17943 0.55648 " pathEditMode="relative" rAng="0" ptsTypes="AA">
+                                    <p:animMotion origin="layout" path="M 3.33333E-6 0.55834 L -0.17943 0.55648 " pathEditMode="relative" rAng="0" ptsTypes="AA">
                                       <p:cBhvr>
                                         <p:cTn id="21" dur="1000" fill="hold"/>
                                         <p:tgtEl>
@@ -11017,7 +11342,7 @@
                                           <p:attrName>ppt_y</p:attrName>
                                         </p:attrNameLst>
                                       </p:cBhvr>
-                                      <p:rCtr x="-8958" y="116"/>
+                                      <p:rCtr x="-8971" y="-93"/>
                                     </p:animMotion>
                                   </p:childTnLst>
                                 </p:cTn>
@@ -11134,7 +11459,7 @@
 </p:sld>
 </file>
 
-<file path=ppt/slides/slide22.xml><?xml version="1.0" encoding="utf-8"?>
+<file path=ppt/slides/slide23.xml><?xml version="1.0" encoding="utf-8"?>
 <p:sld xmlns:a="http://schemas.openxmlformats.org/drawingml/2006/main" xmlns:r="http://schemas.openxmlformats.org/officeDocument/2006/relationships" xmlns:p="http://schemas.openxmlformats.org/presentationml/2006/main">
   <p:cSld>
     <p:spTree>
@@ -11174,7 +11499,7 @@
           <a:p>
             <a:fld id="{CF179DAE-D0A6-40C3-B8BC-6A97C268D03A}" type="slidenum">
               <a:rPr lang="nl-NL" smtClean="0"/>
-              <a:t>22</a:t>
+              <a:t>23</a:t>
             </a:fld>
             <a:endParaRPr lang="nl-NL"/>
           </a:p>
@@ -11724,13 +12049,13 @@
   <p:clrMapOvr>
     <a:masterClrMapping/>
   </p:clrMapOvr>
-  <mc:AlternateContent xmlns:mc="http://schemas.openxmlformats.org/markup-compatibility/2006">
-    <mc:Choice xmlns:p159="http://schemas.microsoft.com/office/powerpoint/2015/09/main" Requires="p159">
+  <mc:AlternateContent xmlns:mc="http://schemas.openxmlformats.org/markup-compatibility/2006" xmlns:p159="http://schemas.microsoft.com/office/powerpoint/2015/09/main">
+    <mc:Choice Requires="p159">
       <p:transition xmlns:p14="http://schemas.microsoft.com/office/powerpoint/2010/main" spd="slow" p14:dur="2000">
         <p159:morph option="byObject"/>
       </p:transition>
     </mc:Choice>
-    <mc:Fallback>
+    <mc:Fallback xmlns="">
       <p:transition spd="slow">
         <p:fade/>
       </p:transition>
@@ -11819,7 +12144,7 @@
 </p:sld>
 </file>
 
-<file path=ppt/slides/slide23.xml><?xml version="1.0" encoding="utf-8"?>
+<file path=ppt/slides/slide24.xml><?xml version="1.0" encoding="utf-8"?>
 <p:sld xmlns:a="http://schemas.openxmlformats.org/drawingml/2006/main" xmlns:r="http://schemas.openxmlformats.org/officeDocument/2006/relationships" xmlns:p="http://schemas.openxmlformats.org/presentationml/2006/main">
   <p:cSld>
     <p:spTree>
@@ -11894,7 +12219,7 @@
           <a:p>
             <a:fld id="{0A297500-7527-634B-90F4-69D0994C32B4}" type="slidenum">
               <a:rPr lang="nl-NL" smtClean="0"/>
-              <a:t>23</a:t>
+              <a:t>24</a:t>
             </a:fld>
             <a:endParaRPr lang="nl-NL"/>
           </a:p>
@@ -12125,7 +12450,7 @@
 </p:sld>
 </file>
 
-<file path=ppt/slides/slide24.xml><?xml version="1.0" encoding="utf-8"?>
+<file path=ppt/slides/slide25.xml><?xml version="1.0" encoding="utf-8"?>
 <p:sld xmlns:a="http://schemas.openxmlformats.org/drawingml/2006/main" xmlns:r="http://schemas.openxmlformats.org/officeDocument/2006/relationships" xmlns:p="http://schemas.openxmlformats.org/presentationml/2006/main">
   <p:cSld>
     <p:spTree>
@@ -12165,7 +12490,7 @@
           <a:p>
             <a:fld id="{CF179DAE-D0A6-40C3-B8BC-6A97C268D03A}" type="slidenum">
               <a:rPr lang="nl-NL" smtClean="0"/>
-              <a:t>24</a:t>
+              <a:t>25</a:t>
             </a:fld>
             <a:endParaRPr lang="nl-NL"/>
           </a:p>
@@ -12199,7 +12524,7 @@
         </p:blipFill>
         <p:spPr>
           <a:xfrm>
-            <a:off x="2720153" y="-1969690"/>
+            <a:off x="2720153" y="-1799635"/>
             <a:ext cx="1825895" cy="1825895"/>
           </a:xfrm>
           <a:prstGeom prst="rect">
@@ -12431,13 +12756,13 @@
   <p:clrMapOvr>
     <a:masterClrMapping/>
   </p:clrMapOvr>
-  <mc:AlternateContent xmlns:mc="http://schemas.openxmlformats.org/markup-compatibility/2006">
-    <mc:Choice xmlns:p159="http://schemas.microsoft.com/office/powerpoint/2015/09/main" Requires="p159">
+  <mc:AlternateContent xmlns:mc="http://schemas.openxmlformats.org/markup-compatibility/2006" xmlns:p159="http://schemas.microsoft.com/office/powerpoint/2015/09/main">
+    <mc:Choice Requires="p159">
       <p:transition xmlns:p14="http://schemas.microsoft.com/office/powerpoint/2010/main" spd="slow" p14:dur="2000">
         <p159:morph option="byObject"/>
       </p:transition>
     </mc:Choice>
-    <mc:Fallback>
+    <mc:Fallback xmlns="">
       <p:transition spd="slow">
         <p:fade/>
       </p:transition>
@@ -12650,7 +12975,7 @@
                                     <p:cond delay="0"/>
                                   </p:stCondLst>
                                   <p:childTnLst>
-                                    <p:animMotion origin="layout" path="M 3.75E-6 0.55833 L -0.17943 0.55648 " pathEditMode="relative" rAng="0" ptsTypes="AA">
+                                    <p:animMotion origin="layout" path="M 3.33333E-6 0.55834 L -0.17943 0.55648 " pathEditMode="relative" rAng="0" ptsTypes="AA">
                                       <p:cBhvr>
                                         <p:cTn id="21" dur="1000" fill="hold"/>
                                         <p:tgtEl>
@@ -12661,7 +12986,7 @@
                                           <p:attrName>ppt_y</p:attrName>
                                         </p:attrNameLst>
                                       </p:cBhvr>
-                                      <p:rCtr x="-8958" y="116"/>
+                                      <p:rCtr x="-8971" y="-93"/>
                                     </p:animMotion>
                                   </p:childTnLst>
                                 </p:cTn>
@@ -12778,7 +13103,7 @@
 </p:sld>
 </file>
 
-<file path=ppt/slides/slide25.xml><?xml version="1.0" encoding="utf-8"?>
+<file path=ppt/slides/slide26.xml><?xml version="1.0" encoding="utf-8"?>
 <p:sld xmlns:a="http://schemas.openxmlformats.org/drawingml/2006/main" xmlns:r="http://schemas.openxmlformats.org/officeDocument/2006/relationships" xmlns:p="http://schemas.openxmlformats.org/presentationml/2006/main">
   <p:cSld>
     <p:spTree>
@@ -12818,7 +13143,7 @@
           <a:p>
             <a:fld id="{CF179DAE-D0A6-40C3-B8BC-6A97C268D03A}" type="slidenum">
               <a:rPr lang="nl-NL" smtClean="0"/>
-              <a:t>25</a:t>
+              <a:t>26</a:t>
             </a:fld>
             <a:endParaRPr lang="nl-NL"/>
           </a:p>
@@ -13360,13 +13685,13 @@
   <p:clrMapOvr>
     <a:masterClrMapping/>
   </p:clrMapOvr>
-  <mc:AlternateContent xmlns:mc="http://schemas.openxmlformats.org/markup-compatibility/2006">
-    <mc:Choice xmlns:p159="http://schemas.microsoft.com/office/powerpoint/2015/09/main" Requires="p159">
+  <mc:AlternateContent xmlns:mc="http://schemas.openxmlformats.org/markup-compatibility/2006" xmlns:p159="http://schemas.microsoft.com/office/powerpoint/2015/09/main">
+    <mc:Choice Requires="p159">
       <p:transition xmlns:p14="http://schemas.microsoft.com/office/powerpoint/2010/main" spd="slow" p14:dur="2000">
         <p159:morph option="byObject"/>
       </p:transition>
     </mc:Choice>
-    <mc:Fallback>
+    <mc:Fallback xmlns="">
       <p:transition spd="slow">
         <p:fade/>
       </p:transition>
@@ -13455,7 +13780,7 @@
 </p:sld>
 </file>
 
-<file path=ppt/slides/slide26.xml><?xml version="1.0" encoding="utf-8"?>
+<file path=ppt/slides/slide27.xml><?xml version="1.0" encoding="utf-8"?>
 <p:sld xmlns:a="http://schemas.openxmlformats.org/drawingml/2006/main" xmlns:r="http://schemas.openxmlformats.org/officeDocument/2006/relationships" xmlns:p="http://schemas.openxmlformats.org/presentationml/2006/main">
   <p:cSld>
     <p:spTree>
@@ -13495,7 +13820,7 @@
           <a:p>
             <a:fld id="{0A297500-7527-634B-90F4-69D0994C32B4}" type="slidenum">
               <a:rPr lang="nl-NL" smtClean="0"/>
-              <a:t>26</a:t>
+              <a:t>27</a:t>
             </a:fld>
             <a:endParaRPr lang="nl-NL"/>
           </a:p>
@@ -13613,13 +13938,13 @@
   <p:clrMapOvr>
     <a:masterClrMapping/>
   </p:clrMapOvr>
-  <mc:AlternateContent xmlns:mc="http://schemas.openxmlformats.org/markup-compatibility/2006">
-    <mc:Choice xmlns:p159="http://schemas.microsoft.com/office/powerpoint/2015/09/main" Requires="p159">
+  <mc:AlternateContent xmlns:mc="http://schemas.openxmlformats.org/markup-compatibility/2006" xmlns:p159="http://schemas.microsoft.com/office/powerpoint/2015/09/main">
+    <mc:Choice Requires="p159">
       <p:transition xmlns:p14="http://schemas.microsoft.com/office/powerpoint/2010/main" spd="slow" p14:dur="2000">
         <p159:morph option="byObject"/>
       </p:transition>
     </mc:Choice>
-    <mc:Fallback>
+    <mc:Fallback xmlns="">
       <p:transition spd="slow">
         <p:fade/>
       </p:transition>
@@ -13628,7 +13953,7 @@
 </p:sld>
 </file>
 
-<file path=ppt/slides/slide27.xml><?xml version="1.0" encoding="utf-8"?>
+<file path=ppt/slides/slide28.xml><?xml version="1.0" encoding="utf-8"?>
 <p:sld xmlns:a="http://schemas.openxmlformats.org/drawingml/2006/main" xmlns:r="http://schemas.openxmlformats.org/officeDocument/2006/relationships" xmlns:p="http://schemas.openxmlformats.org/presentationml/2006/main">
   <p:cSld>
     <p:spTree>
@@ -13668,7 +13993,7 @@
           <a:p>
             <a:fld id="{0A297500-7527-634B-90F4-69D0994C32B4}" type="slidenum">
               <a:rPr lang="nl-NL" smtClean="0"/>
-              <a:t>27</a:t>
+              <a:t>28</a:t>
             </a:fld>
             <a:endParaRPr lang="nl-NL"/>
           </a:p>
@@ -14147,13 +14472,13 @@
   <p:clrMapOvr>
     <a:masterClrMapping/>
   </p:clrMapOvr>
-  <mc:AlternateContent xmlns:mc="http://schemas.openxmlformats.org/markup-compatibility/2006">
-    <mc:Choice xmlns:p159="http://schemas.microsoft.com/office/powerpoint/2015/09/main" Requires="p159">
+  <mc:AlternateContent xmlns:mc="http://schemas.openxmlformats.org/markup-compatibility/2006" xmlns:p159="http://schemas.microsoft.com/office/powerpoint/2015/09/main">
+    <mc:Choice Requires="p159">
       <p:transition xmlns:p14="http://schemas.microsoft.com/office/powerpoint/2010/main" spd="slow" p14:dur="2000">
         <p159:morph option="byObject"/>
       </p:transition>
     </mc:Choice>
-    <mc:Fallback>
+    <mc:Fallback xmlns="">
       <p:transition spd="slow">
         <p:fade/>
       </p:transition>
@@ -14162,7 +14487,7 @@
 </p:sld>
 </file>
 
-<file path=ppt/slides/slide28.xml><?xml version="1.0" encoding="utf-8"?>
+<file path=ppt/slides/slide29.xml><?xml version="1.0" encoding="utf-8"?>
 <p:sld xmlns:a="http://schemas.openxmlformats.org/drawingml/2006/main" xmlns:r="http://schemas.openxmlformats.org/officeDocument/2006/relationships" xmlns:p="http://schemas.openxmlformats.org/presentationml/2006/main">
   <p:cSld>
     <p:spTree>
@@ -14202,7 +14527,7 @@
           <a:p>
             <a:fld id="{CF179DAE-D0A6-40C3-B8BC-6A97C268D03A}" type="slidenum">
               <a:rPr lang="nl-NL" smtClean="0"/>
-              <a:t>28</a:t>
+              <a:t>29</a:t>
             </a:fld>
             <a:endParaRPr lang="nl-NL"/>
           </a:p>
@@ -14236,7 +14561,7 @@
         </p:blipFill>
         <p:spPr>
           <a:xfrm>
-            <a:off x="2720153" y="-1969690"/>
+            <a:off x="2720153" y="-1825895"/>
             <a:ext cx="1825895" cy="1825895"/>
           </a:xfrm>
           <a:prstGeom prst="rect">
@@ -14482,13 +14807,13 @@
   <p:clrMapOvr>
     <a:masterClrMapping/>
   </p:clrMapOvr>
-  <mc:AlternateContent xmlns:mc="http://schemas.openxmlformats.org/markup-compatibility/2006">
-    <mc:Choice xmlns:p159="http://schemas.microsoft.com/office/powerpoint/2015/09/main" Requires="p159">
+  <mc:AlternateContent xmlns:mc="http://schemas.openxmlformats.org/markup-compatibility/2006" xmlns:p159="http://schemas.microsoft.com/office/powerpoint/2015/09/main">
+    <mc:Choice Requires="p159">
       <p:transition xmlns:p14="http://schemas.microsoft.com/office/powerpoint/2010/main" spd="slow" p14:dur="2000">
         <p159:morph option="byObject"/>
       </p:transition>
     </mc:Choice>
-    <mc:Fallback>
+    <mc:Fallback xmlns="">
       <p:transition spd="slow">
         <p:fade/>
       </p:transition>
@@ -14634,7 +14959,7 @@
                                     <p:cond delay="0"/>
                                   </p:stCondLst>
                                   <p:childTnLst>
-                                    <p:animMotion origin="layout" path="M 3.33333E-6 -3.33333E-6 L 3.33333E-6 0.55834 " pathEditMode="relative" rAng="0" ptsTypes="AA">
+                                    <p:animMotion origin="layout" path="M 3.33333E-6 1.85185E-6 L 3.33333E-6 0.55833 " pathEditMode="relative" rAng="0" ptsTypes="AA">
                                       <p:cBhvr>
                                         <p:cTn id="15" dur="500" fill="hold"/>
                                         <p:tgtEl>
@@ -14701,7 +15026,7 @@
                                     <p:cond delay="0"/>
                                   </p:stCondLst>
                                   <p:childTnLst>
-                                    <p:animMotion origin="layout" path="M 3.75E-6 0.55833 L -0.17943 0.55648 " pathEditMode="relative" rAng="0" ptsTypes="AA">
+                                    <p:animMotion origin="layout" path="M 3.33333E-6 0.55833 L -0.17943 0.55648 " pathEditMode="relative" rAng="0" ptsTypes="AA">
                                       <p:cBhvr>
                                         <p:cTn id="21" dur="1000" fill="hold"/>
                                         <p:tgtEl>
@@ -14712,7 +15037,7 @@
                                           <p:attrName>ppt_y</p:attrName>
                                         </p:attrNameLst>
                                       </p:cBhvr>
-                                      <p:rCtr x="-8958" y="116"/>
+                                      <p:rCtr x="-8971" y="-93"/>
                                     </p:animMotion>
                                   </p:childTnLst>
                                 </p:cTn>
@@ -14829,7 +15154,196 @@
 </p:sld>
 </file>
 
-<file path=ppt/slides/slide29.xml><?xml version="1.0" encoding="utf-8"?>
+<file path=ppt/slides/slide3.xml><?xml version="1.0" encoding="utf-8"?>
+<p:sld xmlns:a="http://schemas.openxmlformats.org/drawingml/2006/main" xmlns:r="http://schemas.openxmlformats.org/officeDocument/2006/relationships" xmlns:p="http://schemas.openxmlformats.org/presentationml/2006/main">
+  <p:cSld>
+    <p:spTree>
+      <p:nvGrpSpPr>
+        <p:cNvPr id="1" name=""/>
+        <p:cNvGrpSpPr/>
+        <p:nvPr/>
+      </p:nvGrpSpPr>
+      <p:grpSpPr>
+        <a:xfrm>
+          <a:off x="0" y="0"/>
+          <a:ext cx="0" cy="0"/>
+          <a:chOff x="0" y="0"/>
+          <a:chExt cx="0" cy="0"/>
+        </a:xfrm>
+      </p:grpSpPr>
+      <p:sp>
+        <p:nvSpPr>
+          <p:cNvPr id="3" name="Tijdelijke aanduiding voor dianummer 2"/>
+          <p:cNvSpPr>
+            <a:spLocks noGrp="1"/>
+          </p:cNvSpPr>
+          <p:nvPr>
+            <p:ph type="sldNum" sz="quarter" idx="12"/>
+          </p:nvPr>
+        </p:nvSpPr>
+        <p:spPr/>
+        <p:txBody>
+          <a:bodyPr/>
+          <a:lstStyle/>
+          <a:p>
+            <a:fld id="{0A297500-7527-634B-90F4-69D0994C32B4}" type="slidenum">
+              <a:rPr lang="nl-NL" smtClean="0"/>
+              <a:t>3</a:t>
+            </a:fld>
+            <a:endParaRPr lang="nl-NL"/>
+          </a:p>
+        </p:txBody>
+      </p:sp>
+      <p:sp>
+        <p:nvSpPr>
+          <p:cNvPr id="4" name="Titel 3"/>
+          <p:cNvSpPr>
+            <a:spLocks noGrp="1"/>
+          </p:cNvSpPr>
+          <p:nvPr>
+            <p:ph type="title"/>
+          </p:nvPr>
+        </p:nvSpPr>
+        <p:spPr/>
+        <p:txBody>
+          <a:bodyPr/>
+          <a:lstStyle/>
+          <a:p>
+            <a:pPr algn="ctr"/>
+            <a:r>
+              <a:rPr lang="nl-BE" dirty="0"/>
+              <a:t>Introduction</a:t>
+            </a:r>
+          </a:p>
+        </p:txBody>
+      </p:sp>
+      <p:pic>
+        <p:nvPicPr>
+          <p:cNvPr id="9" name="Picture 8">
+            <a:extLst>
+              <a:ext uri="{FF2B5EF4-FFF2-40B4-BE49-F238E27FC236}">
+                <a16:creationId xmlns:a16="http://schemas.microsoft.com/office/drawing/2014/main" id="{44C584F1-030C-44E6-9EE4-CEBF5224657E}"/>
+              </a:ext>
+            </a:extLst>
+          </p:cNvPr>
+          <p:cNvPicPr>
+            <a:picLocks noChangeAspect="1"/>
+          </p:cNvPicPr>
+          <p:nvPr/>
+        </p:nvPicPr>
+        <p:blipFill rotWithShape="1">
+          <a:blip r:embed="rId2"/>
+          <a:srcRect l="3491" t="-1" b="1207"/>
+          <a:stretch/>
+        </p:blipFill>
+        <p:spPr>
+          <a:xfrm>
+            <a:off x="260349" y="1109840"/>
+            <a:ext cx="6165851" cy="4638320"/>
+          </a:xfrm>
+          <a:prstGeom prst="rect">
+            <a:avLst/>
+          </a:prstGeom>
+        </p:spPr>
+      </p:pic>
+      <p:pic>
+        <p:nvPicPr>
+          <p:cNvPr id="12" name="Picture 11">
+            <a:extLst>
+              <a:ext uri="{FF2B5EF4-FFF2-40B4-BE49-F238E27FC236}">
+                <a16:creationId xmlns:a16="http://schemas.microsoft.com/office/drawing/2014/main" id="{B23A2DA9-9A66-46B2-9333-7D388D29BC33}"/>
+              </a:ext>
+            </a:extLst>
+          </p:cNvPr>
+          <p:cNvPicPr>
+            <a:picLocks noChangeAspect="1"/>
+          </p:cNvPicPr>
+          <p:nvPr/>
+        </p:nvPicPr>
+        <p:blipFill>
+          <a:blip r:embed="rId3"/>
+          <a:stretch>
+            <a:fillRect/>
+          </a:stretch>
+        </p:blipFill>
+        <p:spPr>
+          <a:xfrm>
+            <a:off x="7451600" y="1866900"/>
+            <a:ext cx="4165600" cy="3124200"/>
+          </a:xfrm>
+          <a:prstGeom prst="rect">
+            <a:avLst/>
+          </a:prstGeom>
+          <a:ln w="38100" cap="sq">
+            <a:solidFill>
+              <a:srgbClr val="000000"/>
+            </a:solidFill>
+            <a:prstDash val="solid"/>
+            <a:miter lim="800000"/>
+          </a:ln>
+          <a:effectLst>
+            <a:outerShdw blurRad="50800" dist="38100" dir="2700000" algn="tl" rotWithShape="0">
+              <a:srgbClr val="000000">
+                <a:alpha val="43000"/>
+              </a:srgbClr>
+            </a:outerShdw>
+          </a:effectLst>
+        </p:spPr>
+      </p:pic>
+      <p:sp>
+        <p:nvSpPr>
+          <p:cNvPr id="13" name="TextBox 12">
+            <a:extLst>
+              <a:ext uri="{FF2B5EF4-FFF2-40B4-BE49-F238E27FC236}">
+                <a16:creationId xmlns:a16="http://schemas.microsoft.com/office/drawing/2014/main" id="{37DC7C04-A704-4738-A7BE-8C6EE9BEC7FA}"/>
+              </a:ext>
+            </a:extLst>
+          </p:cNvPr>
+          <p:cNvSpPr txBox="1"/>
+          <p:nvPr/>
+        </p:nvSpPr>
+        <p:spPr>
+          <a:xfrm>
+            <a:off x="7451600" y="5118100"/>
+            <a:ext cx="4165600" cy="369332"/>
+          </a:xfrm>
+          <a:prstGeom prst="rect">
+            <a:avLst/>
+          </a:prstGeom>
+          <a:noFill/>
+        </p:spPr>
+        <p:txBody>
+          <a:bodyPr wrap="square" rtlCol="0">
+            <a:spAutoFit/>
+          </a:bodyPr>
+          <a:lstStyle/>
+          <a:p>
+            <a:r>
+              <a:rPr lang="en-US" dirty="0"/>
+              <a:t>Concept art by Mr. Van </a:t>
+            </a:r>
+            <a:r>
+              <a:rPr lang="en-US" dirty="0" err="1"/>
+              <a:t>Landschoot</a:t>
+            </a:r>
+            <a:endParaRPr lang="en-US" dirty="0"/>
+          </a:p>
+        </p:txBody>
+      </p:sp>
+    </p:spTree>
+    <p:extLst>
+      <p:ext uri="{BB962C8B-B14F-4D97-AF65-F5344CB8AC3E}">
+        <p14:creationId xmlns:p14="http://schemas.microsoft.com/office/powerpoint/2010/main" val="4187617209"/>
+      </p:ext>
+    </p:extLst>
+  </p:cSld>
+  <p:clrMapOvr>
+    <a:masterClrMapping/>
+  </p:clrMapOvr>
+</p:sld>
+</file>
+
+<file path=ppt/slides/slide30.xml><?xml version="1.0" encoding="utf-8"?>
 <p:sld xmlns:a="http://schemas.openxmlformats.org/drawingml/2006/main" xmlns:r="http://schemas.openxmlformats.org/officeDocument/2006/relationships" xmlns:p="http://schemas.openxmlformats.org/presentationml/2006/main">
   <p:cSld>
     <p:spTree>
@@ -14869,7 +15383,7 @@
           <a:p>
             <a:fld id="{CF179DAE-D0A6-40C3-B8BC-6A97C268D03A}" type="slidenum">
               <a:rPr lang="nl-NL" smtClean="0"/>
-              <a:t>29</a:t>
+              <a:t>30</a:t>
             </a:fld>
             <a:endParaRPr lang="nl-NL"/>
           </a:p>
@@ -15395,13 +15909,13 @@
   <p:clrMapOvr>
     <a:masterClrMapping/>
   </p:clrMapOvr>
-  <mc:AlternateContent xmlns:mc="http://schemas.openxmlformats.org/markup-compatibility/2006">
-    <mc:Choice xmlns:p159="http://schemas.microsoft.com/office/powerpoint/2015/09/main" Requires="p159">
+  <mc:AlternateContent xmlns:mc="http://schemas.openxmlformats.org/markup-compatibility/2006" xmlns:p159="http://schemas.microsoft.com/office/powerpoint/2015/09/main">
+    <mc:Choice Requires="p159">
       <p:transition xmlns:p14="http://schemas.microsoft.com/office/powerpoint/2010/main" spd="slow" p14:dur="2000">
         <p159:morph option="byObject"/>
       </p:transition>
     </mc:Choice>
-    <mc:Fallback>
+    <mc:Fallback xmlns="">
       <p:transition spd="slow">
         <p:fade/>
       </p:transition>
@@ -15490,196 +16004,7 @@
 </p:sld>
 </file>
 
-<file path=ppt/slides/slide3.xml><?xml version="1.0" encoding="utf-8"?>
-<p:sld xmlns:a="http://schemas.openxmlformats.org/drawingml/2006/main" xmlns:r="http://schemas.openxmlformats.org/officeDocument/2006/relationships" xmlns:p="http://schemas.openxmlformats.org/presentationml/2006/main">
-  <p:cSld>
-    <p:spTree>
-      <p:nvGrpSpPr>
-        <p:cNvPr id="1" name=""/>
-        <p:cNvGrpSpPr/>
-        <p:nvPr/>
-      </p:nvGrpSpPr>
-      <p:grpSpPr>
-        <a:xfrm>
-          <a:off x="0" y="0"/>
-          <a:ext cx="0" cy="0"/>
-          <a:chOff x="0" y="0"/>
-          <a:chExt cx="0" cy="0"/>
-        </a:xfrm>
-      </p:grpSpPr>
-      <p:sp>
-        <p:nvSpPr>
-          <p:cNvPr id="3" name="Tijdelijke aanduiding voor dianummer 2"/>
-          <p:cNvSpPr>
-            <a:spLocks noGrp="1"/>
-          </p:cNvSpPr>
-          <p:nvPr>
-            <p:ph type="sldNum" sz="quarter" idx="12"/>
-          </p:nvPr>
-        </p:nvSpPr>
-        <p:spPr/>
-        <p:txBody>
-          <a:bodyPr/>
-          <a:lstStyle/>
-          <a:p>
-            <a:fld id="{0A297500-7527-634B-90F4-69D0994C32B4}" type="slidenum">
-              <a:rPr lang="nl-NL" smtClean="0"/>
-              <a:t>3</a:t>
-            </a:fld>
-            <a:endParaRPr lang="nl-NL"/>
-          </a:p>
-        </p:txBody>
-      </p:sp>
-      <p:sp>
-        <p:nvSpPr>
-          <p:cNvPr id="4" name="Titel 3"/>
-          <p:cNvSpPr>
-            <a:spLocks noGrp="1"/>
-          </p:cNvSpPr>
-          <p:nvPr>
-            <p:ph type="title"/>
-          </p:nvPr>
-        </p:nvSpPr>
-        <p:spPr/>
-        <p:txBody>
-          <a:bodyPr/>
-          <a:lstStyle/>
-          <a:p>
-            <a:pPr algn="ctr"/>
-            <a:r>
-              <a:rPr lang="nl-BE" dirty="0"/>
-              <a:t>Introduction</a:t>
-            </a:r>
-          </a:p>
-        </p:txBody>
-      </p:sp>
-      <p:pic>
-        <p:nvPicPr>
-          <p:cNvPr id="9" name="Picture 8">
-            <a:extLst>
-              <a:ext uri="{FF2B5EF4-FFF2-40B4-BE49-F238E27FC236}">
-                <a16:creationId xmlns:a16="http://schemas.microsoft.com/office/drawing/2014/main" id="{44C584F1-030C-44E6-9EE4-CEBF5224657E}"/>
-              </a:ext>
-            </a:extLst>
-          </p:cNvPr>
-          <p:cNvPicPr>
-            <a:picLocks noChangeAspect="1"/>
-          </p:cNvPicPr>
-          <p:nvPr/>
-        </p:nvPicPr>
-        <p:blipFill rotWithShape="1">
-          <a:blip r:embed="rId2"/>
-          <a:srcRect l="3491" t="-1" b="1207"/>
-          <a:stretch/>
-        </p:blipFill>
-        <p:spPr>
-          <a:xfrm>
-            <a:off x="260349" y="1109840"/>
-            <a:ext cx="6165851" cy="4638320"/>
-          </a:xfrm>
-          <a:prstGeom prst="rect">
-            <a:avLst/>
-          </a:prstGeom>
-        </p:spPr>
-      </p:pic>
-      <p:pic>
-        <p:nvPicPr>
-          <p:cNvPr id="12" name="Picture 11">
-            <a:extLst>
-              <a:ext uri="{FF2B5EF4-FFF2-40B4-BE49-F238E27FC236}">
-                <a16:creationId xmlns:a16="http://schemas.microsoft.com/office/drawing/2014/main" id="{B23A2DA9-9A66-46B2-9333-7D388D29BC33}"/>
-              </a:ext>
-            </a:extLst>
-          </p:cNvPr>
-          <p:cNvPicPr>
-            <a:picLocks noChangeAspect="1"/>
-          </p:cNvPicPr>
-          <p:nvPr/>
-        </p:nvPicPr>
-        <p:blipFill>
-          <a:blip r:embed="rId3"/>
-          <a:stretch>
-            <a:fillRect/>
-          </a:stretch>
-        </p:blipFill>
-        <p:spPr>
-          <a:xfrm>
-            <a:off x="7451600" y="1866900"/>
-            <a:ext cx="4165600" cy="3124200"/>
-          </a:xfrm>
-          <a:prstGeom prst="rect">
-            <a:avLst/>
-          </a:prstGeom>
-          <a:ln w="38100" cap="sq">
-            <a:solidFill>
-              <a:srgbClr val="000000"/>
-            </a:solidFill>
-            <a:prstDash val="solid"/>
-            <a:miter lim="800000"/>
-          </a:ln>
-          <a:effectLst>
-            <a:outerShdw blurRad="50800" dist="38100" dir="2700000" algn="tl" rotWithShape="0">
-              <a:srgbClr val="000000">
-                <a:alpha val="43000"/>
-              </a:srgbClr>
-            </a:outerShdw>
-          </a:effectLst>
-        </p:spPr>
-      </p:pic>
-      <p:sp>
-        <p:nvSpPr>
-          <p:cNvPr id="13" name="TextBox 12">
-            <a:extLst>
-              <a:ext uri="{FF2B5EF4-FFF2-40B4-BE49-F238E27FC236}">
-                <a16:creationId xmlns:a16="http://schemas.microsoft.com/office/drawing/2014/main" id="{37DC7C04-A704-4738-A7BE-8C6EE9BEC7FA}"/>
-              </a:ext>
-            </a:extLst>
-          </p:cNvPr>
-          <p:cNvSpPr txBox="1"/>
-          <p:nvPr/>
-        </p:nvSpPr>
-        <p:spPr>
-          <a:xfrm>
-            <a:off x="7451600" y="5118100"/>
-            <a:ext cx="4165600" cy="369332"/>
-          </a:xfrm>
-          <a:prstGeom prst="rect">
-            <a:avLst/>
-          </a:prstGeom>
-          <a:noFill/>
-        </p:spPr>
-        <p:txBody>
-          <a:bodyPr wrap="square" rtlCol="0">
-            <a:spAutoFit/>
-          </a:bodyPr>
-          <a:lstStyle/>
-          <a:p>
-            <a:r>
-              <a:rPr lang="en-US" dirty="0"/>
-              <a:t>Concept art by Mr. Van </a:t>
-            </a:r>
-            <a:r>
-              <a:rPr lang="en-US" dirty="0" err="1"/>
-              <a:t>Landschoot</a:t>
-            </a:r>
-            <a:endParaRPr lang="en-US" dirty="0"/>
-          </a:p>
-        </p:txBody>
-      </p:sp>
-    </p:spTree>
-    <p:extLst>
-      <p:ext uri="{BB962C8B-B14F-4D97-AF65-F5344CB8AC3E}">
-        <p14:creationId xmlns:p14="http://schemas.microsoft.com/office/powerpoint/2010/main" val="4187617209"/>
-      </p:ext>
-    </p:extLst>
-  </p:cSld>
-  <p:clrMapOvr>
-    <a:masterClrMapping/>
-  </p:clrMapOvr>
-</p:sld>
-</file>
-
-<file path=ppt/slides/slide30.xml><?xml version="1.0" encoding="utf-8"?>
+<file path=ppt/slides/slide31.xml><?xml version="1.0" encoding="utf-8"?>
 <p:sld xmlns:a="http://schemas.openxmlformats.org/drawingml/2006/main" xmlns:r="http://schemas.openxmlformats.org/officeDocument/2006/relationships" xmlns:p="http://schemas.openxmlformats.org/presentationml/2006/main">
   <p:cSld>
     <p:spTree>
@@ -15741,7 +16066,7 @@
           <a:p>
             <a:fld id="{0A297500-7527-634B-90F4-69D0994C32B4}" type="slidenum">
               <a:rPr lang="nl-NL" smtClean="0"/>
-              <a:t>30</a:t>
+              <a:t>31</a:t>
             </a:fld>
             <a:endParaRPr lang="nl-NL"/>
           </a:p>
@@ -15842,7 +16167,7 @@
 </p:sld>
 </file>
 
-<file path=ppt/slides/slide31.xml><?xml version="1.0" encoding="utf-8"?>
+<file path=ppt/slides/slide32.xml><?xml version="1.0" encoding="utf-8"?>
 <p:sld xmlns:a="http://schemas.openxmlformats.org/drawingml/2006/main" xmlns:r="http://schemas.openxmlformats.org/officeDocument/2006/relationships" xmlns:p="http://schemas.openxmlformats.org/presentationml/2006/main">
   <p:cSld>
     <p:spTree>
@@ -15882,7 +16207,7 @@
           <a:p>
             <a:fld id="{CF179DAE-D0A6-40C3-B8BC-6A97C268D03A}" type="slidenum">
               <a:rPr lang="nl-NL" smtClean="0"/>
-              <a:t>31</a:t>
+              <a:t>32</a:t>
             </a:fld>
             <a:endParaRPr lang="nl-NL"/>
           </a:p>
@@ -15916,7 +16241,7 @@
         </p:blipFill>
         <p:spPr>
           <a:xfrm>
-            <a:off x="2720153" y="-1969690"/>
+            <a:off x="2720153" y="-1799635"/>
             <a:ext cx="1825895" cy="1825895"/>
           </a:xfrm>
           <a:prstGeom prst="rect">
@@ -16148,13 +16473,13 @@
   <p:clrMapOvr>
     <a:masterClrMapping/>
   </p:clrMapOvr>
-  <mc:AlternateContent xmlns:mc="http://schemas.openxmlformats.org/markup-compatibility/2006">
-    <mc:Choice xmlns:p159="http://schemas.microsoft.com/office/powerpoint/2015/09/main" Requires="p159">
+  <mc:AlternateContent xmlns:mc="http://schemas.openxmlformats.org/markup-compatibility/2006" xmlns:p159="http://schemas.microsoft.com/office/powerpoint/2015/09/main">
+    <mc:Choice Requires="p159">
       <p:transition xmlns:p14="http://schemas.microsoft.com/office/powerpoint/2010/main" spd="slow" p14:dur="2000">
         <p159:morph option="byObject"/>
       </p:transition>
     </mc:Choice>
-    <mc:Fallback>
+    <mc:Fallback xmlns="">
       <p:transition spd="slow">
         <p:fade/>
       </p:transition>
@@ -16367,7 +16692,7 @@
                                     <p:cond delay="0"/>
                                   </p:stCondLst>
                                   <p:childTnLst>
-                                    <p:animMotion origin="layout" path="M 3.75E-6 0.55833 L -0.17943 0.55648 " pathEditMode="relative" rAng="0" ptsTypes="AA">
+                                    <p:animMotion origin="layout" path="M 3.33333E-6 0.55834 L -0.17943 0.55648 " pathEditMode="relative" rAng="0" ptsTypes="AA">
                                       <p:cBhvr>
                                         <p:cTn id="21" dur="1000" fill="hold"/>
                                         <p:tgtEl>
@@ -16378,7 +16703,7 @@
                                           <p:attrName>ppt_y</p:attrName>
                                         </p:attrNameLst>
                                       </p:cBhvr>
-                                      <p:rCtr x="-8958" y="116"/>
+                                      <p:rCtr x="-8971" y="-93"/>
                                     </p:animMotion>
                                   </p:childTnLst>
                                 </p:cTn>
@@ -16495,7 +16820,7 @@
 </p:sld>
 </file>
 
-<file path=ppt/slides/slide32.xml><?xml version="1.0" encoding="utf-8"?>
+<file path=ppt/slides/slide33.xml><?xml version="1.0" encoding="utf-8"?>
 <p:sld xmlns:a="http://schemas.openxmlformats.org/drawingml/2006/main" xmlns:r="http://schemas.openxmlformats.org/officeDocument/2006/relationships" xmlns:p="http://schemas.openxmlformats.org/presentationml/2006/main">
   <p:cSld>
     <p:spTree>
@@ -16535,7 +16860,7 @@
           <a:p>
             <a:fld id="{CF179DAE-D0A6-40C3-B8BC-6A97C268D03A}" type="slidenum">
               <a:rPr lang="nl-NL" smtClean="0"/>
-              <a:t>32</a:t>
+              <a:t>33</a:t>
             </a:fld>
             <a:endParaRPr lang="nl-NL"/>
           </a:p>
@@ -17061,13 +17386,13 @@
   <p:clrMapOvr>
     <a:masterClrMapping/>
   </p:clrMapOvr>
-  <mc:AlternateContent xmlns:mc="http://schemas.openxmlformats.org/markup-compatibility/2006">
-    <mc:Choice xmlns:p159="http://schemas.microsoft.com/office/powerpoint/2015/09/main" Requires="p159">
+  <mc:AlternateContent xmlns:mc="http://schemas.openxmlformats.org/markup-compatibility/2006" xmlns:p159="http://schemas.microsoft.com/office/powerpoint/2015/09/main">
+    <mc:Choice Requires="p159">
       <p:transition xmlns:p14="http://schemas.microsoft.com/office/powerpoint/2010/main" spd="slow" p14:dur="2000">
         <p159:morph option="byObject"/>
       </p:transition>
     </mc:Choice>
-    <mc:Fallback>
+    <mc:Fallback xmlns="">
       <p:transition spd="slow">
         <p:fade/>
       </p:transition>
@@ -17156,7 +17481,7 @@
 </p:sld>
 </file>
 
-<file path=ppt/slides/slide33.xml><?xml version="1.0" encoding="utf-8"?>
+<file path=ppt/slides/slide34.xml><?xml version="1.0" encoding="utf-8"?>
 <p:sld xmlns:a="http://schemas.openxmlformats.org/drawingml/2006/main" xmlns:r="http://schemas.openxmlformats.org/officeDocument/2006/relationships" xmlns:p="http://schemas.openxmlformats.org/presentationml/2006/main">
   <p:cSld>
     <p:spTree>
@@ -17196,7 +17521,7 @@
           <a:p>
             <a:fld id="{0A297500-7527-634B-90F4-69D0994C32B4}" type="slidenum">
               <a:rPr lang="nl-NL" smtClean="0"/>
-              <a:t>33</a:t>
+              <a:t>34</a:t>
             </a:fld>
             <a:endParaRPr lang="nl-NL"/>
           </a:p>
@@ -17697,13 +18022,13 @@
   <p:clrMapOvr>
     <a:masterClrMapping/>
   </p:clrMapOvr>
-  <mc:AlternateContent xmlns:mc="http://schemas.openxmlformats.org/markup-compatibility/2006">
-    <mc:Choice xmlns:p159="http://schemas.microsoft.com/office/powerpoint/2015/09/main" Requires="p159">
+  <mc:AlternateContent xmlns:mc="http://schemas.openxmlformats.org/markup-compatibility/2006" xmlns:p159="http://schemas.microsoft.com/office/powerpoint/2015/09/main">
+    <mc:Choice Requires="p159">
       <p:transition xmlns:p14="http://schemas.microsoft.com/office/powerpoint/2010/main" spd="slow" p14:dur="2000">
         <p159:morph option="byObject"/>
       </p:transition>
     </mc:Choice>
-    <mc:Fallback>
+    <mc:Fallback xmlns="">
       <p:transition spd="slow">
         <p:fade/>
       </p:transition>
@@ -18852,7 +19177,7 @@
 </p:sld>
 </file>
 
-<file path=ppt/slides/slide34.xml><?xml version="1.0" encoding="utf-8"?>
+<file path=ppt/slides/slide35.xml><?xml version="1.0" encoding="utf-8"?>
 <p:sld xmlns:a="http://schemas.openxmlformats.org/drawingml/2006/main" xmlns:r="http://schemas.openxmlformats.org/officeDocument/2006/relationships" xmlns:p="http://schemas.openxmlformats.org/presentationml/2006/main">
   <p:cSld>
     <p:spTree>
@@ -18892,7 +19217,7 @@
           <a:p>
             <a:fld id="{0A297500-7527-634B-90F4-69D0994C32B4}" type="slidenum">
               <a:rPr lang="nl-NL" smtClean="0"/>
-              <a:t>34</a:t>
+              <a:t>35</a:t>
             </a:fld>
             <a:endParaRPr lang="nl-NL"/>
           </a:p>
@@ -19146,13 +19471,13 @@
   <p:clrMapOvr>
     <a:masterClrMapping/>
   </p:clrMapOvr>
-  <mc:AlternateContent xmlns:mc="http://schemas.openxmlformats.org/markup-compatibility/2006">
-    <mc:Choice xmlns:p159="http://schemas.microsoft.com/office/powerpoint/2015/09/main" Requires="p159">
+  <mc:AlternateContent xmlns:mc="http://schemas.openxmlformats.org/markup-compatibility/2006" xmlns:p159="http://schemas.microsoft.com/office/powerpoint/2015/09/main">
+    <mc:Choice Requires="p159">
       <p:transition xmlns:p14="http://schemas.microsoft.com/office/powerpoint/2010/main" spd="slow" p14:dur="2000">
         <p159:morph option="byObject"/>
       </p:transition>
     </mc:Choice>
-    <mc:Fallback>
+    <mc:Fallback xmlns="">
       <p:transition spd="slow">
         <p:fade/>
       </p:transition>
@@ -19358,7 +19683,7 @@
 </p:sld>
 </file>
 
-<file path=ppt/slides/slide35.xml><?xml version="1.0" encoding="utf-8"?>
+<file path=ppt/slides/slide36.xml><?xml version="1.0" encoding="utf-8"?>
 <p:sld xmlns:a="http://schemas.openxmlformats.org/drawingml/2006/main" xmlns:r="http://schemas.openxmlformats.org/officeDocument/2006/relationships" xmlns:p="http://schemas.openxmlformats.org/presentationml/2006/main">
   <p:cSld>
     <p:spTree>
@@ -19398,7 +19723,7 @@
           <a:p>
             <a:fld id="{CF179DAE-D0A6-40C3-B8BC-6A97C268D03A}" type="slidenum">
               <a:rPr lang="nl-NL" smtClean="0"/>
-              <a:t>35</a:t>
+              <a:t>36</a:t>
             </a:fld>
             <a:endParaRPr lang="nl-NL"/>
           </a:p>
@@ -19432,7 +19757,7 @@
         </p:blipFill>
         <p:spPr>
           <a:xfrm>
-            <a:off x="2720153" y="-1969690"/>
+            <a:off x="2720153" y="-1825895"/>
             <a:ext cx="1825895" cy="1825895"/>
           </a:xfrm>
           <a:prstGeom prst="rect">
@@ -19628,13 +19953,13 @@
   <p:clrMapOvr>
     <a:masterClrMapping/>
   </p:clrMapOvr>
-  <mc:AlternateContent xmlns:mc="http://schemas.openxmlformats.org/markup-compatibility/2006">
-    <mc:Choice xmlns:p159="http://schemas.microsoft.com/office/powerpoint/2015/09/main" Requires="p159">
+  <mc:AlternateContent xmlns:mc="http://schemas.openxmlformats.org/markup-compatibility/2006" xmlns:p159="http://schemas.microsoft.com/office/powerpoint/2015/09/main">
+    <mc:Choice Requires="p159">
       <p:transition xmlns:p14="http://schemas.microsoft.com/office/powerpoint/2010/main" spd="slow" p14:dur="2000">
         <p159:morph option="byObject"/>
       </p:transition>
     </mc:Choice>
-    <mc:Fallback>
+    <mc:Fallback xmlns="">
       <p:transition spd="slow">
         <p:fade/>
       </p:transition>
@@ -19754,7 +20079,7 @@
                                     <p:cond delay="0"/>
                                   </p:stCondLst>
                                   <p:childTnLst>
-                                    <p:animMotion origin="layout" path="M 3.33333E-6 -3.33333E-6 L 3.33333E-6 0.55834 " pathEditMode="relative" rAng="0" ptsTypes="AA">
+                                    <p:animMotion origin="layout" path="M 3.33333E-6 1.85185E-6 L 3.33333E-6 0.55833 " pathEditMode="relative" rAng="0" ptsTypes="AA">
                                       <p:cBhvr>
                                         <p:cTn id="13" dur="500" fill="hold"/>
                                         <p:tgtEl>
@@ -19821,7 +20146,7 @@
                                     <p:cond delay="0"/>
                                   </p:stCondLst>
                                   <p:childTnLst>
-                                    <p:animMotion origin="layout" path="M 3.75E-6 0.55833 L -0.17943 0.55648 " pathEditMode="relative" rAng="0" ptsTypes="AA">
+                                    <p:animMotion origin="layout" path="M 3.33333E-6 0.55833 L -0.17943 0.55648 " pathEditMode="relative" rAng="0" ptsTypes="AA">
                                       <p:cBhvr>
                                         <p:cTn id="19" dur="1000" fill="hold"/>
                                         <p:tgtEl>
@@ -19832,7 +20157,7 @@
                                           <p:attrName>ppt_y</p:attrName>
                                         </p:attrNameLst>
                                       </p:cBhvr>
-                                      <p:rCtr x="-8958" y="116"/>
+                                      <p:rCtr x="-8971" y="-93"/>
                                     </p:animMotion>
                                   </p:childTnLst>
                                 </p:cTn>
@@ -19948,7 +20273,7 @@
 </p:sld>
 </file>
 
-<file path=ppt/slides/slide36.xml><?xml version="1.0" encoding="utf-8"?>
+<file path=ppt/slides/slide37.xml><?xml version="1.0" encoding="utf-8"?>
 <p:sld xmlns:a="http://schemas.openxmlformats.org/drawingml/2006/main" xmlns:r="http://schemas.openxmlformats.org/officeDocument/2006/relationships" xmlns:p="http://schemas.openxmlformats.org/presentationml/2006/main">
   <p:cSld>
     <p:spTree>
@@ -19988,7 +20313,7 @@
           <a:p>
             <a:fld id="{CF179DAE-D0A6-40C3-B8BC-6A97C268D03A}" type="slidenum">
               <a:rPr lang="nl-NL" smtClean="0"/>
-              <a:t>36</a:t>
+              <a:t>37</a:t>
             </a:fld>
             <a:endParaRPr lang="nl-NL"/>
           </a:p>
@@ -20218,13 +20543,13 @@
   <p:clrMapOvr>
     <a:masterClrMapping/>
   </p:clrMapOvr>
-  <mc:AlternateContent xmlns:mc="http://schemas.openxmlformats.org/markup-compatibility/2006">
-    <mc:Choice xmlns:p159="http://schemas.microsoft.com/office/powerpoint/2015/09/main" Requires="p159">
+  <mc:AlternateContent xmlns:mc="http://schemas.openxmlformats.org/markup-compatibility/2006" xmlns:p159="http://schemas.microsoft.com/office/powerpoint/2015/09/main">
+    <mc:Choice Requires="p159">
       <p:transition xmlns:p14="http://schemas.microsoft.com/office/powerpoint/2010/main" spd="slow" p14:dur="2000">
         <p159:morph option="byObject"/>
       </p:transition>
     </mc:Choice>
-    <mc:Fallback>
+    <mc:Fallback xmlns="">
       <p:transition spd="slow">
         <p:fade/>
       </p:transition>
@@ -20612,7 +20937,7 @@
         </p:blipFill>
         <p:spPr>
           <a:xfrm>
-            <a:off x="2720153" y="-1969690"/>
+            <a:off x="2720153" y="-1893490"/>
             <a:ext cx="1825895" cy="1825895"/>
           </a:xfrm>
           <a:prstGeom prst="rect">
@@ -20847,13 +21172,13 @@
   <p:clrMapOvr>
     <a:masterClrMapping/>
   </p:clrMapOvr>
-  <mc:AlternateContent xmlns:mc="http://schemas.openxmlformats.org/markup-compatibility/2006">
-    <mc:Choice xmlns:p159="http://schemas.microsoft.com/office/powerpoint/2015/09/main" Requires="p159">
+  <mc:AlternateContent xmlns:mc="http://schemas.openxmlformats.org/markup-compatibility/2006" xmlns:p159="http://schemas.microsoft.com/office/powerpoint/2015/09/main">
+    <mc:Choice Requires="p159">
       <p:transition xmlns:p14="http://schemas.microsoft.com/office/powerpoint/2010/main" spd="slow" p14:dur="2000">
         <p159:morph option="byObject"/>
       </p:transition>
     </mc:Choice>
-    <mc:Fallback>
+    <mc:Fallback xmlns="">
       <p:transition spd="slow">
         <p:fade/>
       </p:transition>
@@ -20999,7 +21324,7 @@
                                     <p:cond delay="0"/>
                                   </p:stCondLst>
                                   <p:childTnLst>
-                                    <p:animMotion origin="layout" path="M 3.33333E-6 -3.33333E-6 L 3.33333E-6 0.55834 " pathEditMode="relative" rAng="0" ptsTypes="AA">
+                                    <p:animMotion origin="layout" path="M 3.33333E-6 -4.44444E-6 L 3.33333E-6 0.55834 " pathEditMode="relative" rAng="0" ptsTypes="AA">
                                       <p:cBhvr>
                                         <p:cTn id="15" dur="500" fill="hold"/>
                                         <p:tgtEl>
@@ -21066,7 +21391,7 @@
                                     <p:cond delay="0"/>
                                   </p:stCondLst>
                                   <p:childTnLst>
-                                    <p:animMotion origin="layout" path="M 3.75E-6 0.55833 L -0.17943 0.55648 " pathEditMode="relative" rAng="0" ptsTypes="AA">
+                                    <p:animMotion origin="layout" path="M 3.33333E-6 0.55834 L -0.17943 0.55649 " pathEditMode="relative" rAng="0" ptsTypes="AA">
                                       <p:cBhvr>
                                         <p:cTn id="21" dur="1000" fill="hold"/>
                                         <p:tgtEl>
@@ -21077,7 +21402,7 @@
                                           <p:attrName>ppt_y</p:attrName>
                                         </p:attrNameLst>
                                       </p:cBhvr>
-                                      <p:rCtr x="-8958" y="116"/>
+                                      <p:rCtr x="-8971" y="-93"/>
                                     </p:animMotion>
                                   </p:childTnLst>
                                 </p:cTn>
@@ -21776,13 +22101,13 @@
   <p:clrMapOvr>
     <a:masterClrMapping/>
   </p:clrMapOvr>
-  <mc:AlternateContent xmlns:mc="http://schemas.openxmlformats.org/markup-compatibility/2006">
-    <mc:Choice xmlns:p159="http://schemas.microsoft.com/office/powerpoint/2015/09/main" Requires="p159">
+  <mc:AlternateContent xmlns:mc="http://schemas.openxmlformats.org/markup-compatibility/2006" xmlns:p159="http://schemas.microsoft.com/office/powerpoint/2015/09/main">
+    <mc:Choice Requires="p159">
       <p:transition xmlns:p14="http://schemas.microsoft.com/office/powerpoint/2010/main" spd="slow" p14:dur="2000">
         <p159:morph option="byObject"/>
       </p:transition>
     </mc:Choice>
-    <mc:Fallback>
+    <mc:Fallback xmlns="">
       <p:transition spd="slow">
         <p:fade/>
       </p:transition>
@@ -22167,7 +22492,7 @@
         </p:blipFill>
         <p:spPr>
           <a:xfrm>
-            <a:off x="2720153" y="-1969690"/>
+            <a:off x="2720153" y="-1901956"/>
             <a:ext cx="1825895" cy="1825895"/>
           </a:xfrm>
           <a:prstGeom prst="rect">
@@ -22413,13 +22738,13 @@
   <p:clrMapOvr>
     <a:masterClrMapping/>
   </p:clrMapOvr>
-  <mc:AlternateContent xmlns:mc="http://schemas.openxmlformats.org/markup-compatibility/2006">
-    <mc:Choice xmlns:p159="http://schemas.microsoft.com/office/powerpoint/2015/09/main" Requires="p159">
+  <mc:AlternateContent xmlns:mc="http://schemas.openxmlformats.org/markup-compatibility/2006" xmlns:p159="http://schemas.microsoft.com/office/powerpoint/2015/09/main">
+    <mc:Choice Requires="p159">
       <p:transition xmlns:p14="http://schemas.microsoft.com/office/powerpoint/2010/main" spd="slow" p14:dur="2000">
         <p159:morph option="byObject"/>
       </p:transition>
     </mc:Choice>
-    <mc:Fallback>
+    <mc:Fallback xmlns="">
       <p:transition spd="slow">
         <p:fade/>
       </p:transition>
@@ -22565,7 +22890,7 @@
                                     <p:cond delay="0"/>
                                   </p:stCondLst>
                                   <p:childTnLst>
-                                    <p:animMotion origin="layout" path="M 3.33333E-6 -3.33333E-6 L 3.33333E-6 0.55834 " pathEditMode="relative" rAng="0" ptsTypes="AA">
+                                    <p:animMotion origin="layout" path="M 3.33333E-6 2.96296E-6 L 3.33333E-6 0.55833 " pathEditMode="relative" rAng="0" ptsTypes="AA">
                                       <p:cBhvr>
                                         <p:cTn id="15" dur="500" fill="hold"/>
                                         <p:tgtEl>
@@ -22632,7 +22957,7 @@
                                     <p:cond delay="0"/>
                                   </p:stCondLst>
                                   <p:childTnLst>
-                                    <p:animMotion origin="layout" path="M 3.75E-6 0.55833 L -0.17943 0.55648 " pathEditMode="relative" rAng="0" ptsTypes="AA">
+                                    <p:animMotion origin="layout" path="M 3.33333E-6 0.55833 L -0.17943 0.55648 " pathEditMode="relative" rAng="0" ptsTypes="AA">
                                       <p:cBhvr>
                                         <p:cTn id="21" dur="1000" fill="hold"/>
                                         <p:tgtEl>
@@ -22643,7 +22968,7 @@
                                           <p:attrName>ppt_y</p:attrName>
                                         </p:attrNameLst>
                                       </p:cBhvr>
-                                      <p:rCtr x="-8958" y="116"/>
+                                      <p:rCtr x="-8971" y="-93"/>
                                     </p:animMotion>
                                   </p:childTnLst>
                                 </p:cTn>
@@ -23342,13 +23667,13 @@
   <p:clrMapOvr>
     <a:masterClrMapping/>
   </p:clrMapOvr>
-  <mc:AlternateContent xmlns:mc="http://schemas.openxmlformats.org/markup-compatibility/2006">
-    <mc:Choice xmlns:p159="http://schemas.microsoft.com/office/powerpoint/2015/09/main" Requires="p159">
+  <mc:AlternateContent xmlns:mc="http://schemas.openxmlformats.org/markup-compatibility/2006" xmlns:p159="http://schemas.microsoft.com/office/powerpoint/2015/09/main">
+    <mc:Choice Requires="p159">
       <p:transition xmlns:p14="http://schemas.microsoft.com/office/powerpoint/2010/main" spd="slow" p14:dur="2000">
         <p159:morph option="byObject"/>
       </p:transition>
     </mc:Choice>
-    <mc:Fallback>
+    <mc:Fallback xmlns="">
       <p:transition spd="slow">
         <p:fade/>
       </p:transition>

</xml_diff>

<commit_message>
Added 2 more slides on display + comments
</commit_message>
<xml_diff>
--- a/Documentation/Presentatie.pptx
+++ b/Documentation/Presentatie.pptx
@@ -6,10 +6,10 @@
     <p:sldMasterId id="2147483694" r:id="rId2"/>
   </p:sldMasterIdLst>
   <p:notesMasterIdLst>
-    <p:notesMasterId r:id="rId40"/>
+    <p:notesMasterId r:id="rId43"/>
   </p:notesMasterIdLst>
   <p:handoutMasterIdLst>
-    <p:handoutMasterId r:id="rId41"/>
+    <p:handoutMasterId r:id="rId44"/>
   </p:handoutMasterIdLst>
   <p:sldIdLst>
     <p:sldId id="261" r:id="rId3"/>
@@ -46,9 +46,12 @@
     <p:sldId id="292" r:id="rId34"/>
     <p:sldId id="296" r:id="rId35"/>
     <p:sldId id="297" r:id="rId36"/>
-    <p:sldId id="298" r:id="rId37"/>
-    <p:sldId id="299" r:id="rId38"/>
-    <p:sldId id="300" r:id="rId39"/>
+    <p:sldId id="303" r:id="rId37"/>
+    <p:sldId id="298" r:id="rId38"/>
+    <p:sldId id="304" r:id="rId39"/>
+    <p:sldId id="299" r:id="rId40"/>
+    <p:sldId id="302" r:id="rId41"/>
+    <p:sldId id="300" r:id="rId42"/>
   </p:sldIdLst>
   <p:sldSz cx="12192000" cy="6858000"/>
   <p:notesSz cx="6858000" cy="9144000"/>
@@ -158,6 +161,26 @@
 </p:presentation>
 </file>
 
+<file path=ppt/commentAuthors.xml><?xml version="1.0" encoding="utf-8"?>
+<p:cmAuthorLst xmlns:a="http://schemas.openxmlformats.org/drawingml/2006/main" xmlns:r="http://schemas.openxmlformats.org/officeDocument/2006/relationships" xmlns:p="http://schemas.openxmlformats.org/presentationml/2006/main">
+  <p:cmAuthor id="2" name="Author" initials="A" lastIdx="1" clrIdx="1"/>
+</p:cmAuthorLst>
+</file>
+
+<file path=ppt/comments/comment1.xml><?xml version="1.0" encoding="utf-8"?>
+<p:cmLst xmlns:a="http://schemas.openxmlformats.org/drawingml/2006/main" xmlns:r="http://schemas.openxmlformats.org/officeDocument/2006/relationships" xmlns:p="http://schemas.openxmlformats.org/presentationml/2006/main">
+  <p:cm authorId="2" dt="2019-05-21T09:30:50.178" idx="1">
+    <p:pos x="10" y="10"/>
+    <p:text/>
+    <p:extLst>
+      <p:ext uri="{C676402C-5697-4E1C-873F-D02D1690AC5C}">
+        <p15:threadingInfo xmlns:p15="http://schemas.microsoft.com/office/powerpoint/2012/main" timeZoneBias="-120"/>
+      </p:ext>
+    </p:extLst>
+  </p:cm>
+</p:cmLst>
+</file>
+
 <file path=ppt/handoutMasters/handoutMaster1.xml><?xml version="1.0" encoding="utf-8"?>
 <p:handoutMaster xmlns:a="http://schemas.openxmlformats.org/drawingml/2006/main" xmlns:r="http://schemas.openxmlformats.org/officeDocument/2006/relationships" xmlns:p="http://schemas.openxmlformats.org/presentationml/2006/main">
   <p:cSld>
@@ -306,7 +329,7 @@
           <a:p>
             <a:fld id="{E152A6D4-CD3D-5148-8B70-A84796F20135}" type="slidenum">
               <a:rPr lang="nl-NL" smtClean="0"/>
-              <a:t>‹nr.›</a:t>
+              <a:t>‹#›</a:t>
             </a:fld>
             <a:endParaRPr lang="nl-NL"/>
           </a:p>
@@ -563,7 +586,7 @@
           <a:p>
             <a:fld id="{8954E32A-327F-AF4B-8E1F-209FBF93D26D}" type="slidenum">
               <a:rPr lang="nl-NL" smtClean="0"/>
-              <a:t>‹nr.›</a:t>
+              <a:t>‹#›</a:t>
             </a:fld>
             <a:endParaRPr lang="nl-NL"/>
           </a:p>
@@ -672,6 +695,383 @@
 </p:notesMaster>
 </file>
 
+<file path=ppt/notesSlides/notesSlide1.xml><?xml version="1.0" encoding="utf-8"?>
+<p:notes xmlns:a="http://schemas.openxmlformats.org/drawingml/2006/main" xmlns:r="http://schemas.openxmlformats.org/officeDocument/2006/relationships" xmlns:p="http://schemas.openxmlformats.org/presentationml/2006/main">
+  <p:cSld>
+    <p:spTree>
+      <p:nvGrpSpPr>
+        <p:cNvPr id="1" name=""/>
+        <p:cNvGrpSpPr/>
+        <p:nvPr/>
+      </p:nvGrpSpPr>
+      <p:grpSpPr>
+        <a:xfrm>
+          <a:off x="0" y="0"/>
+          <a:ext cx="0" cy="0"/>
+          <a:chOff x="0" y="0"/>
+          <a:chExt cx="0" cy="0"/>
+        </a:xfrm>
+      </p:grpSpPr>
+      <p:sp>
+        <p:nvSpPr>
+          <p:cNvPr id="2" name="Slide Image Placeholder 1"/>
+          <p:cNvSpPr>
+            <a:spLocks noGrp="1" noRot="1" noChangeAspect="1"/>
+          </p:cNvSpPr>
+          <p:nvPr>
+            <p:ph type="sldImg"/>
+          </p:nvPr>
+        </p:nvSpPr>
+        <p:spPr/>
+      </p:sp>
+      <p:sp>
+        <p:nvSpPr>
+          <p:cNvPr id="3" name="Notes Placeholder 2"/>
+          <p:cNvSpPr>
+            <a:spLocks noGrp="1"/>
+          </p:cNvSpPr>
+          <p:nvPr>
+            <p:ph type="body" idx="1"/>
+          </p:nvPr>
+        </p:nvSpPr>
+        <p:spPr/>
+        <p:txBody>
+          <a:bodyPr/>
+          <a:lstStyle/>
+          <a:p>
+            <a:r>
+              <a:rPr lang="en-US" dirty="0"/>
+              <a:t>Offline compiler profile uses GCC-98 witch does not support </a:t>
+            </a:r>
+            <a:r>
+              <a:rPr lang="en-US" dirty="0" err="1"/>
+              <a:t>MbedJsonlib</a:t>
+            </a:r>
+            <a:endParaRPr lang="en-US" dirty="0"/>
+          </a:p>
+        </p:txBody>
+      </p:sp>
+      <p:sp>
+        <p:nvSpPr>
+          <p:cNvPr id="4" name="Slide Number Placeholder 3"/>
+          <p:cNvSpPr>
+            <a:spLocks noGrp="1"/>
+          </p:cNvSpPr>
+          <p:nvPr>
+            <p:ph type="sldNum" sz="quarter" idx="5"/>
+          </p:nvPr>
+        </p:nvSpPr>
+        <p:spPr/>
+        <p:txBody>
+          <a:bodyPr/>
+          <a:lstStyle/>
+          <a:p>
+            <a:fld id="{8954E32A-327F-AF4B-8E1F-209FBF93D26D}" type="slidenum">
+              <a:rPr lang="nl-NL" smtClean="0"/>
+              <a:t>28</a:t>
+            </a:fld>
+            <a:endParaRPr lang="nl-NL"/>
+          </a:p>
+        </p:txBody>
+      </p:sp>
+    </p:spTree>
+    <p:extLst>
+      <p:ext uri="{BB962C8B-B14F-4D97-AF65-F5344CB8AC3E}">
+        <p14:creationId xmlns:p14="http://schemas.microsoft.com/office/powerpoint/2010/main" val="474001640"/>
+      </p:ext>
+    </p:extLst>
+  </p:cSld>
+  <p:clrMapOvr>
+    <a:masterClrMapping/>
+  </p:clrMapOvr>
+</p:notes>
+</file>
+
+<file path=ppt/notesSlides/notesSlide2.xml><?xml version="1.0" encoding="utf-8"?>
+<p:notes xmlns:a="http://schemas.openxmlformats.org/drawingml/2006/main" xmlns:r="http://schemas.openxmlformats.org/officeDocument/2006/relationships" xmlns:p="http://schemas.openxmlformats.org/presentationml/2006/main">
+  <p:cSld>
+    <p:spTree>
+      <p:nvGrpSpPr>
+        <p:cNvPr id="1" name=""/>
+        <p:cNvGrpSpPr/>
+        <p:nvPr/>
+      </p:nvGrpSpPr>
+      <p:grpSpPr>
+        <a:xfrm>
+          <a:off x="0" y="0"/>
+          <a:ext cx="0" cy="0"/>
+          <a:chOff x="0" y="0"/>
+          <a:chExt cx="0" cy="0"/>
+        </a:xfrm>
+      </p:grpSpPr>
+      <p:sp>
+        <p:nvSpPr>
+          <p:cNvPr id="2" name="Slide Image Placeholder 1"/>
+          <p:cNvSpPr>
+            <a:spLocks noGrp="1" noRot="1" noChangeAspect="1"/>
+          </p:cNvSpPr>
+          <p:nvPr>
+            <p:ph type="sldImg"/>
+          </p:nvPr>
+        </p:nvSpPr>
+        <p:spPr/>
+      </p:sp>
+      <p:sp>
+        <p:nvSpPr>
+          <p:cNvPr id="3" name="Notes Placeholder 2"/>
+          <p:cNvSpPr>
+            <a:spLocks noGrp="1"/>
+          </p:cNvSpPr>
+          <p:nvPr>
+            <p:ph type="body" idx="1"/>
+          </p:nvPr>
+        </p:nvSpPr>
+        <p:spPr/>
+        <p:txBody>
+          <a:bodyPr/>
+          <a:lstStyle/>
+          <a:p>
+            <a:r>
+              <a:rPr lang="en-US" dirty="0"/>
+              <a:t>4 </a:t>
+            </a:r>
+            <a:r>
+              <a:rPr lang="en-US" dirty="0" err="1"/>
+              <a:t>delen</a:t>
+            </a:r>
+            <a:r>
+              <a:rPr lang="en-US" dirty="0"/>
+              <a:t> van het scherm</a:t>
+            </a:r>
+          </a:p>
+        </p:txBody>
+      </p:sp>
+      <p:sp>
+        <p:nvSpPr>
+          <p:cNvPr id="4" name="Slide Number Placeholder 3"/>
+          <p:cNvSpPr>
+            <a:spLocks noGrp="1"/>
+          </p:cNvSpPr>
+          <p:nvPr>
+            <p:ph type="sldNum" sz="quarter" idx="5"/>
+          </p:nvPr>
+        </p:nvSpPr>
+        <p:spPr/>
+        <p:txBody>
+          <a:bodyPr/>
+          <a:lstStyle/>
+          <a:p>
+            <a:fld id="{8954E32A-327F-AF4B-8E1F-209FBF93D26D}" type="slidenum">
+              <a:rPr lang="nl-NL" smtClean="0"/>
+              <a:t>35</a:t>
+            </a:fld>
+            <a:endParaRPr lang="nl-NL"/>
+          </a:p>
+        </p:txBody>
+      </p:sp>
+    </p:spTree>
+    <p:extLst>
+      <p:ext uri="{BB962C8B-B14F-4D97-AF65-F5344CB8AC3E}">
+        <p14:creationId xmlns:p14="http://schemas.microsoft.com/office/powerpoint/2010/main" val="2226220730"/>
+      </p:ext>
+    </p:extLst>
+  </p:cSld>
+  <p:clrMapOvr>
+    <a:masterClrMapping/>
+  </p:clrMapOvr>
+</p:notes>
+</file>
+
+<file path=ppt/notesSlides/notesSlide3.xml><?xml version="1.0" encoding="utf-8"?>
+<p:notes xmlns:a="http://schemas.openxmlformats.org/drawingml/2006/main" xmlns:r="http://schemas.openxmlformats.org/officeDocument/2006/relationships" xmlns:p="http://schemas.openxmlformats.org/presentationml/2006/main">
+  <p:cSld>
+    <p:spTree>
+      <p:nvGrpSpPr>
+        <p:cNvPr id="1" name=""/>
+        <p:cNvGrpSpPr/>
+        <p:nvPr/>
+      </p:nvGrpSpPr>
+      <p:grpSpPr>
+        <a:xfrm>
+          <a:off x="0" y="0"/>
+          <a:ext cx="0" cy="0"/>
+          <a:chOff x="0" y="0"/>
+          <a:chExt cx="0" cy="0"/>
+        </a:xfrm>
+      </p:grpSpPr>
+      <p:sp>
+        <p:nvSpPr>
+          <p:cNvPr id="2" name="Slide Image Placeholder 1"/>
+          <p:cNvSpPr>
+            <a:spLocks noGrp="1" noRot="1" noChangeAspect="1"/>
+          </p:cNvSpPr>
+          <p:nvPr>
+            <p:ph type="sldImg"/>
+          </p:nvPr>
+        </p:nvSpPr>
+        <p:spPr/>
+      </p:sp>
+      <p:sp>
+        <p:nvSpPr>
+          <p:cNvPr id="3" name="Notes Placeholder 2"/>
+          <p:cNvSpPr>
+            <a:spLocks noGrp="1"/>
+          </p:cNvSpPr>
+          <p:nvPr>
+            <p:ph type="body" idx="1"/>
+          </p:nvPr>
+        </p:nvSpPr>
+        <p:spPr/>
+        <p:txBody>
+          <a:bodyPr/>
+          <a:lstStyle/>
+          <a:p>
+            <a:r>
+              <a:rPr lang="en-US" dirty="0"/>
+              <a:t>4 </a:t>
+            </a:r>
+            <a:r>
+              <a:rPr lang="en-US" dirty="0" err="1"/>
+              <a:t>delen</a:t>
+            </a:r>
+            <a:r>
+              <a:rPr lang="en-US" dirty="0"/>
+              <a:t> van het scherm</a:t>
+            </a:r>
+          </a:p>
+        </p:txBody>
+      </p:sp>
+      <p:sp>
+        <p:nvSpPr>
+          <p:cNvPr id="4" name="Slide Number Placeholder 3"/>
+          <p:cNvSpPr>
+            <a:spLocks noGrp="1"/>
+          </p:cNvSpPr>
+          <p:nvPr>
+            <p:ph type="sldNum" sz="quarter" idx="5"/>
+          </p:nvPr>
+        </p:nvSpPr>
+        <p:spPr/>
+        <p:txBody>
+          <a:bodyPr/>
+          <a:lstStyle/>
+          <a:p>
+            <a:fld id="{8954E32A-327F-AF4B-8E1F-209FBF93D26D}" type="slidenum">
+              <a:rPr lang="nl-NL" smtClean="0"/>
+              <a:t>36</a:t>
+            </a:fld>
+            <a:endParaRPr lang="nl-NL"/>
+          </a:p>
+        </p:txBody>
+      </p:sp>
+    </p:spTree>
+    <p:extLst>
+      <p:ext uri="{BB962C8B-B14F-4D97-AF65-F5344CB8AC3E}">
+        <p14:creationId xmlns:p14="http://schemas.microsoft.com/office/powerpoint/2010/main" val="2621985722"/>
+      </p:ext>
+    </p:extLst>
+  </p:cSld>
+  <p:clrMapOvr>
+    <a:masterClrMapping/>
+  </p:clrMapOvr>
+</p:notes>
+</file>
+
+<file path=ppt/notesSlides/notesSlide4.xml><?xml version="1.0" encoding="utf-8"?>
+<p:notes xmlns:a="http://schemas.openxmlformats.org/drawingml/2006/main" xmlns:r="http://schemas.openxmlformats.org/officeDocument/2006/relationships" xmlns:p="http://schemas.openxmlformats.org/presentationml/2006/main">
+  <p:cSld>
+    <p:spTree>
+      <p:nvGrpSpPr>
+        <p:cNvPr id="1" name=""/>
+        <p:cNvGrpSpPr/>
+        <p:nvPr/>
+      </p:nvGrpSpPr>
+      <p:grpSpPr>
+        <a:xfrm>
+          <a:off x="0" y="0"/>
+          <a:ext cx="0" cy="0"/>
+          <a:chOff x="0" y="0"/>
+          <a:chExt cx="0" cy="0"/>
+        </a:xfrm>
+      </p:grpSpPr>
+      <p:sp>
+        <p:nvSpPr>
+          <p:cNvPr id="2" name="Slide Image Placeholder 1"/>
+          <p:cNvSpPr>
+            <a:spLocks noGrp="1" noRot="1" noChangeAspect="1"/>
+          </p:cNvSpPr>
+          <p:nvPr>
+            <p:ph type="sldImg"/>
+          </p:nvPr>
+        </p:nvSpPr>
+        <p:spPr/>
+      </p:sp>
+      <p:sp>
+        <p:nvSpPr>
+          <p:cNvPr id="3" name="Notes Placeholder 2"/>
+          <p:cNvSpPr>
+            <a:spLocks noGrp="1"/>
+          </p:cNvSpPr>
+          <p:nvPr>
+            <p:ph type="body" idx="1"/>
+          </p:nvPr>
+        </p:nvSpPr>
+        <p:spPr/>
+        <p:txBody>
+          <a:bodyPr/>
+          <a:lstStyle/>
+          <a:p>
+            <a:r>
+              <a:rPr lang="en-US" dirty="0"/>
+              <a:t>4 </a:t>
+            </a:r>
+            <a:r>
+              <a:rPr lang="en-US" dirty="0" err="1"/>
+              <a:t>delen</a:t>
+            </a:r>
+            <a:r>
+              <a:rPr lang="en-US" dirty="0"/>
+              <a:t> van het scherm</a:t>
+            </a:r>
+          </a:p>
+        </p:txBody>
+      </p:sp>
+      <p:sp>
+        <p:nvSpPr>
+          <p:cNvPr id="4" name="Slide Number Placeholder 3"/>
+          <p:cNvSpPr>
+            <a:spLocks noGrp="1"/>
+          </p:cNvSpPr>
+          <p:nvPr>
+            <p:ph type="sldNum" sz="quarter" idx="5"/>
+          </p:nvPr>
+        </p:nvSpPr>
+        <p:spPr/>
+        <p:txBody>
+          <a:bodyPr/>
+          <a:lstStyle/>
+          <a:p>
+            <a:fld id="{8954E32A-327F-AF4B-8E1F-209FBF93D26D}" type="slidenum">
+              <a:rPr lang="nl-NL" smtClean="0"/>
+              <a:t>37</a:t>
+            </a:fld>
+            <a:endParaRPr lang="nl-NL"/>
+          </a:p>
+        </p:txBody>
+      </p:sp>
+    </p:spTree>
+    <p:extLst>
+      <p:ext uri="{BB962C8B-B14F-4D97-AF65-F5344CB8AC3E}">
+        <p14:creationId xmlns:p14="http://schemas.microsoft.com/office/powerpoint/2010/main" val="375096542"/>
+      </p:ext>
+    </p:extLst>
+  </p:cSld>
+  <p:clrMapOvr>
+    <a:masterClrMapping/>
+  </p:clrMapOvr>
+</p:notes>
+</file>
+
 <file path=ppt/slideLayouts/slideLayout1.xml><?xml version="1.0" encoding="utf-8"?>
 <p:sldLayout xmlns:a="http://schemas.openxmlformats.org/drawingml/2006/main" xmlns:r="http://schemas.openxmlformats.org/officeDocument/2006/relationships" xmlns:p="http://schemas.openxmlformats.org/presentationml/2006/main" preserve="1" userDrawn="1">
   <p:cSld name="Titeldia">
@@ -1129,7 +1529,7 @@
           <a:p>
             <a:fld id="{CF179DAE-D0A6-40C3-B8BC-6A97C268D03A}" type="slidenum">
               <a:rPr lang="nl-NL" smtClean="0"/>
-              <a:t>‹nr.›</a:t>
+              <a:t>‹#›</a:t>
             </a:fld>
             <a:endParaRPr lang="nl-NL"/>
           </a:p>
@@ -1390,7 +1790,7 @@
           <a:p>
             <a:fld id="{CF179DAE-D0A6-40C3-B8BC-6A97C268D03A}" type="slidenum">
               <a:rPr lang="nl-NL" smtClean="0"/>
-              <a:t>‹nr.›</a:t>
+              <a:t>‹#›</a:t>
             </a:fld>
             <a:endParaRPr lang="nl-NL"/>
           </a:p>
@@ -1980,7 +2380,7 @@
           <a:p>
             <a:fld id="{CF179DAE-D0A6-40C3-B8BC-6A97C268D03A}" type="slidenum">
               <a:rPr lang="nl-NL" smtClean="0"/>
-              <a:t>‹nr.›</a:t>
+              <a:t>‹#›</a:t>
             </a:fld>
             <a:endParaRPr lang="nl-NL"/>
           </a:p>
@@ -2241,7 +2641,7 @@
           <a:p>
             <a:fld id="{CF179DAE-D0A6-40C3-B8BC-6A97C268D03A}" type="slidenum">
               <a:rPr lang="nl-NL" smtClean="0"/>
-              <a:t>‹nr.›</a:t>
+              <a:t>‹#›</a:t>
             </a:fld>
             <a:endParaRPr lang="nl-NL"/>
           </a:p>
@@ -2549,7 +2949,7 @@
           <a:p>
             <a:fld id="{0A297500-7527-634B-90F4-69D0994C32B4}" type="slidenum">
               <a:rPr lang="nl-NL" smtClean="0"/>
-              <a:t>‹nr.›</a:t>
+              <a:t>‹#›</a:t>
             </a:fld>
             <a:endParaRPr lang="nl-NL"/>
           </a:p>
@@ -2846,7 +3246,7 @@
           <a:p>
             <a:fld id="{0A297500-7527-634B-90F4-69D0994C32B4}" type="slidenum">
               <a:rPr lang="nl-NL" smtClean="0"/>
-              <a:t>‹nr.›</a:t>
+              <a:t>‹#›</a:t>
             </a:fld>
             <a:endParaRPr lang="nl-NL"/>
           </a:p>
@@ -3145,7 +3545,7 @@
           <a:p>
             <a:fld id="{0A297500-7527-634B-90F4-69D0994C32B4}" type="slidenum">
               <a:rPr lang="nl-NL" smtClean="0"/>
-              <a:t>‹nr.›</a:t>
+              <a:t>‹#›</a:t>
             </a:fld>
             <a:endParaRPr lang="nl-NL"/>
           </a:p>
@@ -3265,7 +3665,7 @@
           <a:p>
             <a:fld id="{0A297500-7527-634B-90F4-69D0994C32B4}" type="slidenum">
               <a:rPr lang="nl-NL" smtClean="0"/>
-              <a:t>‹nr.›</a:t>
+              <a:t>‹#›</a:t>
             </a:fld>
             <a:endParaRPr lang="nl-NL"/>
           </a:p>
@@ -3727,7 +4127,7 @@
           <a:p>
             <a:fld id="{0A297500-7527-634B-90F4-69D0994C32B4}" type="slidenum">
               <a:rPr lang="nl-NL" smtClean="0"/>
-              <a:t>‹nr.›</a:t>
+              <a:t>‹#›</a:t>
             </a:fld>
             <a:endParaRPr lang="nl-NL"/>
           </a:p>
@@ -3826,7 +4226,7 @@
           <a:p>
             <a:fld id="{0A297500-7527-634B-90F4-69D0994C32B4}" type="slidenum">
               <a:rPr lang="nl-NL" smtClean="0"/>
-              <a:t>‹nr.›</a:t>
+              <a:t>‹#›</a:t>
             </a:fld>
             <a:endParaRPr lang="nl-NL"/>
           </a:p>
@@ -3925,7 +4325,7 @@
           <a:p>
             <a:fld id="{0A297500-7527-634B-90F4-69D0994C32B4}" type="slidenum">
               <a:rPr lang="nl-NL" smtClean="0"/>
-              <a:t>‹nr.›</a:t>
+              <a:t>‹#›</a:t>
             </a:fld>
             <a:endParaRPr lang="nl-NL"/>
           </a:p>
@@ -4085,7 +4485,7 @@
           <a:p>
             <a:fld id="{0A297500-7527-634B-90F4-69D0994C32B4}" type="slidenum">
               <a:rPr lang="nl-NL" smtClean="0"/>
-              <a:t>‹nr.›</a:t>
+              <a:t>‹#›</a:t>
             </a:fld>
             <a:endParaRPr lang="nl-NL"/>
           </a:p>
@@ -4365,7 +4765,7 @@
             <a:fld id="{0A297500-7527-634B-90F4-69D0994C32B4}" type="slidenum">
               <a:rPr lang="nl-NL" smtClean="0"/>
               <a:pPr/>
-              <a:t>‹nr.›</a:t>
+              <a:t>‹#›</a:t>
             </a:fld>
             <a:endParaRPr lang="nl-NL" dirty="0"/>
           </a:p>
@@ -5101,7 +5501,7 @@
             <a:fld id="{0A297500-7527-634B-90F4-69D0994C32B4}" type="slidenum">
               <a:rPr lang="nl-NL" smtClean="0"/>
               <a:pPr/>
-              <a:t>‹nr.›</a:t>
+              <a:t>‹#›</a:t>
             </a:fld>
             <a:endParaRPr lang="nl-NL" dirty="0"/>
           </a:p>
@@ -5601,7 +6001,7 @@
         </p:nvSpPr>
         <p:spPr>
           <a:xfrm>
-            <a:off x="575999" y="5392801"/>
+            <a:off x="433759" y="5596001"/>
             <a:ext cx="6096524" cy="730188"/>
           </a:xfrm>
         </p:spPr>
@@ -5613,37 +6013,13 @@
           <a:p>
             <a:r>
               <a:rPr lang="nl-BE" dirty="0"/>
-              <a:t>Baptiste </a:t>
-            </a:r>
-            <a:r>
-              <a:rPr lang="nl-BE" dirty="0" err="1"/>
-              <a:t>Pattyn</a:t>
-            </a:r>
+              <a:t>Stijn Declerck, Michel Dequick, </a:t>
+            </a:r>
+          </a:p>
+          <a:p>
             <a:r>
               <a:rPr lang="nl-BE" dirty="0"/>
-              <a:t>, Michel </a:t>
-            </a:r>
-            <a:r>
-              <a:rPr lang="nl-BE" dirty="0" err="1"/>
-              <a:t>Dequick</a:t>
-            </a:r>
-            <a:r>
-              <a:rPr lang="nl-BE" dirty="0"/>
-              <a:t>, </a:t>
-            </a:r>
-          </a:p>
-          <a:p>
-            <a:r>
-              <a:rPr lang="nl-BE" dirty="0"/>
-              <a:t>Stijn </a:t>
-            </a:r>
-            <a:r>
-              <a:rPr lang="nl-BE" dirty="0" err="1"/>
-              <a:t>Declerck</a:t>
-            </a:r>
-            <a:r>
-              <a:rPr lang="nl-BE" dirty="0"/>
-              <a:t>, Ine Vanderhaeghe</a:t>
+              <a:t>Baptiste Pattyn, Ine Vanderhaeghe</a:t>
             </a:r>
           </a:p>
         </p:txBody>
@@ -14179,7 +14555,7 @@
           <p:nvPr/>
         </p:nvPicPr>
         <p:blipFill>
-          <a:blip r:embed="rId2"/>
+          <a:blip r:embed="rId3"/>
           <a:stretch>
             <a:fillRect/>
           </a:stretch>
@@ -19388,6 +19764,354 @@
           </a:fontRef>
         </p:style>
       </p:cxnSp>
+      <p:sp>
+        <p:nvSpPr>
+          <p:cNvPr id="5" name="TextBox 4">
+            <a:extLst>
+              <a:ext uri="{FF2B5EF4-FFF2-40B4-BE49-F238E27FC236}">
+                <a16:creationId xmlns:a16="http://schemas.microsoft.com/office/drawing/2014/main" id="{E4ED8E7C-423B-44CD-A1ED-2B44615ACEFC}"/>
+              </a:ext>
+            </a:extLst>
+          </p:cNvPr>
+          <p:cNvSpPr txBox="1"/>
+          <p:nvPr/>
+        </p:nvSpPr>
+        <p:spPr>
+          <a:xfrm>
+            <a:off x="424978" y="1155699"/>
+            <a:ext cx="11342043" cy="4832092"/>
+          </a:xfrm>
+          <a:prstGeom prst="rect">
+            <a:avLst/>
+          </a:prstGeom>
+          <a:noFill/>
+        </p:spPr>
+        <p:txBody>
+          <a:bodyPr wrap="square" rtlCol="0">
+            <a:spAutoFit/>
+          </a:bodyPr>
+          <a:lstStyle/>
+          <a:p>
+            <a:r>
+              <a:rPr lang="en-US" sz="2800" dirty="0">
+                <a:solidFill>
+                  <a:schemeClr val="tx2"/>
+                </a:solidFill>
+              </a:rPr>
+              <a:t>Inner working:</a:t>
+            </a:r>
+          </a:p>
+          <a:p>
+            <a:pPr marL="514350" indent="-514350">
+              <a:buFont typeface="+mj-lt"/>
+              <a:buAutoNum type="arabicPeriod"/>
+            </a:pPr>
+            <a:r>
+              <a:rPr lang="en-US" sz="2800" dirty="0">
+                <a:solidFill>
+                  <a:schemeClr val="tx2"/>
+                </a:solidFill>
+              </a:rPr>
+              <a:t>Display initialization:</a:t>
+            </a:r>
+          </a:p>
+          <a:p>
+            <a:pPr marL="971550" lvl="1" indent="-514350">
+              <a:buFont typeface="+mj-lt"/>
+              <a:buAutoNum type="arabicPeriod"/>
+            </a:pPr>
+            <a:r>
+              <a:rPr lang="en-US" sz="2800" dirty="0">
+                <a:solidFill>
+                  <a:schemeClr val="tx2"/>
+                </a:solidFill>
+              </a:rPr>
+              <a:t>Soft start</a:t>
+            </a:r>
+          </a:p>
+          <a:p>
+            <a:pPr marL="971550" lvl="1" indent="-514350">
+              <a:buFont typeface="+mj-lt"/>
+              <a:buAutoNum type="arabicPeriod"/>
+            </a:pPr>
+            <a:r>
+              <a:rPr lang="en-US" sz="2800" dirty="0">
+                <a:solidFill>
+                  <a:schemeClr val="tx2"/>
+                </a:solidFill>
+              </a:rPr>
+              <a:t>Power on</a:t>
+            </a:r>
+          </a:p>
+          <a:p>
+            <a:pPr marL="971550" lvl="1" indent="-514350">
+              <a:buFont typeface="+mj-lt"/>
+              <a:buAutoNum type="arabicPeriod"/>
+            </a:pPr>
+            <a:r>
+              <a:rPr lang="en-US" sz="2800" dirty="0">
+                <a:solidFill>
+                  <a:schemeClr val="tx2"/>
+                </a:solidFill>
+              </a:rPr>
+              <a:t>Settings</a:t>
+            </a:r>
+            <a:br>
+              <a:rPr lang="en-US" sz="2800" dirty="0">
+                <a:solidFill>
+                  <a:schemeClr val="tx2"/>
+                </a:solidFill>
+              </a:rPr>
+            </a:br>
+            <a:endParaRPr lang="en-US" sz="2800" dirty="0">
+              <a:solidFill>
+                <a:schemeClr val="tx2"/>
+              </a:solidFill>
+            </a:endParaRPr>
+          </a:p>
+          <a:p>
+            <a:pPr marL="514350" indent="-514350">
+              <a:buFont typeface="+mj-lt"/>
+              <a:buAutoNum type="arabicPeriod"/>
+            </a:pPr>
+            <a:r>
+              <a:rPr lang="en-US" sz="2800" dirty="0">
+                <a:solidFill>
+                  <a:schemeClr val="tx2"/>
+                </a:solidFill>
+              </a:rPr>
+              <a:t>Display frame</a:t>
+            </a:r>
+          </a:p>
+          <a:p>
+            <a:pPr marL="971550" lvl="1" indent="-514350">
+              <a:buFont typeface="+mj-lt"/>
+              <a:buAutoNum type="arabicPeriod"/>
+            </a:pPr>
+            <a:r>
+              <a:rPr lang="en-US" sz="2800" dirty="0">
+                <a:solidFill>
+                  <a:schemeClr val="tx2"/>
+                </a:solidFill>
+              </a:rPr>
+              <a:t>Set partial frames</a:t>
+            </a:r>
+          </a:p>
+          <a:p>
+            <a:pPr marL="971550" lvl="1" indent="-514350">
+              <a:buFont typeface="+mj-lt"/>
+              <a:buAutoNum type="arabicPeriod"/>
+            </a:pPr>
+            <a:r>
+              <a:rPr lang="en-US" sz="2800" dirty="0">
+                <a:solidFill>
+                  <a:schemeClr val="tx2"/>
+                </a:solidFill>
+              </a:rPr>
+              <a:t>Draw S-RAM (frame buffer)</a:t>
+            </a:r>
+            <a:br>
+              <a:rPr lang="en-US" sz="2800" dirty="0">
+                <a:solidFill>
+                  <a:schemeClr val="tx2"/>
+                </a:solidFill>
+              </a:rPr>
+            </a:br>
+            <a:endParaRPr lang="en-US" sz="2800" dirty="0">
+              <a:solidFill>
+                <a:schemeClr val="tx2"/>
+              </a:solidFill>
+            </a:endParaRPr>
+          </a:p>
+          <a:p>
+            <a:pPr marL="514350" indent="-514350">
+              <a:buFont typeface="+mj-lt"/>
+              <a:buAutoNum type="arabicPeriod"/>
+            </a:pPr>
+            <a:r>
+              <a:rPr lang="en-US" sz="2800" dirty="0">
+                <a:solidFill>
+                  <a:schemeClr val="tx2"/>
+                </a:solidFill>
+              </a:rPr>
+              <a:t>Sleep</a:t>
+            </a:r>
+          </a:p>
+        </p:txBody>
+      </p:sp>
+      <p:pic>
+        <p:nvPicPr>
+          <p:cNvPr id="2" name="Picture 1">
+            <a:extLst>
+              <a:ext uri="{FF2B5EF4-FFF2-40B4-BE49-F238E27FC236}">
+                <a16:creationId xmlns:a16="http://schemas.microsoft.com/office/drawing/2014/main" id="{9E9683F5-9573-423F-A014-B6C00A466C9D}"/>
+              </a:ext>
+            </a:extLst>
+          </p:cNvPr>
+          <p:cNvPicPr>
+            <a:picLocks noChangeAspect="1"/>
+          </p:cNvPicPr>
+          <p:nvPr/>
+        </p:nvPicPr>
+        <p:blipFill>
+          <a:blip r:embed="rId3"/>
+          <a:stretch>
+            <a:fillRect/>
+          </a:stretch>
+        </p:blipFill>
+        <p:spPr>
+          <a:xfrm>
+            <a:off x="8712872" y="1113301"/>
+            <a:ext cx="2916915" cy="4874490"/>
+          </a:xfrm>
+          <a:prstGeom prst="rect">
+            <a:avLst/>
+          </a:prstGeom>
+        </p:spPr>
+      </p:pic>
+    </p:spTree>
+    <p:extLst>
+      <p:ext uri="{BB962C8B-B14F-4D97-AF65-F5344CB8AC3E}">
+        <p14:creationId xmlns:p14="http://schemas.microsoft.com/office/powerpoint/2010/main" val="2573335072"/>
+      </p:ext>
+    </p:extLst>
+  </p:cSld>
+  <p:clrMapOvr>
+    <a:masterClrMapping/>
+  </p:clrMapOvr>
+  <mc:AlternateContent xmlns:mc="http://schemas.openxmlformats.org/markup-compatibility/2006" xmlns:p159="http://schemas.microsoft.com/office/powerpoint/2015/09/main">
+    <mc:Choice Requires="p159">
+      <p:transition xmlns:p14="http://schemas.microsoft.com/office/powerpoint/2010/main" spd="slow" p14:dur="2000">
+        <p159:morph option="byObject"/>
+      </p:transition>
+    </mc:Choice>
+    <mc:Fallback xmlns="">
+      <p:transition spd="slow">
+        <p:fade/>
+      </p:transition>
+    </mc:Fallback>
+  </mc:AlternateContent>
+</p:sld>
+</file>
+
+<file path=ppt/slides/slide36.xml><?xml version="1.0" encoding="utf-8"?>
+<p:sld xmlns:a="http://schemas.openxmlformats.org/drawingml/2006/main" xmlns:r="http://schemas.openxmlformats.org/officeDocument/2006/relationships" xmlns:p="http://schemas.openxmlformats.org/presentationml/2006/main">
+  <p:cSld>
+    <p:spTree>
+      <p:nvGrpSpPr>
+        <p:cNvPr id="1" name=""/>
+        <p:cNvGrpSpPr/>
+        <p:nvPr/>
+      </p:nvGrpSpPr>
+      <p:grpSpPr>
+        <a:xfrm>
+          <a:off x="0" y="0"/>
+          <a:ext cx="0" cy="0"/>
+          <a:chOff x="0" y="0"/>
+          <a:chExt cx="0" cy="0"/>
+        </a:xfrm>
+      </p:grpSpPr>
+      <p:sp>
+        <p:nvSpPr>
+          <p:cNvPr id="3" name="Slide Number Placeholder 2">
+            <a:extLst>
+              <a:ext uri="{FF2B5EF4-FFF2-40B4-BE49-F238E27FC236}">
+                <a16:creationId xmlns:a16="http://schemas.microsoft.com/office/drawing/2014/main" id="{EB3515B5-7667-4BDB-8B14-35FDCC252BCA}"/>
+              </a:ext>
+            </a:extLst>
+          </p:cNvPr>
+          <p:cNvSpPr>
+            <a:spLocks noGrp="1"/>
+          </p:cNvSpPr>
+          <p:nvPr>
+            <p:ph type="sldNum" sz="quarter" idx="12"/>
+          </p:nvPr>
+        </p:nvSpPr>
+        <p:spPr/>
+        <p:txBody>
+          <a:bodyPr/>
+          <a:lstStyle/>
+          <a:p>
+            <a:fld id="{0A297500-7527-634B-90F4-69D0994C32B4}" type="slidenum">
+              <a:rPr lang="nl-NL" smtClean="0"/>
+              <a:t>36</a:t>
+            </a:fld>
+            <a:endParaRPr lang="nl-NL"/>
+          </a:p>
+        </p:txBody>
+      </p:sp>
+      <p:sp>
+        <p:nvSpPr>
+          <p:cNvPr id="6" name="Title 2">
+            <a:extLst>
+              <a:ext uri="{FF2B5EF4-FFF2-40B4-BE49-F238E27FC236}">
+                <a16:creationId xmlns:a16="http://schemas.microsoft.com/office/drawing/2014/main" id="{6816E571-577C-45B0-82FD-087CE38D2D8E}"/>
+              </a:ext>
+            </a:extLst>
+          </p:cNvPr>
+          <p:cNvSpPr>
+            <a:spLocks noGrp="1"/>
+          </p:cNvSpPr>
+          <p:nvPr>
+            <p:ph type="title"/>
+          </p:nvPr>
+        </p:nvSpPr>
+        <p:spPr>
+          <a:xfrm>
+            <a:off x="242171" y="119474"/>
+            <a:ext cx="11041200" cy="692651"/>
+          </a:xfrm>
+        </p:spPr>
+        <p:txBody>
+          <a:bodyPr/>
+          <a:lstStyle/>
+          <a:p>
+            <a:r>
+              <a:rPr lang="en-US" dirty="0"/>
+              <a:t>E-Paper Display</a:t>
+            </a:r>
+          </a:p>
+        </p:txBody>
+      </p:sp>
+      <p:cxnSp>
+        <p:nvCxnSpPr>
+          <p:cNvPr id="7" name="Straight Connector 6">
+            <a:extLst>
+              <a:ext uri="{FF2B5EF4-FFF2-40B4-BE49-F238E27FC236}">
+                <a16:creationId xmlns:a16="http://schemas.microsoft.com/office/drawing/2014/main" id="{4937C0F6-3883-40B8-A552-46D8B49C4CC2}"/>
+              </a:ext>
+            </a:extLst>
+          </p:cNvPr>
+          <p:cNvCxnSpPr>
+            <a:cxnSpLocks/>
+          </p:cNvCxnSpPr>
+          <p:nvPr/>
+        </p:nvCxnSpPr>
+        <p:spPr>
+          <a:xfrm>
+            <a:off x="242171" y="904587"/>
+            <a:ext cx="11586972" cy="0"/>
+          </a:xfrm>
+          <a:prstGeom prst="line">
+            <a:avLst/>
+          </a:prstGeom>
+          <a:ln w="31750"/>
+        </p:spPr>
+        <p:style>
+          <a:lnRef idx="1">
+            <a:schemeClr val="accent1"/>
+          </a:lnRef>
+          <a:fillRef idx="0">
+            <a:schemeClr val="accent1"/>
+          </a:fillRef>
+          <a:effectRef idx="0">
+            <a:schemeClr val="accent1"/>
+          </a:effectRef>
+          <a:fontRef idx="minor">
+            <a:schemeClr val="tx1"/>
+          </a:fontRef>
+        </p:style>
+      </p:cxnSp>
       <p:pic>
         <p:nvPicPr>
           <p:cNvPr id="13" name="Picture 12">
@@ -19403,7 +20127,1108 @@
           <p:nvPr/>
         </p:nvPicPr>
         <p:blipFill>
-          <a:blip r:embed="rId2"/>
+          <a:blip r:embed="rId3"/>
+          <a:stretch>
+            <a:fillRect/>
+          </a:stretch>
+        </p:blipFill>
+        <p:spPr>
+          <a:xfrm>
+            <a:off x="6035657" y="1678920"/>
+            <a:ext cx="5192889" cy="3894667"/>
+          </a:xfrm>
+          <a:prstGeom prst="rect">
+            <a:avLst/>
+          </a:prstGeom>
+          <a:ln w="38100" cap="sq">
+            <a:solidFill>
+              <a:srgbClr val="000000"/>
+            </a:solidFill>
+            <a:prstDash val="solid"/>
+            <a:miter lim="800000"/>
+          </a:ln>
+          <a:effectLst>
+            <a:outerShdw blurRad="50800" dist="38100" dir="2700000" algn="tl" rotWithShape="0">
+              <a:srgbClr val="000000">
+                <a:alpha val="43000"/>
+              </a:srgbClr>
+            </a:outerShdw>
+          </a:effectLst>
+        </p:spPr>
+      </p:pic>
+      <p:sp>
+        <p:nvSpPr>
+          <p:cNvPr id="5" name="TextBox 4">
+            <a:extLst>
+              <a:ext uri="{FF2B5EF4-FFF2-40B4-BE49-F238E27FC236}">
+                <a16:creationId xmlns:a16="http://schemas.microsoft.com/office/drawing/2014/main" id="{E4ED8E7C-423B-44CD-A1ED-2B44615ACEFC}"/>
+              </a:ext>
+            </a:extLst>
+          </p:cNvPr>
+          <p:cNvSpPr txBox="1"/>
+          <p:nvPr/>
+        </p:nvSpPr>
+        <p:spPr>
+          <a:xfrm>
+            <a:off x="487100" y="1155700"/>
+            <a:ext cx="4618300" cy="523220"/>
+          </a:xfrm>
+          <a:prstGeom prst="rect">
+            <a:avLst/>
+          </a:prstGeom>
+          <a:noFill/>
+        </p:spPr>
+        <p:txBody>
+          <a:bodyPr wrap="square" rtlCol="0">
+            <a:spAutoFit/>
+          </a:bodyPr>
+          <a:lstStyle/>
+          <a:p>
+            <a:r>
+              <a:rPr lang="en-US" sz="2800" dirty="0">
+                <a:solidFill>
+                  <a:schemeClr val="tx2"/>
+                </a:solidFill>
+              </a:rPr>
+              <a:t>User interface</a:t>
+            </a:r>
+          </a:p>
+        </p:txBody>
+      </p:sp>
+      <p:sp>
+        <p:nvSpPr>
+          <p:cNvPr id="2" name="Rectangle 1">
+            <a:extLst>
+              <a:ext uri="{FF2B5EF4-FFF2-40B4-BE49-F238E27FC236}">
+                <a16:creationId xmlns:a16="http://schemas.microsoft.com/office/drawing/2014/main" id="{7BCDC4E0-1680-4200-85BC-25A802B6C339}"/>
+              </a:ext>
+            </a:extLst>
+          </p:cNvPr>
+          <p:cNvSpPr/>
+          <p:nvPr/>
+        </p:nvSpPr>
+        <p:spPr>
+          <a:xfrm>
+            <a:off x="6035657" y="1678920"/>
+            <a:ext cx="5192889" cy="663162"/>
+          </a:xfrm>
+          <a:prstGeom prst="rect">
+            <a:avLst/>
+          </a:prstGeom>
+          <a:solidFill>
+            <a:schemeClr val="accent1">
+              <a:alpha val="50000"/>
+            </a:schemeClr>
+          </a:solidFill>
+          <a:ln>
+            <a:noFill/>
+          </a:ln>
+        </p:spPr>
+        <p:style>
+          <a:lnRef idx="0">
+            <a:scrgbClr r="0" g="0" b="0"/>
+          </a:lnRef>
+          <a:fillRef idx="0">
+            <a:scrgbClr r="0" g="0" b="0"/>
+          </a:fillRef>
+          <a:effectRef idx="0">
+            <a:scrgbClr r="0" g="0" b="0"/>
+          </a:effectRef>
+          <a:fontRef idx="minor">
+            <a:schemeClr val="lt1"/>
+          </a:fontRef>
+        </p:style>
+        <p:txBody>
+          <a:bodyPr rtlCol="0" anchor="ctr"/>
+          <a:lstStyle/>
+          <a:p>
+            <a:pPr algn="ctr"/>
+            <a:endParaRPr lang="en-US"/>
+          </a:p>
+        </p:txBody>
+      </p:sp>
+      <p:sp>
+        <p:nvSpPr>
+          <p:cNvPr id="10" name="Rectangle 9">
+            <a:extLst>
+              <a:ext uri="{FF2B5EF4-FFF2-40B4-BE49-F238E27FC236}">
+                <a16:creationId xmlns:a16="http://schemas.microsoft.com/office/drawing/2014/main" id="{F0A3E60A-418B-485C-9D91-93782074EAC1}"/>
+              </a:ext>
+            </a:extLst>
+          </p:cNvPr>
+          <p:cNvSpPr/>
+          <p:nvPr/>
+        </p:nvSpPr>
+        <p:spPr>
+          <a:xfrm>
+            <a:off x="6035657" y="2342083"/>
+            <a:ext cx="3829704" cy="1086917"/>
+          </a:xfrm>
+          <a:prstGeom prst="rect">
+            <a:avLst/>
+          </a:prstGeom>
+          <a:solidFill>
+            <a:schemeClr val="accent1">
+              <a:alpha val="50000"/>
+            </a:schemeClr>
+          </a:solidFill>
+          <a:ln>
+            <a:noFill/>
+          </a:ln>
+        </p:spPr>
+        <p:style>
+          <a:lnRef idx="0">
+            <a:scrgbClr r="0" g="0" b="0"/>
+          </a:lnRef>
+          <a:fillRef idx="0">
+            <a:scrgbClr r="0" g="0" b="0"/>
+          </a:fillRef>
+          <a:effectRef idx="0">
+            <a:scrgbClr r="0" g="0" b="0"/>
+          </a:effectRef>
+          <a:fontRef idx="minor">
+            <a:schemeClr val="lt1"/>
+          </a:fontRef>
+        </p:style>
+        <p:txBody>
+          <a:bodyPr rtlCol="0" anchor="ctr"/>
+          <a:lstStyle/>
+          <a:p>
+            <a:pPr algn="ctr"/>
+            <a:endParaRPr lang="en-US" dirty="0"/>
+          </a:p>
+        </p:txBody>
+      </p:sp>
+      <p:sp>
+        <p:nvSpPr>
+          <p:cNvPr id="11" name="Rectangle 10">
+            <a:extLst>
+              <a:ext uri="{FF2B5EF4-FFF2-40B4-BE49-F238E27FC236}">
+                <a16:creationId xmlns:a16="http://schemas.microsoft.com/office/drawing/2014/main" id="{C8DB7715-F1D1-4204-8C44-06B93F519AE1}"/>
+              </a:ext>
+            </a:extLst>
+          </p:cNvPr>
+          <p:cNvSpPr/>
+          <p:nvPr/>
+        </p:nvSpPr>
+        <p:spPr>
+          <a:xfrm>
+            <a:off x="6035657" y="3419251"/>
+            <a:ext cx="3829704" cy="2154336"/>
+          </a:xfrm>
+          <a:prstGeom prst="rect">
+            <a:avLst/>
+          </a:prstGeom>
+          <a:solidFill>
+            <a:schemeClr val="accent1">
+              <a:alpha val="50000"/>
+            </a:schemeClr>
+          </a:solidFill>
+          <a:ln>
+            <a:noFill/>
+          </a:ln>
+        </p:spPr>
+        <p:style>
+          <a:lnRef idx="0">
+            <a:scrgbClr r="0" g="0" b="0"/>
+          </a:lnRef>
+          <a:fillRef idx="0">
+            <a:scrgbClr r="0" g="0" b="0"/>
+          </a:fillRef>
+          <a:effectRef idx="0">
+            <a:scrgbClr r="0" g="0" b="0"/>
+          </a:effectRef>
+          <a:fontRef idx="minor">
+            <a:schemeClr val="lt1"/>
+          </a:fontRef>
+        </p:style>
+        <p:txBody>
+          <a:bodyPr rtlCol="0" anchor="ctr"/>
+          <a:lstStyle/>
+          <a:p>
+            <a:pPr algn="ctr"/>
+            <a:endParaRPr lang="en-US"/>
+          </a:p>
+        </p:txBody>
+      </p:sp>
+      <p:sp>
+        <p:nvSpPr>
+          <p:cNvPr id="12" name="Rectangle 11">
+            <a:extLst>
+              <a:ext uri="{FF2B5EF4-FFF2-40B4-BE49-F238E27FC236}">
+                <a16:creationId xmlns:a16="http://schemas.microsoft.com/office/drawing/2014/main" id="{8CE17B37-C71F-4478-8296-8778358267F5}"/>
+              </a:ext>
+            </a:extLst>
+          </p:cNvPr>
+          <p:cNvSpPr/>
+          <p:nvPr/>
+        </p:nvSpPr>
+        <p:spPr>
+          <a:xfrm>
+            <a:off x="9865361" y="2342083"/>
+            <a:ext cx="1363185" cy="3231504"/>
+          </a:xfrm>
+          <a:prstGeom prst="rect">
+            <a:avLst/>
+          </a:prstGeom>
+          <a:solidFill>
+            <a:schemeClr val="accent1">
+              <a:alpha val="50000"/>
+            </a:schemeClr>
+          </a:solidFill>
+          <a:ln>
+            <a:noFill/>
+          </a:ln>
+        </p:spPr>
+        <p:style>
+          <a:lnRef idx="0">
+            <a:scrgbClr r="0" g="0" b="0"/>
+          </a:lnRef>
+          <a:fillRef idx="0">
+            <a:scrgbClr r="0" g="0" b="0"/>
+          </a:fillRef>
+          <a:effectRef idx="0">
+            <a:scrgbClr r="0" g="0" b="0"/>
+          </a:effectRef>
+          <a:fontRef idx="minor">
+            <a:schemeClr val="lt1"/>
+          </a:fontRef>
+        </p:style>
+        <p:txBody>
+          <a:bodyPr rtlCol="0" anchor="ctr"/>
+          <a:lstStyle/>
+          <a:p>
+            <a:pPr algn="ctr"/>
+            <a:endParaRPr lang="en-US"/>
+          </a:p>
+        </p:txBody>
+      </p:sp>
+      <p:sp>
+        <p:nvSpPr>
+          <p:cNvPr id="14" name="TextBox 13">
+            <a:extLst>
+              <a:ext uri="{FF2B5EF4-FFF2-40B4-BE49-F238E27FC236}">
+                <a16:creationId xmlns:a16="http://schemas.microsoft.com/office/drawing/2014/main" id="{375098D7-A865-4C53-9EF6-3099FBB64E17}"/>
+              </a:ext>
+            </a:extLst>
+          </p:cNvPr>
+          <p:cNvSpPr txBox="1"/>
+          <p:nvPr/>
+        </p:nvSpPr>
+        <p:spPr>
+          <a:xfrm>
+            <a:off x="900000" y="1569710"/>
+            <a:ext cx="4618300" cy="1569660"/>
+          </a:xfrm>
+          <a:prstGeom prst="rect">
+            <a:avLst/>
+          </a:prstGeom>
+          <a:noFill/>
+        </p:spPr>
+        <p:txBody>
+          <a:bodyPr wrap="square" rtlCol="0">
+            <a:spAutoFit/>
+          </a:bodyPr>
+          <a:lstStyle/>
+          <a:p>
+            <a:pPr marL="342900" indent="-342900">
+              <a:buFont typeface="Arial" panose="020B0604020202020204" pitchFamily="34" charset="0"/>
+              <a:buChar char="•"/>
+            </a:pPr>
+            <a:r>
+              <a:rPr lang="en-US" sz="2400" dirty="0">
+                <a:solidFill>
+                  <a:schemeClr val="tx2"/>
+                </a:solidFill>
+              </a:rPr>
+              <a:t>Room location</a:t>
+            </a:r>
+          </a:p>
+          <a:p>
+            <a:pPr marL="342900" indent="-342900">
+              <a:buFont typeface="Arial" panose="020B0604020202020204" pitchFamily="34" charset="0"/>
+              <a:buChar char="•"/>
+            </a:pPr>
+            <a:r>
+              <a:rPr lang="en-US" sz="2400" dirty="0">
+                <a:solidFill>
+                  <a:schemeClr val="tx2"/>
+                </a:solidFill>
+              </a:rPr>
+              <a:t>Current room status</a:t>
+            </a:r>
+          </a:p>
+          <a:p>
+            <a:pPr marL="342900" indent="-342900">
+              <a:buFont typeface="Arial" panose="020B0604020202020204" pitchFamily="34" charset="0"/>
+              <a:buChar char="•"/>
+            </a:pPr>
+            <a:r>
+              <a:rPr lang="en-US" sz="2400" dirty="0">
+                <a:solidFill>
+                  <a:schemeClr val="tx2"/>
+                </a:solidFill>
+              </a:rPr>
+              <a:t>Future events</a:t>
+            </a:r>
+          </a:p>
+          <a:p>
+            <a:pPr marL="342900" indent="-342900">
+              <a:buFont typeface="Arial" panose="020B0604020202020204" pitchFamily="34" charset="0"/>
+              <a:buChar char="•"/>
+            </a:pPr>
+            <a:r>
+              <a:rPr lang="en-US" sz="2400" dirty="0">
+                <a:solidFill>
+                  <a:schemeClr val="tx2"/>
+                </a:solidFill>
+              </a:rPr>
+              <a:t>Graphical time table</a:t>
+            </a:r>
+          </a:p>
+        </p:txBody>
+      </p:sp>
+    </p:spTree>
+    <p:extLst>
+      <p:ext uri="{BB962C8B-B14F-4D97-AF65-F5344CB8AC3E}">
+        <p14:creationId xmlns:p14="http://schemas.microsoft.com/office/powerpoint/2010/main" val="2672308085"/>
+      </p:ext>
+    </p:extLst>
+  </p:cSld>
+  <p:clrMapOvr>
+    <a:masterClrMapping/>
+  </p:clrMapOvr>
+  <mc:AlternateContent xmlns:mc="http://schemas.openxmlformats.org/markup-compatibility/2006" xmlns:p159="http://schemas.microsoft.com/office/powerpoint/2015/09/main">
+    <mc:Choice Requires="p159">
+      <p:transition xmlns:p14="http://schemas.microsoft.com/office/powerpoint/2010/main" spd="slow" p14:dur="2000">
+        <p159:morph option="byObject"/>
+      </p:transition>
+    </mc:Choice>
+    <mc:Fallback xmlns="">
+      <p:transition spd="slow">
+        <p:fade/>
+      </p:transition>
+    </mc:Fallback>
+  </mc:AlternateContent>
+  <p:timing>
+    <p:tnLst>
+      <p:par>
+        <p:cTn id="1" dur="indefinite" restart="never" nodeType="tmRoot">
+          <p:childTnLst>
+            <p:seq concurrent="1" nextAc="seek">
+              <p:cTn id="2" dur="indefinite" nodeType="mainSeq">
+                <p:childTnLst>
+                  <p:par>
+                    <p:cTn id="3" fill="hold">
+                      <p:stCondLst>
+                        <p:cond delay="indefinite"/>
+                      </p:stCondLst>
+                      <p:childTnLst>
+                        <p:par>
+                          <p:cTn id="4" fill="hold">
+                            <p:stCondLst>
+                              <p:cond delay="0"/>
+                            </p:stCondLst>
+                            <p:childTnLst>
+                              <p:par>
+                                <p:cTn id="5" presetID="10" presetClass="entr" presetSubtype="0" fill="hold" grpId="0" nodeType="clickEffect">
+                                  <p:stCondLst>
+                                    <p:cond delay="0"/>
+                                  </p:stCondLst>
+                                  <p:childTnLst>
+                                    <p:set>
+                                      <p:cBhvr>
+                                        <p:cTn id="6" dur="1" fill="hold">
+                                          <p:stCondLst>
+                                            <p:cond delay="0"/>
+                                          </p:stCondLst>
+                                        </p:cTn>
+                                        <p:tgtEl>
+                                          <p:spTgt spid="2"/>
+                                        </p:tgtEl>
+                                        <p:attrNameLst>
+                                          <p:attrName>style.visibility</p:attrName>
+                                        </p:attrNameLst>
+                                      </p:cBhvr>
+                                      <p:to>
+                                        <p:strVal val="visible"/>
+                                      </p:to>
+                                    </p:set>
+                                    <p:animEffect transition="in" filter="fade">
+                                      <p:cBhvr>
+                                        <p:cTn id="7" dur="500"/>
+                                        <p:tgtEl>
+                                          <p:spTgt spid="2"/>
+                                        </p:tgtEl>
+                                      </p:cBhvr>
+                                    </p:animEffect>
+                                  </p:childTnLst>
+                                </p:cTn>
+                              </p:par>
+                              <p:par>
+                                <p:cTn id="8" presetID="10" presetClass="entr" presetSubtype="0" fill="hold" nodeType="withEffect">
+                                  <p:stCondLst>
+                                    <p:cond delay="0"/>
+                                  </p:stCondLst>
+                                  <p:childTnLst>
+                                    <p:set>
+                                      <p:cBhvr>
+                                        <p:cTn id="9" dur="1" fill="hold">
+                                          <p:stCondLst>
+                                            <p:cond delay="0"/>
+                                          </p:stCondLst>
+                                        </p:cTn>
+                                        <p:tgtEl>
+                                          <p:spTgt spid="14">
+                                            <p:txEl>
+                                              <p:pRg st="0" end="0"/>
+                                            </p:txEl>
+                                          </p:spTgt>
+                                        </p:tgtEl>
+                                        <p:attrNameLst>
+                                          <p:attrName>style.visibility</p:attrName>
+                                        </p:attrNameLst>
+                                      </p:cBhvr>
+                                      <p:to>
+                                        <p:strVal val="visible"/>
+                                      </p:to>
+                                    </p:set>
+                                    <p:animEffect transition="in" filter="fade">
+                                      <p:cBhvr>
+                                        <p:cTn id="10" dur="500"/>
+                                        <p:tgtEl>
+                                          <p:spTgt spid="14">
+                                            <p:txEl>
+                                              <p:pRg st="0" end="0"/>
+                                            </p:txEl>
+                                          </p:spTgt>
+                                        </p:tgtEl>
+                                      </p:cBhvr>
+                                    </p:animEffect>
+                                  </p:childTnLst>
+                                </p:cTn>
+                              </p:par>
+                            </p:childTnLst>
+                          </p:cTn>
+                        </p:par>
+                      </p:childTnLst>
+                    </p:cTn>
+                  </p:par>
+                  <p:par>
+                    <p:cTn id="11" fill="hold">
+                      <p:stCondLst>
+                        <p:cond delay="indefinite"/>
+                      </p:stCondLst>
+                      <p:childTnLst>
+                        <p:par>
+                          <p:cTn id="12" fill="hold">
+                            <p:stCondLst>
+                              <p:cond delay="0"/>
+                            </p:stCondLst>
+                            <p:childTnLst>
+                              <p:par>
+                                <p:cTn id="13" presetID="10" presetClass="exit" presetSubtype="0" fill="hold" grpId="1" nodeType="clickEffect">
+                                  <p:stCondLst>
+                                    <p:cond delay="0"/>
+                                  </p:stCondLst>
+                                  <p:childTnLst>
+                                    <p:animEffect transition="out" filter="fade">
+                                      <p:cBhvr>
+                                        <p:cTn id="14" dur="500"/>
+                                        <p:tgtEl>
+                                          <p:spTgt spid="2"/>
+                                        </p:tgtEl>
+                                      </p:cBhvr>
+                                    </p:animEffect>
+                                    <p:set>
+                                      <p:cBhvr>
+                                        <p:cTn id="15" dur="1" fill="hold">
+                                          <p:stCondLst>
+                                            <p:cond delay="499"/>
+                                          </p:stCondLst>
+                                        </p:cTn>
+                                        <p:tgtEl>
+                                          <p:spTgt spid="2"/>
+                                        </p:tgtEl>
+                                        <p:attrNameLst>
+                                          <p:attrName>style.visibility</p:attrName>
+                                        </p:attrNameLst>
+                                      </p:cBhvr>
+                                      <p:to>
+                                        <p:strVal val="hidden"/>
+                                      </p:to>
+                                    </p:set>
+                                  </p:childTnLst>
+                                </p:cTn>
+                              </p:par>
+                              <p:par>
+                                <p:cTn id="16" presetID="10" presetClass="entr" presetSubtype="0" fill="hold" grpId="0" nodeType="withEffect">
+                                  <p:stCondLst>
+                                    <p:cond delay="0"/>
+                                  </p:stCondLst>
+                                  <p:childTnLst>
+                                    <p:set>
+                                      <p:cBhvr>
+                                        <p:cTn id="17" dur="1" fill="hold">
+                                          <p:stCondLst>
+                                            <p:cond delay="0"/>
+                                          </p:stCondLst>
+                                        </p:cTn>
+                                        <p:tgtEl>
+                                          <p:spTgt spid="10"/>
+                                        </p:tgtEl>
+                                        <p:attrNameLst>
+                                          <p:attrName>style.visibility</p:attrName>
+                                        </p:attrNameLst>
+                                      </p:cBhvr>
+                                      <p:to>
+                                        <p:strVal val="visible"/>
+                                      </p:to>
+                                    </p:set>
+                                    <p:animEffect transition="in" filter="fade">
+                                      <p:cBhvr>
+                                        <p:cTn id="18" dur="500"/>
+                                        <p:tgtEl>
+                                          <p:spTgt spid="10"/>
+                                        </p:tgtEl>
+                                      </p:cBhvr>
+                                    </p:animEffect>
+                                  </p:childTnLst>
+                                </p:cTn>
+                              </p:par>
+                              <p:par>
+                                <p:cTn id="19" presetID="10" presetClass="entr" presetSubtype="0" fill="hold" nodeType="withEffect">
+                                  <p:stCondLst>
+                                    <p:cond delay="0"/>
+                                  </p:stCondLst>
+                                  <p:childTnLst>
+                                    <p:set>
+                                      <p:cBhvr>
+                                        <p:cTn id="20" dur="1" fill="hold">
+                                          <p:stCondLst>
+                                            <p:cond delay="0"/>
+                                          </p:stCondLst>
+                                        </p:cTn>
+                                        <p:tgtEl>
+                                          <p:spTgt spid="14">
+                                            <p:txEl>
+                                              <p:pRg st="1" end="1"/>
+                                            </p:txEl>
+                                          </p:spTgt>
+                                        </p:tgtEl>
+                                        <p:attrNameLst>
+                                          <p:attrName>style.visibility</p:attrName>
+                                        </p:attrNameLst>
+                                      </p:cBhvr>
+                                      <p:to>
+                                        <p:strVal val="visible"/>
+                                      </p:to>
+                                    </p:set>
+                                    <p:animEffect transition="in" filter="fade">
+                                      <p:cBhvr>
+                                        <p:cTn id="21" dur="500"/>
+                                        <p:tgtEl>
+                                          <p:spTgt spid="14">
+                                            <p:txEl>
+                                              <p:pRg st="1" end="1"/>
+                                            </p:txEl>
+                                          </p:spTgt>
+                                        </p:tgtEl>
+                                      </p:cBhvr>
+                                    </p:animEffect>
+                                  </p:childTnLst>
+                                </p:cTn>
+                              </p:par>
+                            </p:childTnLst>
+                          </p:cTn>
+                        </p:par>
+                      </p:childTnLst>
+                    </p:cTn>
+                  </p:par>
+                  <p:par>
+                    <p:cTn id="22" fill="hold">
+                      <p:stCondLst>
+                        <p:cond delay="indefinite"/>
+                      </p:stCondLst>
+                      <p:childTnLst>
+                        <p:par>
+                          <p:cTn id="23" fill="hold">
+                            <p:stCondLst>
+                              <p:cond delay="0"/>
+                            </p:stCondLst>
+                            <p:childTnLst>
+                              <p:par>
+                                <p:cTn id="24" presetID="10" presetClass="exit" presetSubtype="0" fill="hold" grpId="1" nodeType="clickEffect">
+                                  <p:stCondLst>
+                                    <p:cond delay="0"/>
+                                  </p:stCondLst>
+                                  <p:childTnLst>
+                                    <p:animEffect transition="out" filter="fade">
+                                      <p:cBhvr>
+                                        <p:cTn id="25" dur="500"/>
+                                        <p:tgtEl>
+                                          <p:spTgt spid="10"/>
+                                        </p:tgtEl>
+                                      </p:cBhvr>
+                                    </p:animEffect>
+                                    <p:set>
+                                      <p:cBhvr>
+                                        <p:cTn id="26" dur="1" fill="hold">
+                                          <p:stCondLst>
+                                            <p:cond delay="499"/>
+                                          </p:stCondLst>
+                                        </p:cTn>
+                                        <p:tgtEl>
+                                          <p:spTgt spid="10"/>
+                                        </p:tgtEl>
+                                        <p:attrNameLst>
+                                          <p:attrName>style.visibility</p:attrName>
+                                        </p:attrNameLst>
+                                      </p:cBhvr>
+                                      <p:to>
+                                        <p:strVal val="hidden"/>
+                                      </p:to>
+                                    </p:set>
+                                  </p:childTnLst>
+                                </p:cTn>
+                              </p:par>
+                              <p:par>
+                                <p:cTn id="27" presetID="10" presetClass="entr" presetSubtype="0" fill="hold" grpId="0" nodeType="withEffect">
+                                  <p:stCondLst>
+                                    <p:cond delay="0"/>
+                                  </p:stCondLst>
+                                  <p:childTnLst>
+                                    <p:set>
+                                      <p:cBhvr>
+                                        <p:cTn id="28" dur="1" fill="hold">
+                                          <p:stCondLst>
+                                            <p:cond delay="0"/>
+                                          </p:stCondLst>
+                                        </p:cTn>
+                                        <p:tgtEl>
+                                          <p:spTgt spid="11"/>
+                                        </p:tgtEl>
+                                        <p:attrNameLst>
+                                          <p:attrName>style.visibility</p:attrName>
+                                        </p:attrNameLst>
+                                      </p:cBhvr>
+                                      <p:to>
+                                        <p:strVal val="visible"/>
+                                      </p:to>
+                                    </p:set>
+                                    <p:animEffect transition="in" filter="fade">
+                                      <p:cBhvr>
+                                        <p:cTn id="29" dur="500"/>
+                                        <p:tgtEl>
+                                          <p:spTgt spid="11"/>
+                                        </p:tgtEl>
+                                      </p:cBhvr>
+                                    </p:animEffect>
+                                  </p:childTnLst>
+                                </p:cTn>
+                              </p:par>
+                              <p:par>
+                                <p:cTn id="30" presetID="10" presetClass="entr" presetSubtype="0" fill="hold" nodeType="withEffect">
+                                  <p:stCondLst>
+                                    <p:cond delay="0"/>
+                                  </p:stCondLst>
+                                  <p:childTnLst>
+                                    <p:set>
+                                      <p:cBhvr>
+                                        <p:cTn id="31" dur="1" fill="hold">
+                                          <p:stCondLst>
+                                            <p:cond delay="0"/>
+                                          </p:stCondLst>
+                                        </p:cTn>
+                                        <p:tgtEl>
+                                          <p:spTgt spid="14">
+                                            <p:txEl>
+                                              <p:pRg st="2" end="2"/>
+                                            </p:txEl>
+                                          </p:spTgt>
+                                        </p:tgtEl>
+                                        <p:attrNameLst>
+                                          <p:attrName>style.visibility</p:attrName>
+                                        </p:attrNameLst>
+                                      </p:cBhvr>
+                                      <p:to>
+                                        <p:strVal val="visible"/>
+                                      </p:to>
+                                    </p:set>
+                                    <p:animEffect transition="in" filter="fade">
+                                      <p:cBhvr>
+                                        <p:cTn id="32" dur="500"/>
+                                        <p:tgtEl>
+                                          <p:spTgt spid="14">
+                                            <p:txEl>
+                                              <p:pRg st="2" end="2"/>
+                                            </p:txEl>
+                                          </p:spTgt>
+                                        </p:tgtEl>
+                                      </p:cBhvr>
+                                    </p:animEffect>
+                                  </p:childTnLst>
+                                </p:cTn>
+                              </p:par>
+                            </p:childTnLst>
+                          </p:cTn>
+                        </p:par>
+                      </p:childTnLst>
+                    </p:cTn>
+                  </p:par>
+                  <p:par>
+                    <p:cTn id="33" fill="hold">
+                      <p:stCondLst>
+                        <p:cond delay="indefinite"/>
+                      </p:stCondLst>
+                      <p:childTnLst>
+                        <p:par>
+                          <p:cTn id="34" fill="hold">
+                            <p:stCondLst>
+                              <p:cond delay="0"/>
+                            </p:stCondLst>
+                            <p:childTnLst>
+                              <p:par>
+                                <p:cTn id="35" presetID="10" presetClass="exit" presetSubtype="0" fill="hold" grpId="1" nodeType="clickEffect">
+                                  <p:stCondLst>
+                                    <p:cond delay="0"/>
+                                  </p:stCondLst>
+                                  <p:childTnLst>
+                                    <p:animEffect transition="out" filter="fade">
+                                      <p:cBhvr>
+                                        <p:cTn id="36" dur="500"/>
+                                        <p:tgtEl>
+                                          <p:spTgt spid="11"/>
+                                        </p:tgtEl>
+                                      </p:cBhvr>
+                                    </p:animEffect>
+                                    <p:set>
+                                      <p:cBhvr>
+                                        <p:cTn id="37" dur="1" fill="hold">
+                                          <p:stCondLst>
+                                            <p:cond delay="499"/>
+                                          </p:stCondLst>
+                                        </p:cTn>
+                                        <p:tgtEl>
+                                          <p:spTgt spid="11"/>
+                                        </p:tgtEl>
+                                        <p:attrNameLst>
+                                          <p:attrName>style.visibility</p:attrName>
+                                        </p:attrNameLst>
+                                      </p:cBhvr>
+                                      <p:to>
+                                        <p:strVal val="hidden"/>
+                                      </p:to>
+                                    </p:set>
+                                  </p:childTnLst>
+                                </p:cTn>
+                              </p:par>
+                              <p:par>
+                                <p:cTn id="38" presetID="10" presetClass="entr" presetSubtype="0" fill="hold" grpId="0" nodeType="withEffect">
+                                  <p:stCondLst>
+                                    <p:cond delay="0"/>
+                                  </p:stCondLst>
+                                  <p:childTnLst>
+                                    <p:set>
+                                      <p:cBhvr>
+                                        <p:cTn id="39" dur="1" fill="hold">
+                                          <p:stCondLst>
+                                            <p:cond delay="0"/>
+                                          </p:stCondLst>
+                                        </p:cTn>
+                                        <p:tgtEl>
+                                          <p:spTgt spid="12"/>
+                                        </p:tgtEl>
+                                        <p:attrNameLst>
+                                          <p:attrName>style.visibility</p:attrName>
+                                        </p:attrNameLst>
+                                      </p:cBhvr>
+                                      <p:to>
+                                        <p:strVal val="visible"/>
+                                      </p:to>
+                                    </p:set>
+                                    <p:animEffect transition="in" filter="fade">
+                                      <p:cBhvr>
+                                        <p:cTn id="40" dur="500"/>
+                                        <p:tgtEl>
+                                          <p:spTgt spid="12"/>
+                                        </p:tgtEl>
+                                      </p:cBhvr>
+                                    </p:animEffect>
+                                  </p:childTnLst>
+                                </p:cTn>
+                              </p:par>
+                              <p:par>
+                                <p:cTn id="41" presetID="10" presetClass="entr" presetSubtype="0" fill="hold" nodeType="withEffect">
+                                  <p:stCondLst>
+                                    <p:cond delay="0"/>
+                                  </p:stCondLst>
+                                  <p:childTnLst>
+                                    <p:set>
+                                      <p:cBhvr>
+                                        <p:cTn id="42" dur="1" fill="hold">
+                                          <p:stCondLst>
+                                            <p:cond delay="0"/>
+                                          </p:stCondLst>
+                                        </p:cTn>
+                                        <p:tgtEl>
+                                          <p:spTgt spid="14">
+                                            <p:txEl>
+                                              <p:pRg st="3" end="3"/>
+                                            </p:txEl>
+                                          </p:spTgt>
+                                        </p:tgtEl>
+                                        <p:attrNameLst>
+                                          <p:attrName>style.visibility</p:attrName>
+                                        </p:attrNameLst>
+                                      </p:cBhvr>
+                                      <p:to>
+                                        <p:strVal val="visible"/>
+                                      </p:to>
+                                    </p:set>
+                                    <p:animEffect transition="in" filter="fade">
+                                      <p:cBhvr>
+                                        <p:cTn id="43" dur="500"/>
+                                        <p:tgtEl>
+                                          <p:spTgt spid="14">
+                                            <p:txEl>
+                                              <p:pRg st="3" end="3"/>
+                                            </p:txEl>
+                                          </p:spTgt>
+                                        </p:tgtEl>
+                                      </p:cBhvr>
+                                    </p:animEffect>
+                                  </p:childTnLst>
+                                </p:cTn>
+                              </p:par>
+                            </p:childTnLst>
+                          </p:cTn>
+                        </p:par>
+                      </p:childTnLst>
+                    </p:cTn>
+                  </p:par>
+                  <p:par>
+                    <p:cTn id="44" fill="hold">
+                      <p:stCondLst>
+                        <p:cond delay="indefinite"/>
+                      </p:stCondLst>
+                      <p:childTnLst>
+                        <p:par>
+                          <p:cTn id="45" fill="hold">
+                            <p:stCondLst>
+                              <p:cond delay="0"/>
+                            </p:stCondLst>
+                            <p:childTnLst>
+                              <p:par>
+                                <p:cTn id="46" presetID="10" presetClass="exit" presetSubtype="0" fill="hold" grpId="1" nodeType="clickEffect">
+                                  <p:stCondLst>
+                                    <p:cond delay="0"/>
+                                  </p:stCondLst>
+                                  <p:childTnLst>
+                                    <p:animEffect transition="out" filter="fade">
+                                      <p:cBhvr>
+                                        <p:cTn id="47" dur="500"/>
+                                        <p:tgtEl>
+                                          <p:spTgt spid="12"/>
+                                        </p:tgtEl>
+                                      </p:cBhvr>
+                                    </p:animEffect>
+                                    <p:set>
+                                      <p:cBhvr>
+                                        <p:cTn id="48" dur="1" fill="hold">
+                                          <p:stCondLst>
+                                            <p:cond delay="499"/>
+                                          </p:stCondLst>
+                                        </p:cTn>
+                                        <p:tgtEl>
+                                          <p:spTgt spid="12"/>
+                                        </p:tgtEl>
+                                        <p:attrNameLst>
+                                          <p:attrName>style.visibility</p:attrName>
+                                        </p:attrNameLst>
+                                      </p:cBhvr>
+                                      <p:to>
+                                        <p:strVal val="hidden"/>
+                                      </p:to>
+                                    </p:set>
+                                  </p:childTnLst>
+                                </p:cTn>
+                              </p:par>
+                            </p:childTnLst>
+                          </p:cTn>
+                        </p:par>
+                      </p:childTnLst>
+                    </p:cTn>
+                  </p:par>
+                </p:childTnLst>
+              </p:cTn>
+              <p:prevCondLst>
+                <p:cond evt="onPrev" delay="0">
+                  <p:tgtEl>
+                    <p:sldTgt/>
+                  </p:tgtEl>
+                </p:cond>
+              </p:prevCondLst>
+              <p:nextCondLst>
+                <p:cond evt="onNext" delay="0">
+                  <p:tgtEl>
+                    <p:sldTgt/>
+                  </p:tgtEl>
+                </p:cond>
+              </p:nextCondLst>
+            </p:seq>
+          </p:childTnLst>
+        </p:cTn>
+      </p:par>
+    </p:tnLst>
+    <p:bldLst>
+      <p:bldP spid="2" grpId="0" animBg="1"/>
+      <p:bldP spid="2" grpId="1" animBg="1"/>
+      <p:bldP spid="10" grpId="0" animBg="1"/>
+      <p:bldP spid="10" grpId="1" animBg="1"/>
+      <p:bldP spid="11" grpId="0" animBg="1"/>
+      <p:bldP spid="11" grpId="1" animBg="1"/>
+      <p:bldP spid="12" grpId="0" animBg="1"/>
+      <p:bldP spid="12" grpId="1" animBg="1"/>
+    </p:bldLst>
+  </p:timing>
+</p:sld>
+</file>
+
+<file path=ppt/slides/slide37.xml><?xml version="1.0" encoding="utf-8"?>
+<p:sld xmlns:a="http://schemas.openxmlformats.org/drawingml/2006/main" xmlns:r="http://schemas.openxmlformats.org/officeDocument/2006/relationships" xmlns:p="http://schemas.openxmlformats.org/presentationml/2006/main">
+  <p:cSld>
+    <p:spTree>
+      <p:nvGrpSpPr>
+        <p:cNvPr id="1" name=""/>
+        <p:cNvGrpSpPr/>
+        <p:nvPr/>
+      </p:nvGrpSpPr>
+      <p:grpSpPr>
+        <a:xfrm>
+          <a:off x="0" y="0"/>
+          <a:ext cx="0" cy="0"/>
+          <a:chOff x="0" y="0"/>
+          <a:chExt cx="0" cy="0"/>
+        </a:xfrm>
+      </p:grpSpPr>
+      <p:sp>
+        <p:nvSpPr>
+          <p:cNvPr id="3" name="Slide Number Placeholder 2">
+            <a:extLst>
+              <a:ext uri="{FF2B5EF4-FFF2-40B4-BE49-F238E27FC236}">
+                <a16:creationId xmlns:a16="http://schemas.microsoft.com/office/drawing/2014/main" id="{EB3515B5-7667-4BDB-8B14-35FDCC252BCA}"/>
+              </a:ext>
+            </a:extLst>
+          </p:cNvPr>
+          <p:cNvSpPr>
+            <a:spLocks noGrp="1"/>
+          </p:cNvSpPr>
+          <p:nvPr>
+            <p:ph type="sldNum" sz="quarter" idx="12"/>
+          </p:nvPr>
+        </p:nvSpPr>
+        <p:spPr/>
+        <p:txBody>
+          <a:bodyPr/>
+          <a:lstStyle/>
+          <a:p>
+            <a:fld id="{0A297500-7527-634B-90F4-69D0994C32B4}" type="slidenum">
+              <a:rPr lang="nl-NL" smtClean="0"/>
+              <a:t>37</a:t>
+            </a:fld>
+            <a:endParaRPr lang="nl-NL"/>
+          </a:p>
+        </p:txBody>
+      </p:sp>
+      <p:sp>
+        <p:nvSpPr>
+          <p:cNvPr id="6" name="Title 2">
+            <a:extLst>
+              <a:ext uri="{FF2B5EF4-FFF2-40B4-BE49-F238E27FC236}">
+                <a16:creationId xmlns:a16="http://schemas.microsoft.com/office/drawing/2014/main" id="{6816E571-577C-45B0-82FD-087CE38D2D8E}"/>
+              </a:ext>
+            </a:extLst>
+          </p:cNvPr>
+          <p:cNvSpPr>
+            <a:spLocks noGrp="1"/>
+          </p:cNvSpPr>
+          <p:nvPr>
+            <p:ph type="title"/>
+          </p:nvPr>
+        </p:nvSpPr>
+        <p:spPr>
+          <a:xfrm>
+            <a:off x="242171" y="119474"/>
+            <a:ext cx="11041200" cy="692651"/>
+          </a:xfrm>
+        </p:spPr>
+        <p:txBody>
+          <a:bodyPr/>
+          <a:lstStyle/>
+          <a:p>
+            <a:r>
+              <a:rPr lang="en-US" dirty="0"/>
+              <a:t>E-Paper Display</a:t>
+            </a:r>
+          </a:p>
+        </p:txBody>
+      </p:sp>
+      <p:cxnSp>
+        <p:nvCxnSpPr>
+          <p:cNvPr id="7" name="Straight Connector 6">
+            <a:extLst>
+              <a:ext uri="{FF2B5EF4-FFF2-40B4-BE49-F238E27FC236}">
+                <a16:creationId xmlns:a16="http://schemas.microsoft.com/office/drawing/2014/main" id="{4937C0F6-3883-40B8-A552-46D8B49C4CC2}"/>
+              </a:ext>
+            </a:extLst>
+          </p:cNvPr>
+          <p:cNvCxnSpPr>
+            <a:cxnSpLocks/>
+          </p:cNvCxnSpPr>
+          <p:nvPr/>
+        </p:nvCxnSpPr>
+        <p:spPr>
+          <a:xfrm>
+            <a:off x="242171" y="904587"/>
+            <a:ext cx="11586972" cy="0"/>
+          </a:xfrm>
+          <a:prstGeom prst="line">
+            <a:avLst/>
+          </a:prstGeom>
+          <a:ln w="31750"/>
+        </p:spPr>
+        <p:style>
+          <a:lnRef idx="1">
+            <a:schemeClr val="accent1"/>
+          </a:lnRef>
+          <a:fillRef idx="0">
+            <a:schemeClr val="accent1"/>
+          </a:fillRef>
+          <a:effectRef idx="0">
+            <a:schemeClr val="accent1"/>
+          </a:effectRef>
+          <a:fontRef idx="minor">
+            <a:schemeClr val="tx1"/>
+          </a:fontRef>
+        </p:style>
+      </p:cxnSp>
+      <p:pic>
+        <p:nvPicPr>
+          <p:cNvPr id="13" name="Picture 12">
+            <a:extLst>
+              <a:ext uri="{FF2B5EF4-FFF2-40B4-BE49-F238E27FC236}">
+                <a16:creationId xmlns:a16="http://schemas.microsoft.com/office/drawing/2014/main" id="{B003636B-B630-4521-9B79-14F4DC307C85}"/>
+              </a:ext>
+            </a:extLst>
+          </p:cNvPr>
+          <p:cNvPicPr>
+            <a:picLocks noChangeAspect="1"/>
+          </p:cNvPicPr>
+          <p:nvPr/>
+        </p:nvPicPr>
+        <p:blipFill>
+          <a:blip r:embed="rId3"/>
           <a:stretch>
             <a:fillRect/>
           </a:stretch>
@@ -19447,7 +21272,7 @@
           <p:nvPr/>
         </p:nvPicPr>
         <p:blipFill>
-          <a:blip r:embed="rId3"/>
+          <a:blip r:embed="rId4"/>
           <a:stretch>
             <a:fillRect/>
           </a:stretch>
@@ -19557,7 +21382,7 @@
     </p:spTree>
     <p:extLst>
       <p:ext uri="{BB962C8B-B14F-4D97-AF65-F5344CB8AC3E}">
-        <p14:creationId xmlns:p14="http://schemas.microsoft.com/office/powerpoint/2010/main" val="2672308085"/>
+        <p14:creationId xmlns:p14="http://schemas.microsoft.com/office/powerpoint/2010/main" val="3727038161"/>
       </p:ext>
     </p:extLst>
   </p:cSld>
@@ -19776,7 +21601,7 @@
 </p:sld>
 </file>
 
-<file path=ppt/slides/slide36.xml><?xml version="1.0" encoding="utf-8"?>
+<file path=ppt/slides/slide38.xml><?xml version="1.0" encoding="utf-8"?>
 <p:sld xmlns:a="http://schemas.openxmlformats.org/drawingml/2006/main" xmlns:r="http://schemas.openxmlformats.org/officeDocument/2006/relationships" xmlns:p="http://schemas.openxmlformats.org/presentationml/2006/main">
   <p:cSld>
     <p:spTree>
@@ -19816,7 +21641,7 @@
           <a:p>
             <a:fld id="{CF179DAE-D0A6-40C3-B8BC-6A97C268D03A}" type="slidenum">
               <a:rPr lang="nl-NL" smtClean="0"/>
-              <a:t>36</a:t>
+              <a:t>38</a:t>
             </a:fld>
             <a:endParaRPr lang="nl-NL"/>
           </a:p>
@@ -20366,7 +22191,7 @@
 </p:sld>
 </file>
 
-<file path=ppt/slides/slide37.xml><?xml version="1.0" encoding="utf-8"?>
+<file path=ppt/slides/slide39.xml><?xml version="1.0" encoding="utf-8"?>
 <p:sld xmlns:a="http://schemas.openxmlformats.org/drawingml/2006/main" xmlns:r="http://schemas.openxmlformats.org/officeDocument/2006/relationships" xmlns:p="http://schemas.openxmlformats.org/presentationml/2006/main">
   <p:cSld>
     <p:spTree>
@@ -20385,10 +22210,10 @@
       </p:grpSpPr>
       <p:sp>
         <p:nvSpPr>
-          <p:cNvPr id="2" name="Slide Number Placeholder 1">
+          <p:cNvPr id="3" name="Slide Number Placeholder 2">
             <a:extLst>
               <a:ext uri="{FF2B5EF4-FFF2-40B4-BE49-F238E27FC236}">
-                <a16:creationId xmlns:a16="http://schemas.microsoft.com/office/drawing/2014/main" id="{37028FF3-B542-4155-BCE7-DF921D46D33C}"/>
+                <a16:creationId xmlns:a16="http://schemas.microsoft.com/office/drawing/2014/main" id="{EB3515B5-7667-4BDB-8B14-35FDCC252BCA}"/>
               </a:ext>
             </a:extLst>
           </p:cNvPr>
@@ -20404,108 +22229,20 @@
           <a:bodyPr/>
           <a:lstStyle/>
           <a:p>
-            <a:fld id="{CF179DAE-D0A6-40C3-B8BC-6A97C268D03A}" type="slidenum">
+            <a:fld id="{0A297500-7527-634B-90F4-69D0994C32B4}" type="slidenum">
               <a:rPr lang="nl-NL" smtClean="0"/>
-              <a:t>37</a:t>
+              <a:t>39</a:t>
             </a:fld>
             <a:endParaRPr lang="nl-NL"/>
-          </a:p>
-        </p:txBody>
-      </p:sp>
-      <p:pic>
-        <p:nvPicPr>
-          <p:cNvPr id="6" name="Graphic 5" descr="Thought bubble">
-            <a:extLst>
-              <a:ext uri="{FF2B5EF4-FFF2-40B4-BE49-F238E27FC236}">
-                <a16:creationId xmlns:a16="http://schemas.microsoft.com/office/drawing/2014/main" id="{6C49E457-35E4-458D-847D-80B8F1E46D58}"/>
-              </a:ext>
-            </a:extLst>
-          </p:cNvPr>
-          <p:cNvPicPr>
-            <a:picLocks noChangeAspect="1"/>
-          </p:cNvPicPr>
-          <p:nvPr/>
-        </p:nvPicPr>
-        <p:blipFill>
-          <a:blip r:embed="rId2">
-            <a:extLst>
-              <a:ext uri="{96DAC541-7B7A-43D3-8B79-37D633B846F1}">
-                <asvg:svgBlip xmlns:asvg="http://schemas.microsoft.com/office/drawing/2016/SVG/main" r:embed="rId3"/>
-              </a:ext>
-            </a:extLst>
-          </a:blip>
-          <a:stretch>
-            <a:fillRect/>
-          </a:stretch>
-        </p:blipFill>
-        <p:spPr>
-          <a:xfrm>
-            <a:off x="2720153" y="-1969690"/>
-            <a:ext cx="1825895" cy="1825895"/>
-          </a:xfrm>
-          <a:prstGeom prst="rect">
-            <a:avLst/>
-          </a:prstGeom>
-        </p:spPr>
-      </p:pic>
-      <p:sp>
-        <p:nvSpPr>
-          <p:cNvPr id="12" name="Rectangle 11">
-            <a:extLst>
-              <a:ext uri="{FF2B5EF4-FFF2-40B4-BE49-F238E27FC236}">
-                <a16:creationId xmlns:a16="http://schemas.microsoft.com/office/drawing/2014/main" id="{E3947AE4-440D-47FA-BE5F-42C03A4CC014}"/>
-              </a:ext>
-            </a:extLst>
-          </p:cNvPr>
-          <p:cNvSpPr/>
-          <p:nvPr/>
-        </p:nvSpPr>
-        <p:spPr>
-          <a:xfrm>
-            <a:off x="2549658" y="-319315"/>
-            <a:ext cx="2646453" cy="4659085"/>
-          </a:xfrm>
-          <a:prstGeom prst="rect">
-            <a:avLst/>
-          </a:prstGeom>
-          <a:solidFill>
-            <a:schemeClr val="bg2"/>
-          </a:solidFill>
-          <a:ln>
-            <a:noFill/>
-          </a:ln>
-        </p:spPr>
-        <p:style>
-          <a:lnRef idx="2">
-            <a:schemeClr val="accent1">
-              <a:shade val="50000"/>
-            </a:schemeClr>
-          </a:lnRef>
-          <a:fillRef idx="1">
-            <a:schemeClr val="accent1"/>
-          </a:fillRef>
-          <a:effectRef idx="0">
-            <a:schemeClr val="accent1"/>
-          </a:effectRef>
-          <a:fontRef idx="minor">
-            <a:schemeClr val="lt1"/>
-          </a:fontRef>
-        </p:style>
-        <p:txBody>
-          <a:bodyPr rtlCol="0" anchor="ctr"/>
-          <a:lstStyle/>
-          <a:p>
-            <a:pPr algn="ctr"/>
-            <a:endParaRPr lang="en-US"/>
           </a:p>
         </p:txBody>
       </p:sp>
       <p:sp>
         <p:nvSpPr>
-          <p:cNvPr id="3" name="Title 2">
+          <p:cNvPr id="6" name="Title 2">
             <a:extLst>
               <a:ext uri="{FF2B5EF4-FFF2-40B4-BE49-F238E27FC236}">
-                <a16:creationId xmlns:a16="http://schemas.microsoft.com/office/drawing/2014/main" id="{4D679C09-F2D7-4F14-B570-884466481BF6}"/>
+                <a16:creationId xmlns:a16="http://schemas.microsoft.com/office/drawing/2014/main" id="{6816E571-577C-45B0-82FD-087CE38D2D8E}"/>
               </a:ext>
             </a:extLst>
           </p:cNvPr>
@@ -20518,72 +22255,23 @@
         </p:nvSpPr>
         <p:spPr>
           <a:xfrm>
-            <a:off x="-4167000" y="2197729"/>
-            <a:ext cx="8333999" cy="757800"/>
+            <a:off x="242171" y="119474"/>
+            <a:ext cx="11041200" cy="692651"/>
           </a:xfrm>
         </p:spPr>
         <p:txBody>
-          <a:bodyPr>
-            <a:normAutofit/>
-          </a:bodyPr>
+          <a:bodyPr/>
           <a:lstStyle/>
           <a:p>
             <a:r>
               <a:rPr lang="en-US" dirty="0"/>
-              <a:t>Questions</a:t>
-            </a:r>
-          </a:p>
-        </p:txBody>
-      </p:sp>
-      <p:sp>
-        <p:nvSpPr>
-          <p:cNvPr id="11" name="Rectangle 10">
-            <a:extLst>
-              <a:ext uri="{FF2B5EF4-FFF2-40B4-BE49-F238E27FC236}">
-                <a16:creationId xmlns:a16="http://schemas.microsoft.com/office/drawing/2014/main" id="{99E39331-319F-465D-952A-49D1552EAAD7}"/>
-              </a:ext>
-            </a:extLst>
-          </p:cNvPr>
-          <p:cNvSpPr/>
-          <p:nvPr/>
-        </p:nvSpPr>
-        <p:spPr>
-          <a:xfrm>
-            <a:off x="-333818" y="1967620"/>
-            <a:ext cx="2883478" cy="1782202"/>
-          </a:xfrm>
-          <a:prstGeom prst="rect">
-            <a:avLst/>
-          </a:prstGeom>
-          <a:solidFill>
-            <a:schemeClr val="bg2"/>
-          </a:solidFill>
-          <a:ln>
-            <a:noFill/>
-          </a:ln>
-        </p:spPr>
-        <p:style>
-          <a:lnRef idx="2">
-            <a:schemeClr val="accent1">
-              <a:shade val="50000"/>
-            </a:schemeClr>
-          </a:lnRef>
-          <a:fillRef idx="1">
-            <a:schemeClr val="accent1"/>
-          </a:fillRef>
-          <a:effectRef idx="0">
-            <a:schemeClr val="accent1"/>
-          </a:effectRef>
-          <a:fontRef idx="minor">
-            <a:schemeClr val="lt1"/>
-          </a:fontRef>
-        </p:style>
-        <p:txBody>
-          <a:bodyPr rtlCol="0" anchor="ctr"/>
-          <a:lstStyle/>
-          <a:p>
-            <a:pPr algn="ctr"/>
-            <a:endParaRPr lang="en-US"/>
+              <a:t>Test out our </a:t>
+            </a:r>
+            <a:r>
+              <a:rPr lang="en-US" dirty="0" err="1"/>
+              <a:t>datadase</a:t>
+            </a:r>
+            <a:endParaRPr lang="en-US" dirty="0"/>
           </a:p>
         </p:txBody>
       </p:sp>
@@ -20592,7 +22280,7 @@
           <p:cNvPr id="7" name="Straight Connector 6">
             <a:extLst>
               <a:ext uri="{FF2B5EF4-FFF2-40B4-BE49-F238E27FC236}">
-                <a16:creationId xmlns:a16="http://schemas.microsoft.com/office/drawing/2014/main" id="{A352F1DF-7472-4F92-8A88-5F89D5042CFD}"/>
+                <a16:creationId xmlns:a16="http://schemas.microsoft.com/office/drawing/2014/main" id="{4937C0F6-3883-40B8-A552-46D8B49C4CC2}"/>
               </a:ext>
             </a:extLst>
           </p:cNvPr>
@@ -20603,8 +22291,8 @@
         </p:nvCxnSpPr>
         <p:spPr>
           <a:xfrm>
-            <a:off x="2549659" y="1717387"/>
-            <a:ext cx="0" cy="2238977"/>
+            <a:off x="242171" y="904587"/>
+            <a:ext cx="11586972" cy="0"/>
           </a:xfrm>
           <a:prstGeom prst="line">
             <a:avLst/>
@@ -20626,10 +22314,145 @@
           </a:fontRef>
         </p:style>
       </p:cxnSp>
+      <p:sp>
+        <p:nvSpPr>
+          <p:cNvPr id="10" name="TextBox 9">
+            <a:extLst>
+              <a:ext uri="{FF2B5EF4-FFF2-40B4-BE49-F238E27FC236}">
+                <a16:creationId xmlns:a16="http://schemas.microsoft.com/office/drawing/2014/main" id="{915906A4-3ABE-4252-802D-C017A512D1D7}"/>
+              </a:ext>
+            </a:extLst>
+          </p:cNvPr>
+          <p:cNvSpPr txBox="1"/>
+          <p:nvPr/>
+        </p:nvSpPr>
+        <p:spPr>
+          <a:xfrm>
+            <a:off x="423600" y="1312339"/>
+            <a:ext cx="11019100" cy="1015663"/>
+          </a:xfrm>
+          <a:prstGeom prst="rect">
+            <a:avLst/>
+          </a:prstGeom>
+          <a:noFill/>
+        </p:spPr>
+        <p:txBody>
+          <a:bodyPr wrap="square" rtlCol="0">
+            <a:spAutoFit/>
+          </a:bodyPr>
+          <a:lstStyle/>
+          <a:p>
+            <a:pPr lvl="1"/>
+            <a:endParaRPr lang="en-US" sz="2400" dirty="0"/>
+          </a:p>
+          <a:p>
+            <a:r>
+              <a:rPr lang="en-US" dirty="0"/>
+              <a:t>	</a:t>
+            </a:r>
+          </a:p>
+          <a:p>
+            <a:r>
+              <a:rPr lang="en-US" dirty="0"/>
+              <a:t>	</a:t>
+            </a:r>
+          </a:p>
+        </p:txBody>
+      </p:sp>
+      <p:sp>
+        <p:nvSpPr>
+          <p:cNvPr id="2" name="TextBox 1">
+            <a:extLst>
+              <a:ext uri="{FF2B5EF4-FFF2-40B4-BE49-F238E27FC236}">
+                <a16:creationId xmlns:a16="http://schemas.microsoft.com/office/drawing/2014/main" id="{8449F5DB-B378-453A-9367-16503571F9C1}"/>
+              </a:ext>
+            </a:extLst>
+          </p:cNvPr>
+          <p:cNvSpPr txBox="1"/>
+          <p:nvPr/>
+        </p:nvSpPr>
+        <p:spPr>
+          <a:xfrm>
+            <a:off x="345440" y="1198880"/>
+            <a:ext cx="7813040" cy="1477328"/>
+          </a:xfrm>
+          <a:prstGeom prst="rect">
+            <a:avLst/>
+          </a:prstGeom>
+          <a:noFill/>
+        </p:spPr>
+        <p:txBody>
+          <a:bodyPr wrap="square" rtlCol="0">
+            <a:spAutoFit/>
+          </a:bodyPr>
+          <a:lstStyle/>
+          <a:p>
+            <a:pPr marL="342900" indent="-342900">
+              <a:buFont typeface="+mj-lt"/>
+              <a:buAutoNum type="arabicPeriod"/>
+            </a:pPr>
+            <a:r>
+              <a:rPr lang="en-US" dirty="0"/>
+              <a:t>Connect to our network</a:t>
+            </a:r>
+          </a:p>
+          <a:p>
+            <a:pPr marL="800100" lvl="1" indent="-342900">
+              <a:buFont typeface="Arial" panose="020B0604020202020204" pitchFamily="34" charset="0"/>
+              <a:buChar char="•"/>
+            </a:pPr>
+            <a:r>
+              <a:rPr lang="en-US" dirty="0"/>
+              <a:t>SSID: </a:t>
+            </a:r>
+            <a:r>
+              <a:rPr lang="en-US" dirty="0" err="1"/>
+              <a:t>teamzoepertoff</a:t>
+            </a:r>
+            <a:endParaRPr lang="en-US" dirty="0"/>
+          </a:p>
+          <a:p>
+            <a:pPr marL="800100" lvl="1" indent="-342900">
+              <a:buFont typeface="Arial" panose="020B0604020202020204" pitchFamily="34" charset="0"/>
+              <a:buChar char="•"/>
+            </a:pPr>
+            <a:r>
+              <a:rPr lang="en-US" dirty="0"/>
+              <a:t>Key: </a:t>
+            </a:r>
+            <a:r>
+              <a:rPr lang="en-US" dirty="0" err="1"/>
+              <a:t>stijnkanniks</a:t>
+            </a:r>
+            <a:br>
+              <a:rPr lang="en-US" dirty="0"/>
+            </a:br>
+            <a:endParaRPr lang="en-US" dirty="0"/>
+          </a:p>
+          <a:p>
+            <a:pPr marL="342900" indent="-342900">
+              <a:buFont typeface="+mj-lt"/>
+              <a:buAutoNum type="arabicPeriod"/>
+            </a:pPr>
+            <a:r>
+              <a:rPr lang="en-US" dirty="0"/>
+              <a:t>Browse to “</a:t>
+            </a:r>
+            <a:r>
+              <a:rPr lang="nl-BE" dirty="0"/>
+              <a:t>http://172.16.102.217/roominfo.php</a:t>
+            </a:r>
+            <a:r>
+              <a:rPr lang="en-US" dirty="0"/>
+              <a:t>”</a:t>
+            </a:r>
+          </a:p>
+        </p:txBody>
+      </p:sp>
     </p:spTree>
     <p:extLst>
       <p:ext uri="{BB962C8B-B14F-4D97-AF65-F5344CB8AC3E}">
-        <p14:creationId xmlns:p14="http://schemas.microsoft.com/office/powerpoint/2010/main" val="2471060859"/>
+        <p14:creationId xmlns:p14="http://schemas.microsoft.com/office/powerpoint/2010/main" val="1262426134"/>
       </p:ext>
     </p:extLst>
   </p:cSld>
@@ -20648,311 +22471,6 @@
       </p:transition>
     </mc:Fallback>
   </mc:AlternateContent>
-  <p:timing>
-    <p:tnLst>
-      <p:par>
-        <p:cTn id="1" dur="indefinite" restart="never" nodeType="tmRoot">
-          <p:childTnLst>
-            <p:seq concurrent="1" nextAc="seek">
-              <p:cTn id="2" dur="indefinite" nodeType="mainSeq">
-                <p:childTnLst>
-                  <p:par>
-                    <p:cTn id="3" fill="hold">
-                      <p:stCondLst>
-                        <p:cond delay="indefinite"/>
-                        <p:cond evt="onBegin" delay="0">
-                          <p:tn val="2"/>
-                        </p:cond>
-                      </p:stCondLst>
-                      <p:childTnLst>
-                        <p:par>
-                          <p:cTn id="4" fill="hold">
-                            <p:stCondLst>
-                              <p:cond delay="0"/>
-                            </p:stCondLst>
-                            <p:childTnLst>
-                              <p:par>
-                                <p:cTn id="5" presetID="1" presetClass="entr" presetSubtype="0" fill="hold" grpId="1" nodeType="withEffect">
-                                  <p:stCondLst>
-                                    <p:cond delay="0"/>
-                                  </p:stCondLst>
-                                  <p:childTnLst>
-                                    <p:set>
-                                      <p:cBhvr>
-                                        <p:cTn id="6" dur="1" fill="hold">
-                                          <p:stCondLst>
-                                            <p:cond delay="0"/>
-                                          </p:stCondLst>
-                                        </p:cTn>
-                                        <p:tgtEl>
-                                          <p:spTgt spid="11"/>
-                                        </p:tgtEl>
-                                        <p:attrNameLst>
-                                          <p:attrName>style.visibility</p:attrName>
-                                        </p:attrNameLst>
-                                      </p:cBhvr>
-                                      <p:to>
-                                        <p:strVal val="visible"/>
-                                      </p:to>
-                                    </p:set>
-                                  </p:childTnLst>
-                                </p:cTn>
-                              </p:par>
-                              <p:par>
-                                <p:cTn id="7" presetID="1" presetClass="entr" presetSubtype="0" fill="hold" grpId="2" nodeType="withEffect">
-                                  <p:stCondLst>
-                                    <p:cond delay="0"/>
-                                  </p:stCondLst>
-                                  <p:childTnLst>
-                                    <p:set>
-                                      <p:cBhvr>
-                                        <p:cTn id="8" dur="1" fill="hold">
-                                          <p:stCondLst>
-                                            <p:cond delay="0"/>
-                                          </p:stCondLst>
-                                        </p:cTn>
-                                        <p:tgtEl>
-                                          <p:spTgt spid="12"/>
-                                        </p:tgtEl>
-                                        <p:attrNameLst>
-                                          <p:attrName>style.visibility</p:attrName>
-                                        </p:attrNameLst>
-                                      </p:cBhvr>
-                                      <p:to>
-                                        <p:strVal val="visible"/>
-                                      </p:to>
-                                    </p:set>
-                                  </p:childTnLst>
-                                </p:cTn>
-                              </p:par>
-                            </p:childTnLst>
-                          </p:cTn>
-                        </p:par>
-                        <p:par>
-                          <p:cTn id="9" fill="hold">
-                            <p:stCondLst>
-                              <p:cond delay="0"/>
-                            </p:stCondLst>
-                            <p:childTnLst>
-                              <p:par>
-                                <p:cTn id="10" presetID="63" presetClass="path" presetSubtype="0" accel="50000" decel="50000" fill="hold" grpId="0" nodeType="afterEffect">
-                                  <p:stCondLst>
-                                    <p:cond delay="0"/>
-                                  </p:stCondLst>
-                                  <p:childTnLst>
-                                    <p:animMotion origin="layout" path="M 0.01784 0.01482 L 0.57135 0.00741 " pathEditMode="relative" rAng="0" ptsTypes="AA">
-                                      <p:cBhvr>
-                                        <p:cTn id="11" dur="1000" fill="hold"/>
-                                        <p:tgtEl>
-                                          <p:spTgt spid="3"/>
-                                        </p:tgtEl>
-                                        <p:attrNameLst>
-                                          <p:attrName>ppt_x</p:attrName>
-                                          <p:attrName>ppt_y</p:attrName>
-                                        </p:attrNameLst>
-                                      </p:cBhvr>
-                                      <p:rCtr x="27669" y="-370"/>
-                                    </p:animMotion>
-                                  </p:childTnLst>
-                                </p:cTn>
-                              </p:par>
-                              <p:par>
-                                <p:cTn id="12" presetID="42" presetClass="path" presetSubtype="0" accel="50000" decel="50000" fill="hold" nodeType="withEffect">
-                                  <p:stCondLst>
-                                    <p:cond delay="0"/>
-                                  </p:stCondLst>
-                                  <p:childTnLst>
-                                    <p:animMotion origin="layout" path="M 3.33333E-6 -3.33333E-6 L 3.33333E-6 0.55834 " pathEditMode="relative" rAng="0" ptsTypes="AA">
-                                      <p:cBhvr>
-                                        <p:cTn id="13" dur="500" fill="hold"/>
-                                        <p:tgtEl>
-                                          <p:spTgt spid="6"/>
-                                        </p:tgtEl>
-                                        <p:attrNameLst>
-                                          <p:attrName>ppt_x</p:attrName>
-                                          <p:attrName>ppt_y</p:attrName>
-                                        </p:attrNameLst>
-                                      </p:cBhvr>
-                                      <p:rCtr x="0" y="27917"/>
-                                    </p:animMotion>
-                                  </p:childTnLst>
-                                </p:cTn>
-                              </p:par>
-                            </p:childTnLst>
-                          </p:cTn>
-                        </p:par>
-                        <p:par>
-                          <p:cTn id="14" fill="hold">
-                            <p:stCondLst>
-                              <p:cond delay="1000"/>
-                            </p:stCondLst>
-                            <p:childTnLst>
-                              <p:par>
-                                <p:cTn id="15" presetID="1" presetClass="exit" presetSubtype="0" fill="hold" grpId="0" nodeType="afterEffect">
-                                  <p:stCondLst>
-                                    <p:cond delay="0"/>
-                                  </p:stCondLst>
-                                  <p:childTnLst>
-                                    <p:set>
-                                      <p:cBhvr>
-                                        <p:cTn id="16" dur="1" fill="hold">
-                                          <p:stCondLst>
-                                            <p:cond delay="0"/>
-                                          </p:stCondLst>
-                                        </p:cTn>
-                                        <p:tgtEl>
-                                          <p:spTgt spid="11"/>
-                                        </p:tgtEl>
-                                        <p:attrNameLst>
-                                          <p:attrName>style.visibility</p:attrName>
-                                        </p:attrNameLst>
-                                      </p:cBhvr>
-                                      <p:to>
-                                        <p:strVal val="hidden"/>
-                                      </p:to>
-                                    </p:set>
-                                  </p:childTnLst>
-                                </p:cTn>
-                              </p:par>
-                            </p:childTnLst>
-                          </p:cTn>
-                        </p:par>
-                        <p:par>
-                          <p:cTn id="17" fill="hold">
-                            <p:stCondLst>
-                              <p:cond delay="1000"/>
-                            </p:stCondLst>
-                            <p:childTnLst>
-                              <p:par>
-                                <p:cTn id="18" presetID="35" presetClass="path" presetSubtype="0" accel="50000" decel="50000" fill="hold" nodeType="afterEffect">
-                                  <p:stCondLst>
-                                    <p:cond delay="0"/>
-                                  </p:stCondLst>
-                                  <p:childTnLst>
-                                    <p:animMotion origin="layout" path="M 3.75E-6 0.55833 L -0.17943 0.55648 " pathEditMode="relative" rAng="0" ptsTypes="AA">
-                                      <p:cBhvr>
-                                        <p:cTn id="19" dur="1000" fill="hold"/>
-                                        <p:tgtEl>
-                                          <p:spTgt spid="6"/>
-                                        </p:tgtEl>
-                                        <p:attrNameLst>
-                                          <p:attrName>ppt_x</p:attrName>
-                                          <p:attrName>ppt_y</p:attrName>
-                                        </p:attrNameLst>
-                                      </p:cBhvr>
-                                      <p:rCtr x="-8958" y="116"/>
-                                    </p:animMotion>
-                                  </p:childTnLst>
-                                </p:cTn>
-                              </p:par>
-                            </p:childTnLst>
-                          </p:cTn>
-                        </p:par>
-                        <p:par>
-                          <p:cTn id="20" fill="hold">
-                            <p:stCondLst>
-                              <p:cond delay="2000"/>
-                            </p:stCondLst>
-                            <p:childTnLst>
-                              <p:par>
-                                <p:cTn id="21" presetID="1" presetClass="exit" presetSubtype="0" fill="hold" grpId="0" nodeType="afterEffect">
-                                  <p:stCondLst>
-                                    <p:cond delay="0"/>
-                                  </p:stCondLst>
-                                  <p:childTnLst>
-                                    <p:set>
-                                      <p:cBhvr>
-                                        <p:cTn id="22" dur="1" fill="hold">
-                                          <p:stCondLst>
-                                            <p:cond delay="0"/>
-                                          </p:stCondLst>
-                                        </p:cTn>
-                                        <p:tgtEl>
-                                          <p:spTgt spid="12"/>
-                                        </p:tgtEl>
-                                        <p:attrNameLst>
-                                          <p:attrName>style.visibility</p:attrName>
-                                        </p:attrNameLst>
-                                      </p:cBhvr>
-                                      <p:to>
-                                        <p:strVal val="hidden"/>
-                                      </p:to>
-                                    </p:set>
-                                  </p:childTnLst>
-                                </p:cTn>
-                              </p:par>
-                            </p:childTnLst>
-                          </p:cTn>
-                        </p:par>
-                        <p:par>
-                          <p:cTn id="23" fill="hold">
-                            <p:stCondLst>
-                              <p:cond delay="2000"/>
-                            </p:stCondLst>
-                            <p:childTnLst>
-                              <p:par>
-                                <p:cTn id="24" presetID="1" presetClass="exit" presetSubtype="0" fill="hold" grpId="1" nodeType="afterEffect">
-                                  <p:stCondLst>
-                                    <p:cond delay="0"/>
-                                  </p:stCondLst>
-                                  <p:childTnLst>
-                                    <p:set>
-                                      <p:cBhvr>
-                                        <p:cTn id="25" dur="1" fill="hold">
-                                          <p:stCondLst>
-                                            <p:cond delay="0"/>
-                                          </p:stCondLst>
-                                        </p:cTn>
-                                        <p:tgtEl>
-                                          <p:spTgt spid="12"/>
-                                        </p:tgtEl>
-                                        <p:attrNameLst>
-                                          <p:attrName>style.visibility</p:attrName>
-                                        </p:attrNameLst>
-                                      </p:cBhvr>
-                                      <p:to>
-                                        <p:strVal val="hidden"/>
-                                      </p:to>
-                                    </p:set>
-                                  </p:childTnLst>
-                                </p:cTn>
-                              </p:par>
-                            </p:childTnLst>
-                          </p:cTn>
-                        </p:par>
-                      </p:childTnLst>
-                    </p:cTn>
-                  </p:par>
-                </p:childTnLst>
-              </p:cTn>
-              <p:prevCondLst>
-                <p:cond evt="onPrev" delay="0">
-                  <p:tgtEl>
-                    <p:sldTgt/>
-                  </p:tgtEl>
-                </p:cond>
-              </p:prevCondLst>
-              <p:nextCondLst>
-                <p:cond evt="onNext" delay="0">
-                  <p:tgtEl>
-                    <p:sldTgt/>
-                  </p:tgtEl>
-                </p:cond>
-              </p:nextCondLst>
-            </p:seq>
-          </p:childTnLst>
-        </p:cTn>
-      </p:par>
-    </p:tnLst>
-    <p:bldLst>
-      <p:bldP spid="12" grpId="0" animBg="1"/>
-      <p:bldP spid="12" grpId="1" animBg="1"/>
-      <p:bldP spid="12" grpId="2" animBg="1"/>
-      <p:bldP spid="3" grpId="0"/>
-      <p:bldP spid="11" grpId="0" animBg="1"/>
-      <p:bldP spid="11" grpId="1" animBg="1"/>
-    </p:bldLst>
-  </p:timing>
 </p:sld>
 </file>
 
@@ -21605,6 +23123,596 @@
       <p:bldP spid="12" grpId="2" animBg="1"/>
       <p:bldP spid="3" grpId="0"/>
       <p:bldP spid="4" grpId="0" build="p"/>
+      <p:bldP spid="11" grpId="0" animBg="1"/>
+      <p:bldP spid="11" grpId="1" animBg="1"/>
+    </p:bldLst>
+  </p:timing>
+</p:sld>
+</file>
+
+<file path=ppt/slides/slide40.xml><?xml version="1.0" encoding="utf-8"?>
+<p:sld xmlns:a="http://schemas.openxmlformats.org/drawingml/2006/main" xmlns:r="http://schemas.openxmlformats.org/officeDocument/2006/relationships" xmlns:p="http://schemas.openxmlformats.org/presentationml/2006/main">
+  <p:cSld>
+    <p:spTree>
+      <p:nvGrpSpPr>
+        <p:cNvPr id="1" name=""/>
+        <p:cNvGrpSpPr/>
+        <p:nvPr/>
+      </p:nvGrpSpPr>
+      <p:grpSpPr>
+        <a:xfrm>
+          <a:off x="0" y="0"/>
+          <a:ext cx="0" cy="0"/>
+          <a:chOff x="0" y="0"/>
+          <a:chExt cx="0" cy="0"/>
+        </a:xfrm>
+      </p:grpSpPr>
+      <p:sp>
+        <p:nvSpPr>
+          <p:cNvPr id="2" name="Slide Number Placeholder 1">
+            <a:extLst>
+              <a:ext uri="{FF2B5EF4-FFF2-40B4-BE49-F238E27FC236}">
+                <a16:creationId xmlns:a16="http://schemas.microsoft.com/office/drawing/2014/main" id="{37028FF3-B542-4155-BCE7-DF921D46D33C}"/>
+              </a:ext>
+            </a:extLst>
+          </p:cNvPr>
+          <p:cNvSpPr>
+            <a:spLocks noGrp="1"/>
+          </p:cNvSpPr>
+          <p:nvPr>
+            <p:ph type="sldNum" sz="quarter" idx="12"/>
+          </p:nvPr>
+        </p:nvSpPr>
+        <p:spPr/>
+        <p:txBody>
+          <a:bodyPr/>
+          <a:lstStyle/>
+          <a:p>
+            <a:fld id="{CF179DAE-D0A6-40C3-B8BC-6A97C268D03A}" type="slidenum">
+              <a:rPr lang="nl-NL" smtClean="0"/>
+              <a:t>40</a:t>
+            </a:fld>
+            <a:endParaRPr lang="nl-NL"/>
+          </a:p>
+        </p:txBody>
+      </p:sp>
+      <p:pic>
+        <p:nvPicPr>
+          <p:cNvPr id="6" name="Graphic 5" descr="Thought bubble">
+            <a:extLst>
+              <a:ext uri="{FF2B5EF4-FFF2-40B4-BE49-F238E27FC236}">
+                <a16:creationId xmlns:a16="http://schemas.microsoft.com/office/drawing/2014/main" id="{6C49E457-35E4-458D-847D-80B8F1E46D58}"/>
+              </a:ext>
+            </a:extLst>
+          </p:cNvPr>
+          <p:cNvPicPr>
+            <a:picLocks noChangeAspect="1"/>
+          </p:cNvPicPr>
+          <p:nvPr/>
+        </p:nvPicPr>
+        <p:blipFill>
+          <a:blip r:embed="rId2">
+            <a:extLst>
+              <a:ext uri="{96DAC541-7B7A-43D3-8B79-37D633B846F1}">
+                <asvg:svgBlip xmlns:asvg="http://schemas.microsoft.com/office/drawing/2016/SVG/main" r:embed="rId3"/>
+              </a:ext>
+            </a:extLst>
+          </a:blip>
+          <a:stretch>
+            <a:fillRect/>
+          </a:stretch>
+        </p:blipFill>
+        <p:spPr>
+          <a:xfrm>
+            <a:off x="2720153" y="-1969690"/>
+            <a:ext cx="1825895" cy="1825895"/>
+          </a:xfrm>
+          <a:prstGeom prst="rect">
+            <a:avLst/>
+          </a:prstGeom>
+        </p:spPr>
+      </p:pic>
+      <p:sp>
+        <p:nvSpPr>
+          <p:cNvPr id="12" name="Rectangle 11">
+            <a:extLst>
+              <a:ext uri="{FF2B5EF4-FFF2-40B4-BE49-F238E27FC236}">
+                <a16:creationId xmlns:a16="http://schemas.microsoft.com/office/drawing/2014/main" id="{E3947AE4-440D-47FA-BE5F-42C03A4CC014}"/>
+              </a:ext>
+            </a:extLst>
+          </p:cNvPr>
+          <p:cNvSpPr/>
+          <p:nvPr/>
+        </p:nvSpPr>
+        <p:spPr>
+          <a:xfrm>
+            <a:off x="2549658" y="-319315"/>
+            <a:ext cx="2646453" cy="4659085"/>
+          </a:xfrm>
+          <a:prstGeom prst="rect">
+            <a:avLst/>
+          </a:prstGeom>
+          <a:solidFill>
+            <a:schemeClr val="bg2"/>
+          </a:solidFill>
+          <a:ln>
+            <a:noFill/>
+          </a:ln>
+        </p:spPr>
+        <p:style>
+          <a:lnRef idx="2">
+            <a:schemeClr val="accent1">
+              <a:shade val="50000"/>
+            </a:schemeClr>
+          </a:lnRef>
+          <a:fillRef idx="1">
+            <a:schemeClr val="accent1"/>
+          </a:fillRef>
+          <a:effectRef idx="0">
+            <a:schemeClr val="accent1"/>
+          </a:effectRef>
+          <a:fontRef idx="minor">
+            <a:schemeClr val="lt1"/>
+          </a:fontRef>
+        </p:style>
+        <p:txBody>
+          <a:bodyPr rtlCol="0" anchor="ctr"/>
+          <a:lstStyle/>
+          <a:p>
+            <a:pPr algn="ctr"/>
+            <a:endParaRPr lang="en-US"/>
+          </a:p>
+        </p:txBody>
+      </p:sp>
+      <p:sp>
+        <p:nvSpPr>
+          <p:cNvPr id="3" name="Title 2">
+            <a:extLst>
+              <a:ext uri="{FF2B5EF4-FFF2-40B4-BE49-F238E27FC236}">
+                <a16:creationId xmlns:a16="http://schemas.microsoft.com/office/drawing/2014/main" id="{4D679C09-F2D7-4F14-B570-884466481BF6}"/>
+              </a:ext>
+            </a:extLst>
+          </p:cNvPr>
+          <p:cNvSpPr>
+            <a:spLocks noGrp="1"/>
+          </p:cNvSpPr>
+          <p:nvPr>
+            <p:ph type="title"/>
+          </p:nvPr>
+        </p:nvSpPr>
+        <p:spPr>
+          <a:xfrm>
+            <a:off x="-4167000" y="2197729"/>
+            <a:ext cx="8333999" cy="757800"/>
+          </a:xfrm>
+        </p:spPr>
+        <p:txBody>
+          <a:bodyPr>
+            <a:normAutofit/>
+          </a:bodyPr>
+          <a:lstStyle/>
+          <a:p>
+            <a:r>
+              <a:rPr lang="en-US" dirty="0"/>
+              <a:t>Questions</a:t>
+            </a:r>
+          </a:p>
+        </p:txBody>
+      </p:sp>
+      <p:sp>
+        <p:nvSpPr>
+          <p:cNvPr id="11" name="Rectangle 10">
+            <a:extLst>
+              <a:ext uri="{FF2B5EF4-FFF2-40B4-BE49-F238E27FC236}">
+                <a16:creationId xmlns:a16="http://schemas.microsoft.com/office/drawing/2014/main" id="{99E39331-319F-465D-952A-49D1552EAAD7}"/>
+              </a:ext>
+            </a:extLst>
+          </p:cNvPr>
+          <p:cNvSpPr/>
+          <p:nvPr/>
+        </p:nvSpPr>
+        <p:spPr>
+          <a:xfrm>
+            <a:off x="-333818" y="1967620"/>
+            <a:ext cx="2883478" cy="1782202"/>
+          </a:xfrm>
+          <a:prstGeom prst="rect">
+            <a:avLst/>
+          </a:prstGeom>
+          <a:solidFill>
+            <a:schemeClr val="bg2"/>
+          </a:solidFill>
+          <a:ln>
+            <a:noFill/>
+          </a:ln>
+        </p:spPr>
+        <p:style>
+          <a:lnRef idx="2">
+            <a:schemeClr val="accent1">
+              <a:shade val="50000"/>
+            </a:schemeClr>
+          </a:lnRef>
+          <a:fillRef idx="1">
+            <a:schemeClr val="accent1"/>
+          </a:fillRef>
+          <a:effectRef idx="0">
+            <a:schemeClr val="accent1"/>
+          </a:effectRef>
+          <a:fontRef idx="minor">
+            <a:schemeClr val="lt1"/>
+          </a:fontRef>
+        </p:style>
+        <p:txBody>
+          <a:bodyPr rtlCol="0" anchor="ctr"/>
+          <a:lstStyle/>
+          <a:p>
+            <a:pPr algn="ctr"/>
+            <a:endParaRPr lang="en-US"/>
+          </a:p>
+        </p:txBody>
+      </p:sp>
+      <p:cxnSp>
+        <p:nvCxnSpPr>
+          <p:cNvPr id="7" name="Straight Connector 6">
+            <a:extLst>
+              <a:ext uri="{FF2B5EF4-FFF2-40B4-BE49-F238E27FC236}">
+                <a16:creationId xmlns:a16="http://schemas.microsoft.com/office/drawing/2014/main" id="{A352F1DF-7472-4F92-8A88-5F89D5042CFD}"/>
+              </a:ext>
+            </a:extLst>
+          </p:cNvPr>
+          <p:cNvCxnSpPr>
+            <a:cxnSpLocks/>
+          </p:cNvCxnSpPr>
+          <p:nvPr/>
+        </p:nvCxnSpPr>
+        <p:spPr>
+          <a:xfrm>
+            <a:off x="2549659" y="1717387"/>
+            <a:ext cx="0" cy="2238977"/>
+          </a:xfrm>
+          <a:prstGeom prst="line">
+            <a:avLst/>
+          </a:prstGeom>
+          <a:ln w="31750"/>
+        </p:spPr>
+        <p:style>
+          <a:lnRef idx="1">
+            <a:schemeClr val="accent1"/>
+          </a:lnRef>
+          <a:fillRef idx="0">
+            <a:schemeClr val="accent1"/>
+          </a:fillRef>
+          <a:effectRef idx="0">
+            <a:schemeClr val="accent1"/>
+          </a:effectRef>
+          <a:fontRef idx="minor">
+            <a:schemeClr val="tx1"/>
+          </a:fontRef>
+        </p:style>
+      </p:cxnSp>
+    </p:spTree>
+    <p:extLst>
+      <p:ext uri="{BB962C8B-B14F-4D97-AF65-F5344CB8AC3E}">
+        <p14:creationId xmlns:p14="http://schemas.microsoft.com/office/powerpoint/2010/main" val="2471060859"/>
+      </p:ext>
+    </p:extLst>
+  </p:cSld>
+  <p:clrMapOvr>
+    <a:masterClrMapping/>
+  </p:clrMapOvr>
+  <mc:AlternateContent xmlns:mc="http://schemas.openxmlformats.org/markup-compatibility/2006" xmlns:p159="http://schemas.microsoft.com/office/powerpoint/2015/09/main">
+    <mc:Choice Requires="p159">
+      <p:transition xmlns:p14="http://schemas.microsoft.com/office/powerpoint/2010/main" spd="slow" p14:dur="2000">
+        <p159:morph option="byObject"/>
+      </p:transition>
+    </mc:Choice>
+    <mc:Fallback xmlns="">
+      <p:transition spd="slow">
+        <p:fade/>
+      </p:transition>
+    </mc:Fallback>
+  </mc:AlternateContent>
+  <p:timing>
+    <p:tnLst>
+      <p:par>
+        <p:cTn id="1" dur="indefinite" restart="never" nodeType="tmRoot">
+          <p:childTnLst>
+            <p:seq concurrent="1" nextAc="seek">
+              <p:cTn id="2" dur="indefinite" nodeType="mainSeq">
+                <p:childTnLst>
+                  <p:par>
+                    <p:cTn id="3" fill="hold">
+                      <p:stCondLst>
+                        <p:cond delay="indefinite"/>
+                        <p:cond evt="onBegin" delay="0">
+                          <p:tn val="2"/>
+                        </p:cond>
+                      </p:stCondLst>
+                      <p:childTnLst>
+                        <p:par>
+                          <p:cTn id="4" fill="hold">
+                            <p:stCondLst>
+                              <p:cond delay="0"/>
+                            </p:stCondLst>
+                            <p:childTnLst>
+                              <p:par>
+                                <p:cTn id="5" presetID="1" presetClass="entr" presetSubtype="0" fill="hold" grpId="1" nodeType="withEffect">
+                                  <p:stCondLst>
+                                    <p:cond delay="0"/>
+                                  </p:stCondLst>
+                                  <p:childTnLst>
+                                    <p:set>
+                                      <p:cBhvr>
+                                        <p:cTn id="6" dur="1" fill="hold">
+                                          <p:stCondLst>
+                                            <p:cond delay="0"/>
+                                          </p:stCondLst>
+                                        </p:cTn>
+                                        <p:tgtEl>
+                                          <p:spTgt spid="11"/>
+                                        </p:tgtEl>
+                                        <p:attrNameLst>
+                                          <p:attrName>style.visibility</p:attrName>
+                                        </p:attrNameLst>
+                                      </p:cBhvr>
+                                      <p:to>
+                                        <p:strVal val="visible"/>
+                                      </p:to>
+                                    </p:set>
+                                  </p:childTnLst>
+                                </p:cTn>
+                              </p:par>
+                              <p:par>
+                                <p:cTn id="7" presetID="1" presetClass="entr" presetSubtype="0" fill="hold" grpId="2" nodeType="withEffect">
+                                  <p:stCondLst>
+                                    <p:cond delay="0"/>
+                                  </p:stCondLst>
+                                  <p:childTnLst>
+                                    <p:set>
+                                      <p:cBhvr>
+                                        <p:cTn id="8" dur="1" fill="hold">
+                                          <p:stCondLst>
+                                            <p:cond delay="0"/>
+                                          </p:stCondLst>
+                                        </p:cTn>
+                                        <p:tgtEl>
+                                          <p:spTgt spid="12"/>
+                                        </p:tgtEl>
+                                        <p:attrNameLst>
+                                          <p:attrName>style.visibility</p:attrName>
+                                        </p:attrNameLst>
+                                      </p:cBhvr>
+                                      <p:to>
+                                        <p:strVal val="visible"/>
+                                      </p:to>
+                                    </p:set>
+                                  </p:childTnLst>
+                                </p:cTn>
+                              </p:par>
+                            </p:childTnLst>
+                          </p:cTn>
+                        </p:par>
+                        <p:par>
+                          <p:cTn id="9" fill="hold">
+                            <p:stCondLst>
+                              <p:cond delay="0"/>
+                            </p:stCondLst>
+                            <p:childTnLst>
+                              <p:par>
+                                <p:cTn id="10" presetID="63" presetClass="path" presetSubtype="0" accel="50000" decel="50000" fill="hold" grpId="0" nodeType="afterEffect">
+                                  <p:stCondLst>
+                                    <p:cond delay="0"/>
+                                  </p:stCondLst>
+                                  <p:childTnLst>
+                                    <p:animMotion origin="layout" path="M 0.01784 0.01482 L 0.57135 0.00741 " pathEditMode="relative" rAng="0" ptsTypes="AA">
+                                      <p:cBhvr>
+                                        <p:cTn id="11" dur="1000" fill="hold"/>
+                                        <p:tgtEl>
+                                          <p:spTgt spid="3"/>
+                                        </p:tgtEl>
+                                        <p:attrNameLst>
+                                          <p:attrName>ppt_x</p:attrName>
+                                          <p:attrName>ppt_y</p:attrName>
+                                        </p:attrNameLst>
+                                      </p:cBhvr>
+                                      <p:rCtr x="27669" y="-370"/>
+                                    </p:animMotion>
+                                  </p:childTnLst>
+                                </p:cTn>
+                              </p:par>
+                              <p:par>
+                                <p:cTn id="12" presetID="42" presetClass="path" presetSubtype="0" accel="50000" decel="50000" fill="hold" nodeType="withEffect">
+                                  <p:stCondLst>
+                                    <p:cond delay="0"/>
+                                  </p:stCondLst>
+                                  <p:childTnLst>
+                                    <p:animMotion origin="layout" path="M 3.33333E-6 -3.33333E-6 L 3.33333E-6 0.55834 " pathEditMode="relative" rAng="0" ptsTypes="AA">
+                                      <p:cBhvr>
+                                        <p:cTn id="13" dur="500" fill="hold"/>
+                                        <p:tgtEl>
+                                          <p:spTgt spid="6"/>
+                                        </p:tgtEl>
+                                        <p:attrNameLst>
+                                          <p:attrName>ppt_x</p:attrName>
+                                          <p:attrName>ppt_y</p:attrName>
+                                        </p:attrNameLst>
+                                      </p:cBhvr>
+                                      <p:rCtr x="0" y="27917"/>
+                                    </p:animMotion>
+                                  </p:childTnLst>
+                                </p:cTn>
+                              </p:par>
+                            </p:childTnLst>
+                          </p:cTn>
+                        </p:par>
+                        <p:par>
+                          <p:cTn id="14" fill="hold">
+                            <p:stCondLst>
+                              <p:cond delay="1000"/>
+                            </p:stCondLst>
+                            <p:childTnLst>
+                              <p:par>
+                                <p:cTn id="15" presetID="1" presetClass="exit" presetSubtype="0" fill="hold" grpId="0" nodeType="afterEffect">
+                                  <p:stCondLst>
+                                    <p:cond delay="0"/>
+                                  </p:stCondLst>
+                                  <p:childTnLst>
+                                    <p:set>
+                                      <p:cBhvr>
+                                        <p:cTn id="16" dur="1" fill="hold">
+                                          <p:stCondLst>
+                                            <p:cond delay="0"/>
+                                          </p:stCondLst>
+                                        </p:cTn>
+                                        <p:tgtEl>
+                                          <p:spTgt spid="11"/>
+                                        </p:tgtEl>
+                                        <p:attrNameLst>
+                                          <p:attrName>style.visibility</p:attrName>
+                                        </p:attrNameLst>
+                                      </p:cBhvr>
+                                      <p:to>
+                                        <p:strVal val="hidden"/>
+                                      </p:to>
+                                    </p:set>
+                                  </p:childTnLst>
+                                </p:cTn>
+                              </p:par>
+                            </p:childTnLst>
+                          </p:cTn>
+                        </p:par>
+                        <p:par>
+                          <p:cTn id="17" fill="hold">
+                            <p:stCondLst>
+                              <p:cond delay="1000"/>
+                            </p:stCondLst>
+                            <p:childTnLst>
+                              <p:par>
+                                <p:cTn id="18" presetID="35" presetClass="path" presetSubtype="0" accel="50000" decel="50000" fill="hold" nodeType="afterEffect">
+                                  <p:stCondLst>
+                                    <p:cond delay="0"/>
+                                  </p:stCondLst>
+                                  <p:childTnLst>
+                                    <p:animMotion origin="layout" path="M 3.75E-6 0.55833 L -0.17943 0.55648 " pathEditMode="relative" rAng="0" ptsTypes="AA">
+                                      <p:cBhvr>
+                                        <p:cTn id="19" dur="1000" fill="hold"/>
+                                        <p:tgtEl>
+                                          <p:spTgt spid="6"/>
+                                        </p:tgtEl>
+                                        <p:attrNameLst>
+                                          <p:attrName>ppt_x</p:attrName>
+                                          <p:attrName>ppt_y</p:attrName>
+                                        </p:attrNameLst>
+                                      </p:cBhvr>
+                                      <p:rCtr x="-8958" y="116"/>
+                                    </p:animMotion>
+                                  </p:childTnLst>
+                                </p:cTn>
+                              </p:par>
+                            </p:childTnLst>
+                          </p:cTn>
+                        </p:par>
+                        <p:par>
+                          <p:cTn id="20" fill="hold">
+                            <p:stCondLst>
+                              <p:cond delay="2000"/>
+                            </p:stCondLst>
+                            <p:childTnLst>
+                              <p:par>
+                                <p:cTn id="21" presetID="1" presetClass="exit" presetSubtype="0" fill="hold" grpId="0" nodeType="afterEffect">
+                                  <p:stCondLst>
+                                    <p:cond delay="0"/>
+                                  </p:stCondLst>
+                                  <p:childTnLst>
+                                    <p:set>
+                                      <p:cBhvr>
+                                        <p:cTn id="22" dur="1" fill="hold">
+                                          <p:stCondLst>
+                                            <p:cond delay="0"/>
+                                          </p:stCondLst>
+                                        </p:cTn>
+                                        <p:tgtEl>
+                                          <p:spTgt spid="12"/>
+                                        </p:tgtEl>
+                                        <p:attrNameLst>
+                                          <p:attrName>style.visibility</p:attrName>
+                                        </p:attrNameLst>
+                                      </p:cBhvr>
+                                      <p:to>
+                                        <p:strVal val="hidden"/>
+                                      </p:to>
+                                    </p:set>
+                                  </p:childTnLst>
+                                </p:cTn>
+                              </p:par>
+                            </p:childTnLst>
+                          </p:cTn>
+                        </p:par>
+                        <p:par>
+                          <p:cTn id="23" fill="hold">
+                            <p:stCondLst>
+                              <p:cond delay="2000"/>
+                            </p:stCondLst>
+                            <p:childTnLst>
+                              <p:par>
+                                <p:cTn id="24" presetID="1" presetClass="exit" presetSubtype="0" fill="hold" grpId="1" nodeType="afterEffect">
+                                  <p:stCondLst>
+                                    <p:cond delay="0"/>
+                                  </p:stCondLst>
+                                  <p:childTnLst>
+                                    <p:set>
+                                      <p:cBhvr>
+                                        <p:cTn id="25" dur="1" fill="hold">
+                                          <p:stCondLst>
+                                            <p:cond delay="0"/>
+                                          </p:stCondLst>
+                                        </p:cTn>
+                                        <p:tgtEl>
+                                          <p:spTgt spid="12"/>
+                                        </p:tgtEl>
+                                        <p:attrNameLst>
+                                          <p:attrName>style.visibility</p:attrName>
+                                        </p:attrNameLst>
+                                      </p:cBhvr>
+                                      <p:to>
+                                        <p:strVal val="hidden"/>
+                                      </p:to>
+                                    </p:set>
+                                  </p:childTnLst>
+                                </p:cTn>
+                              </p:par>
+                            </p:childTnLst>
+                          </p:cTn>
+                        </p:par>
+                      </p:childTnLst>
+                    </p:cTn>
+                  </p:par>
+                </p:childTnLst>
+              </p:cTn>
+              <p:prevCondLst>
+                <p:cond evt="onPrev" delay="0">
+                  <p:tgtEl>
+                    <p:sldTgt/>
+                  </p:tgtEl>
+                </p:cond>
+              </p:prevCondLst>
+              <p:nextCondLst>
+                <p:cond evt="onNext" delay="0">
+                  <p:tgtEl>
+                    <p:sldTgt/>
+                  </p:tgtEl>
+                </p:cond>
+              </p:nextCondLst>
+            </p:seq>
+          </p:childTnLst>
+        </p:cTn>
+      </p:par>
+    </p:tnLst>
+    <p:bldLst>
+      <p:bldP spid="12" grpId="0" animBg="1"/>
+      <p:bldP spid="12" grpId="1" animBg="1"/>
+      <p:bldP spid="12" grpId="2" animBg="1"/>
+      <p:bldP spid="3" grpId="0"/>
       <p:bldP spid="11" grpId="0" animBg="1"/>
       <p:bldP spid="11" grpId="1" animBg="1"/>
     </p:bldLst>

</xml_diff>